<commit_message>
Stared working on creating the infra..
</commit_message>
<xml_diff>
--- a/TechDesign.pptx
+++ b/TechDesign.pptx
@@ -273,7 +273,7 @@
           <a:p>
             <a:fld id="{91A10E39-C289-4936-BB8A-7D7F2E005D15}" type="datetimeFigureOut">
               <a:rPr lang="en-US" smtClean="0"/>
-              <a:t>3/17/2018</a:t>
+              <a:t>3/18/2018</a:t>
             </a:fld>
             <a:endParaRPr lang="en-US"/>
           </a:p>
@@ -471,7 +471,7 @@
           <a:p>
             <a:fld id="{91A10E39-C289-4936-BB8A-7D7F2E005D15}" type="datetimeFigureOut">
               <a:rPr lang="en-US" smtClean="0"/>
-              <a:t>3/17/2018</a:t>
+              <a:t>3/18/2018</a:t>
             </a:fld>
             <a:endParaRPr lang="en-US"/>
           </a:p>
@@ -679,7 +679,7 @@
           <a:p>
             <a:fld id="{91A10E39-C289-4936-BB8A-7D7F2E005D15}" type="datetimeFigureOut">
               <a:rPr lang="en-US" smtClean="0"/>
-              <a:t>3/17/2018</a:t>
+              <a:t>3/18/2018</a:t>
             </a:fld>
             <a:endParaRPr lang="en-US"/>
           </a:p>
@@ -877,7 +877,7 @@
           <a:p>
             <a:fld id="{91A10E39-C289-4936-BB8A-7D7F2E005D15}" type="datetimeFigureOut">
               <a:rPr lang="en-US" smtClean="0"/>
-              <a:t>3/17/2018</a:t>
+              <a:t>3/18/2018</a:t>
             </a:fld>
             <a:endParaRPr lang="en-US"/>
           </a:p>
@@ -1152,7 +1152,7 @@
           <a:p>
             <a:fld id="{91A10E39-C289-4936-BB8A-7D7F2E005D15}" type="datetimeFigureOut">
               <a:rPr lang="en-US" smtClean="0"/>
-              <a:t>3/17/2018</a:t>
+              <a:t>3/18/2018</a:t>
             </a:fld>
             <a:endParaRPr lang="en-US"/>
           </a:p>
@@ -1417,7 +1417,7 @@
           <a:p>
             <a:fld id="{91A10E39-C289-4936-BB8A-7D7F2E005D15}" type="datetimeFigureOut">
               <a:rPr lang="en-US" smtClean="0"/>
-              <a:t>3/17/2018</a:t>
+              <a:t>3/18/2018</a:t>
             </a:fld>
             <a:endParaRPr lang="en-US"/>
           </a:p>
@@ -1829,7 +1829,7 @@
           <a:p>
             <a:fld id="{91A10E39-C289-4936-BB8A-7D7F2E005D15}" type="datetimeFigureOut">
               <a:rPr lang="en-US" smtClean="0"/>
-              <a:t>3/17/2018</a:t>
+              <a:t>3/18/2018</a:t>
             </a:fld>
             <a:endParaRPr lang="en-US"/>
           </a:p>
@@ -1970,7 +1970,7 @@
           <a:p>
             <a:fld id="{91A10E39-C289-4936-BB8A-7D7F2E005D15}" type="datetimeFigureOut">
               <a:rPr lang="en-US" smtClean="0"/>
-              <a:t>3/17/2018</a:t>
+              <a:t>3/18/2018</a:t>
             </a:fld>
             <a:endParaRPr lang="en-US"/>
           </a:p>
@@ -2083,7 +2083,7 @@
           <a:p>
             <a:fld id="{91A10E39-C289-4936-BB8A-7D7F2E005D15}" type="datetimeFigureOut">
               <a:rPr lang="en-US" smtClean="0"/>
-              <a:t>3/17/2018</a:t>
+              <a:t>3/18/2018</a:t>
             </a:fld>
             <a:endParaRPr lang="en-US"/>
           </a:p>
@@ -2394,7 +2394,7 @@
           <a:p>
             <a:fld id="{91A10E39-C289-4936-BB8A-7D7F2E005D15}" type="datetimeFigureOut">
               <a:rPr lang="en-US" smtClean="0"/>
-              <a:t>3/17/2018</a:t>
+              <a:t>3/18/2018</a:t>
             </a:fld>
             <a:endParaRPr lang="en-US"/>
           </a:p>
@@ -2682,7 +2682,7 @@
           <a:p>
             <a:fld id="{91A10E39-C289-4936-BB8A-7D7F2E005D15}" type="datetimeFigureOut">
               <a:rPr lang="en-US" smtClean="0"/>
-              <a:t>3/17/2018</a:t>
+              <a:t>3/18/2018</a:t>
             </a:fld>
             <a:endParaRPr lang="en-US"/>
           </a:p>
@@ -2923,7 +2923,7 @@
           <a:p>
             <a:fld id="{91A10E39-C289-4936-BB8A-7D7F2E005D15}" type="datetimeFigureOut">
               <a:rPr lang="en-US" smtClean="0"/>
-              <a:t>3/17/2018</a:t>
+              <a:t>3/18/2018</a:t>
             </a:fld>
             <a:endParaRPr lang="en-US"/>
           </a:p>
@@ -3582,19 +3582,19 @@
         </p:nvSpPr>
         <p:spPr>
           <a:xfrm>
-            <a:off x="8267871" y="3378805"/>
+            <a:off x="8277253" y="1670526"/>
             <a:ext cx="1253405" cy="947857"/>
           </a:xfrm>
           <a:prstGeom prst="roundRect">
-            <a:avLst/>
+            <a:avLst>
+              <a:gd name="adj" fmla="val 2050"/>
+            </a:avLst>
           </a:prstGeom>
           <a:solidFill>
-            <a:srgbClr val="00B0F0"/>
+            <a:srgbClr val="1DC4FF"/>
           </a:solidFill>
-          <a:ln w="12700">
-            <a:solidFill>
-              <a:schemeClr val="tx1"/>
-            </a:solidFill>
+          <a:ln w="3175">
+            <a:noFill/>
           </a:ln>
         </p:spPr>
         <p:style>
@@ -3624,7 +3624,7 @@
           <a:p>
             <a:pPr algn="ctr"/>
             <a:r>
-              <a:rPr lang="en-US" dirty="0"/>
+              <a:rPr lang="en-US" sz="1600" dirty="0"/>
               <a:t>Storage</a:t>
             </a:r>
             <a:endParaRPr lang="en-US" sz="2000" dirty="0"/>
@@ -3645,19 +3645,19 @@
         </p:nvSpPr>
         <p:spPr>
           <a:xfrm>
-            <a:off x="8211506" y="2111049"/>
+            <a:off x="8263266" y="498729"/>
             <a:ext cx="1253405" cy="947857"/>
           </a:xfrm>
           <a:prstGeom prst="roundRect">
-            <a:avLst/>
+            <a:avLst>
+              <a:gd name="adj" fmla="val 0"/>
+            </a:avLst>
           </a:prstGeom>
           <a:solidFill>
-            <a:srgbClr val="00B0F0"/>
+            <a:srgbClr val="1DC4FF"/>
           </a:solidFill>
-          <a:ln w="12700">
-            <a:solidFill>
-              <a:schemeClr val="tx1"/>
-            </a:solidFill>
+          <a:ln w="3175">
+            <a:noFill/>
           </a:ln>
         </p:spPr>
         <p:style>
@@ -3687,7 +3687,7 @@
           <a:p>
             <a:pPr algn="ctr"/>
             <a:r>
-              <a:rPr lang="en-US" dirty="0"/>
+              <a:rPr lang="en-US" sz="1600" dirty="0"/>
               <a:t>Power BI</a:t>
             </a:r>
           </a:p>
@@ -3707,19 +3707,19 @@
         </p:nvSpPr>
         <p:spPr>
           <a:xfrm>
-            <a:off x="5386647" y="2764695"/>
-            <a:ext cx="1870730" cy="1410974"/>
+            <a:off x="5396029" y="1150836"/>
+            <a:ext cx="1639790" cy="1105342"/>
           </a:xfrm>
           <a:prstGeom prst="roundRect">
-            <a:avLst/>
+            <a:avLst>
+              <a:gd name="adj" fmla="val 0"/>
+            </a:avLst>
           </a:prstGeom>
           <a:solidFill>
-            <a:srgbClr val="00B0F0"/>
+            <a:srgbClr val="1DC4FF"/>
           </a:solidFill>
-          <a:ln w="12700">
-            <a:solidFill>
-              <a:schemeClr val="tx1"/>
-            </a:solidFill>
+          <a:ln w="3175">
+            <a:noFill/>
           </a:ln>
         </p:spPr>
         <p:style>
@@ -3749,14 +3749,14 @@
           <a:p>
             <a:pPr algn="ctr"/>
             <a:r>
-              <a:rPr lang="en-US" dirty="0"/>
+              <a:rPr lang="en-US" sz="1600" dirty="0"/>
               <a:t>Stream </a:t>
             </a:r>
           </a:p>
           <a:p>
             <a:pPr algn="ctr"/>
             <a:r>
-              <a:rPr lang="en-US" dirty="0"/>
+              <a:rPr lang="en-US" sz="1600" dirty="0"/>
               <a:t>Analytics</a:t>
             </a:r>
           </a:p>
@@ -3776,19 +3776,19 @@
         </p:nvSpPr>
         <p:spPr>
           <a:xfrm>
-            <a:off x="2681426" y="500750"/>
-            <a:ext cx="1788059" cy="5367248"/>
+            <a:off x="2681427" y="500749"/>
+            <a:ext cx="1495250" cy="5398557"/>
           </a:xfrm>
           <a:prstGeom prst="roundRect">
-            <a:avLst/>
+            <a:avLst>
+              <a:gd name="adj" fmla="val 2720"/>
+            </a:avLst>
           </a:prstGeom>
           <a:solidFill>
-            <a:srgbClr val="00B0F0"/>
+            <a:srgbClr val="1DC4FF"/>
           </a:solidFill>
-          <a:ln w="12700">
-            <a:solidFill>
-              <a:schemeClr val="tx1"/>
-            </a:solidFill>
+          <a:ln w="3175">
+            <a:noFill/>
           </a:ln>
         </p:spPr>
         <p:style>
@@ -3818,7 +3818,7 @@
           <a:p>
             <a:pPr algn="ctr"/>
             <a:r>
-              <a:rPr lang="en-US" sz="2000" dirty="0"/>
+              <a:rPr lang="en-US" sz="1600" dirty="0"/>
               <a:t>IOT Hub</a:t>
             </a:r>
           </a:p>
@@ -3842,8 +3842,18 @@
             <a:ext cx="1192240" cy="812089"/>
           </a:xfrm>
           <a:prstGeom prst="roundRect">
-            <a:avLst/>
+            <a:avLst>
+              <a:gd name="adj" fmla="val 0"/>
+            </a:avLst>
           </a:prstGeom>
+          <a:solidFill>
+            <a:schemeClr val="bg1"/>
+          </a:solidFill>
+          <a:ln w="3175">
+            <a:solidFill>
+              <a:srgbClr val="0070C0"/>
+            </a:solidFill>
+          </a:ln>
         </p:spPr>
         <p:style>
           <a:lnRef idx="2">
@@ -3862,42 +3872,201 @@
           </a:fontRef>
         </p:style>
         <p:txBody>
-          <a:bodyPr rtlCol="0" anchor="ctr"/>
+          <a:bodyPr rot="0" spcFirstLastPara="0" vertOverflow="overflow" horzOverflow="overflow" vert="horz" wrap="square" lIns="91440" tIns="45720" rIns="91440" bIns="45720" numCol="1" spcCol="0" rtlCol="0" fromWordArt="0" anchor="ctr" anchorCtr="0" forceAA="0" compatLnSpc="1">
+            <a:prstTxWarp prst="textNoShape">
+              <a:avLst/>
+            </a:prstTxWarp>
+            <a:noAutofit/>
+          </a:bodyPr>
           <a:lstStyle/>
           <a:p>
             <a:pPr algn="ctr"/>
             <a:r>
-              <a:rPr lang="en-US"/>
+              <a:rPr lang="en-US" sz="2000"/>
               <a:t>Devices</a:t>
             </a:r>
           </a:p>
         </p:txBody>
       </p:sp>
+      <p:pic>
+        <p:nvPicPr>
+          <p:cNvPr id="24" name="Picture 23">
+            <a:extLst>
+              <a:ext uri="{FF2B5EF4-FFF2-40B4-BE49-F238E27FC236}">
+                <a16:creationId xmlns:a16="http://schemas.microsoft.com/office/drawing/2014/main" id="{5BB752C6-9044-4217-B80E-5DBDABBE5147}"/>
+              </a:ext>
+            </a:extLst>
+          </p:cNvPr>
+          <p:cNvPicPr>
+            <a:picLocks noChangeAspect="1"/>
+          </p:cNvPicPr>
+          <p:nvPr/>
+        </p:nvPicPr>
+        <p:blipFill>
+          <a:blip r:embed="rId2"/>
+          <a:stretch>
+            <a:fillRect/>
+          </a:stretch>
+        </p:blipFill>
+        <p:spPr>
+          <a:xfrm>
+            <a:off x="3129213" y="2177741"/>
+            <a:ext cx="488061" cy="504330"/>
+          </a:xfrm>
+          <a:prstGeom prst="rect">
+            <a:avLst/>
+          </a:prstGeom>
+          <a:ln w="12700">
+            <a:solidFill>
+              <a:schemeClr val="tx1"/>
+            </a:solidFill>
+          </a:ln>
+        </p:spPr>
+      </p:pic>
+      <p:pic>
+        <p:nvPicPr>
+          <p:cNvPr id="46" name="Picture 45">
+            <a:extLst>
+              <a:ext uri="{FF2B5EF4-FFF2-40B4-BE49-F238E27FC236}">
+                <a16:creationId xmlns:a16="http://schemas.microsoft.com/office/drawing/2014/main" id="{E08A8F1F-6FEC-4AC9-ABEA-AC6BFA30D146}"/>
+              </a:ext>
+            </a:extLst>
+          </p:cNvPr>
+          <p:cNvPicPr>
+            <a:picLocks noChangeAspect="1"/>
+          </p:cNvPicPr>
+          <p:nvPr/>
+        </p:nvPicPr>
+        <p:blipFill>
+          <a:blip r:embed="rId3">
+            <a:extLst>
+              <a:ext uri="{28A0092B-C50C-407E-A947-70E740481C1C}">
+                <a14:useLocalDpi xmlns:a14="http://schemas.microsoft.com/office/drawing/2010/main" val="0"/>
+              </a:ext>
+            </a:extLst>
+          </a:blip>
+          <a:stretch>
+            <a:fillRect/>
+          </a:stretch>
+        </p:blipFill>
+        <p:spPr>
+          <a:xfrm>
+            <a:off x="10845045" y="3070327"/>
+            <a:ext cx="782408" cy="782408"/>
+          </a:xfrm>
+          <a:prstGeom prst="rect">
+            <a:avLst/>
+          </a:prstGeom>
+          <a:ln w="12700">
+            <a:solidFill>
+              <a:schemeClr val="tx1"/>
+            </a:solidFill>
+          </a:ln>
+        </p:spPr>
+      </p:pic>
       <p:cxnSp>
         <p:nvCxnSpPr>
-          <p:cNvPr id="6" name="Straight Arrow Connector 5">
-            <a:extLst>
-              <a:ext uri="{FF2B5EF4-FFF2-40B4-BE49-F238E27FC236}">
-                <a16:creationId xmlns:a16="http://schemas.microsoft.com/office/drawing/2014/main" id="{CD98B667-6FA8-4DF5-B54D-48C331618B01}"/>
+          <p:cNvPr id="87" name="Connector: Elbow 86">
+            <a:extLst>
+              <a:ext uri="{FF2B5EF4-FFF2-40B4-BE49-F238E27FC236}">
+                <a16:creationId xmlns:a16="http://schemas.microsoft.com/office/drawing/2014/main" id="{52743566-315B-4300-878F-C369AA598513}"/>
               </a:ext>
             </a:extLst>
           </p:cNvPr>
           <p:cNvCxnSpPr>
             <a:cxnSpLocks/>
+            <a:stCxn id="46" idx="2"/>
+            <a:endCxn id="122" idx="2"/>
           </p:cNvCxnSpPr>
           <p:nvPr/>
         </p:nvCxnSpPr>
         <p:spPr>
-          <a:xfrm flipV="1">
-            <a:off x="1513832" y="2341418"/>
-            <a:ext cx="1167594" cy="1087582"/>
-          </a:xfrm>
-          <a:prstGeom prst="straightConnector1">
+          <a:xfrm rot="5400000" flipH="1">
+            <a:off x="6064353" y="-1319161"/>
+            <a:ext cx="91286" cy="10252507"/>
+          </a:xfrm>
+          <a:prstGeom prst="bentConnector3">
+            <a:avLst>
+              <a:gd name="adj1" fmla="val -1540475"/>
+            </a:avLst>
+          </a:prstGeom>
+          <a:ln w="28575">
+            <a:tailEnd type="triangle"/>
+          </a:ln>
+        </p:spPr>
+        <p:style>
+          <a:lnRef idx="1">
+            <a:schemeClr val="accent1"/>
+          </a:lnRef>
+          <a:fillRef idx="0">
+            <a:schemeClr val="accent1"/>
+          </a:fillRef>
+          <a:effectRef idx="0">
+            <a:schemeClr val="accent1"/>
+          </a:effectRef>
+          <a:fontRef idx="minor">
+            <a:schemeClr val="tx1"/>
+          </a:fontRef>
+        </p:style>
+      </p:cxnSp>
+      <p:sp>
+        <p:nvSpPr>
+          <p:cNvPr id="93" name="TextBox 92">
+            <a:extLst>
+              <a:ext uri="{FF2B5EF4-FFF2-40B4-BE49-F238E27FC236}">
+                <a16:creationId xmlns:a16="http://schemas.microsoft.com/office/drawing/2014/main" id="{CDC3E7B6-57CD-488F-B8EF-FEAA1641135F}"/>
+              </a:ext>
+            </a:extLst>
+          </p:cNvPr>
+          <p:cNvSpPr txBox="1"/>
+          <p:nvPr/>
+        </p:nvSpPr>
+        <p:spPr>
+          <a:xfrm>
+            <a:off x="5151776" y="5283655"/>
+            <a:ext cx="3300840" cy="307777"/>
+          </a:xfrm>
+          <a:prstGeom prst="rect">
             <a:avLst/>
           </a:prstGeom>
-          <a:ln w="19050">
-            <a:tailEnd type="triangle"/>
+          <a:noFill/>
+          <a:ln w="12700">
+            <a:noFill/>
           </a:ln>
+        </p:spPr>
+        <p:txBody>
+          <a:bodyPr wrap="none" rtlCol="0">
+            <a:spAutoFit/>
+          </a:bodyPr>
+          <a:lstStyle/>
+          <a:p>
+            <a:r>
+              <a:rPr lang="en-US" sz="1400" dirty="0"/>
+              <a:t>Bi-directional communication with Device</a:t>
+            </a:r>
+          </a:p>
+        </p:txBody>
+      </p:sp>
+      <p:cxnSp>
+        <p:nvCxnSpPr>
+          <p:cNvPr id="98" name="Straight Connector 97">
+            <a:extLst>
+              <a:ext uri="{FF2B5EF4-FFF2-40B4-BE49-F238E27FC236}">
+                <a16:creationId xmlns:a16="http://schemas.microsoft.com/office/drawing/2014/main" id="{A31FC459-FD9F-4D04-81D2-50FA92D78FB9}"/>
+              </a:ext>
+            </a:extLst>
+          </p:cNvPr>
+          <p:cNvCxnSpPr/>
+          <p:nvPr/>
+        </p:nvCxnSpPr>
+        <p:spPr>
+          <a:xfrm>
+            <a:off x="2034649" y="232965"/>
+            <a:ext cx="0" cy="6468176"/>
+          </a:xfrm>
+          <a:prstGeom prst="line">
+            <a:avLst/>
+          </a:prstGeom>
         </p:spPr>
         <p:style>
           <a:lnRef idx="1">
@@ -3916,695 +4085,10 @@
       </p:cxnSp>
       <p:cxnSp>
         <p:nvCxnSpPr>
-          <p:cNvPr id="8" name="Straight Arrow Connector 7">
-            <a:extLst>
-              <a:ext uri="{FF2B5EF4-FFF2-40B4-BE49-F238E27FC236}">
-                <a16:creationId xmlns:a16="http://schemas.microsoft.com/office/drawing/2014/main" id="{B7389F42-B91A-4C81-A109-40E3ED5895E8}"/>
-              </a:ext>
-            </a:extLst>
-          </p:cNvPr>
-          <p:cNvCxnSpPr>
-            <a:cxnSpLocks/>
-          </p:cNvCxnSpPr>
-          <p:nvPr/>
-        </p:nvCxnSpPr>
-        <p:spPr>
-          <a:xfrm flipV="1">
-            <a:off x="1395497" y="3449053"/>
-            <a:ext cx="1285930" cy="21130"/>
-          </a:xfrm>
-          <a:prstGeom prst="straightConnector1">
-            <a:avLst/>
-          </a:prstGeom>
-          <a:ln w="19050">
-            <a:tailEnd type="triangle"/>
-          </a:ln>
-        </p:spPr>
-        <p:style>
-          <a:lnRef idx="1">
-            <a:schemeClr val="accent1"/>
-          </a:lnRef>
-          <a:fillRef idx="0">
-            <a:schemeClr val="accent1"/>
-          </a:fillRef>
-          <a:effectRef idx="0">
-            <a:schemeClr val="accent1"/>
-          </a:effectRef>
-          <a:fontRef idx="minor">
-            <a:schemeClr val="tx1"/>
-          </a:fontRef>
-        </p:style>
-      </p:cxnSp>
-      <p:cxnSp>
-        <p:nvCxnSpPr>
-          <p:cNvPr id="12" name="Straight Arrow Connector 11">
-            <a:extLst>
-              <a:ext uri="{FF2B5EF4-FFF2-40B4-BE49-F238E27FC236}">
-                <a16:creationId xmlns:a16="http://schemas.microsoft.com/office/drawing/2014/main" id="{AA9019AB-A833-44A8-80DC-BB30B3700F69}"/>
-              </a:ext>
-            </a:extLst>
-          </p:cNvPr>
-          <p:cNvCxnSpPr>
-            <a:cxnSpLocks/>
-          </p:cNvCxnSpPr>
-          <p:nvPr/>
-        </p:nvCxnSpPr>
-        <p:spPr>
-          <a:xfrm flipV="1">
-            <a:off x="1513832" y="2992772"/>
-            <a:ext cx="1167594" cy="436228"/>
-          </a:xfrm>
-          <a:prstGeom prst="straightConnector1">
-            <a:avLst/>
-          </a:prstGeom>
-          <a:ln w="19050">
-            <a:tailEnd type="triangle"/>
-          </a:ln>
-        </p:spPr>
-        <p:style>
-          <a:lnRef idx="1">
-            <a:schemeClr val="accent1"/>
-          </a:lnRef>
-          <a:fillRef idx="0">
-            <a:schemeClr val="accent1"/>
-          </a:fillRef>
-          <a:effectRef idx="0">
-            <a:schemeClr val="accent1"/>
-          </a:effectRef>
-          <a:fontRef idx="minor">
-            <a:schemeClr val="tx1"/>
-          </a:fontRef>
-        </p:style>
-      </p:cxnSp>
-      <p:cxnSp>
-        <p:nvCxnSpPr>
-          <p:cNvPr id="15" name="Straight Arrow Connector 14">
-            <a:extLst>
-              <a:ext uri="{FF2B5EF4-FFF2-40B4-BE49-F238E27FC236}">
-                <a16:creationId xmlns:a16="http://schemas.microsoft.com/office/drawing/2014/main" id="{FE4F4ADC-DB12-4274-9319-0633A1C57511}"/>
-              </a:ext>
-            </a:extLst>
-          </p:cNvPr>
-          <p:cNvCxnSpPr>
-            <a:cxnSpLocks/>
-          </p:cNvCxnSpPr>
-          <p:nvPr/>
-        </p:nvCxnSpPr>
-        <p:spPr>
-          <a:xfrm>
-            <a:off x="1513832" y="3429000"/>
-            <a:ext cx="1167594" cy="518593"/>
-          </a:xfrm>
-          <a:prstGeom prst="straightConnector1">
-            <a:avLst/>
-          </a:prstGeom>
-          <a:ln w="19050">
-            <a:tailEnd type="triangle"/>
-          </a:ln>
-        </p:spPr>
-        <p:style>
-          <a:lnRef idx="1">
-            <a:schemeClr val="accent1"/>
-          </a:lnRef>
-          <a:fillRef idx="0">
-            <a:schemeClr val="accent1"/>
-          </a:fillRef>
-          <a:effectRef idx="0">
-            <a:schemeClr val="accent1"/>
-          </a:effectRef>
-          <a:fontRef idx="minor">
-            <a:schemeClr val="tx1"/>
-          </a:fontRef>
-        </p:style>
-      </p:cxnSp>
-      <p:cxnSp>
-        <p:nvCxnSpPr>
-          <p:cNvPr id="18" name="Straight Arrow Connector 17">
-            <a:extLst>
-              <a:ext uri="{FF2B5EF4-FFF2-40B4-BE49-F238E27FC236}">
-                <a16:creationId xmlns:a16="http://schemas.microsoft.com/office/drawing/2014/main" id="{C7CEC8BC-E972-4384-B03A-0CD63769795C}"/>
-              </a:ext>
-            </a:extLst>
-          </p:cNvPr>
-          <p:cNvCxnSpPr>
-            <a:cxnSpLocks/>
-          </p:cNvCxnSpPr>
-          <p:nvPr/>
-        </p:nvCxnSpPr>
-        <p:spPr>
-          <a:xfrm>
-            <a:off x="1513832" y="3429000"/>
-            <a:ext cx="1167594" cy="976745"/>
-          </a:xfrm>
-          <a:prstGeom prst="straightConnector1">
-            <a:avLst/>
-          </a:prstGeom>
-          <a:ln w="19050">
-            <a:tailEnd type="triangle"/>
-          </a:ln>
-        </p:spPr>
-        <p:style>
-          <a:lnRef idx="1">
-            <a:schemeClr val="accent1"/>
-          </a:lnRef>
-          <a:fillRef idx="0">
-            <a:schemeClr val="accent1"/>
-          </a:fillRef>
-          <a:effectRef idx="0">
-            <a:schemeClr val="accent1"/>
-          </a:effectRef>
-          <a:fontRef idx="minor">
-            <a:schemeClr val="tx1"/>
-          </a:fontRef>
-        </p:style>
-      </p:cxnSp>
-      <p:pic>
-        <p:nvPicPr>
-          <p:cNvPr id="24" name="Picture 23">
-            <a:extLst>
-              <a:ext uri="{FF2B5EF4-FFF2-40B4-BE49-F238E27FC236}">
-                <a16:creationId xmlns:a16="http://schemas.microsoft.com/office/drawing/2014/main" id="{5BB752C6-9044-4217-B80E-5DBDABBE5147}"/>
-              </a:ext>
-            </a:extLst>
-          </p:cNvPr>
-          <p:cNvPicPr>
-            <a:picLocks noChangeAspect="1"/>
-          </p:cNvPicPr>
-          <p:nvPr/>
-        </p:nvPicPr>
-        <p:blipFill>
-          <a:blip r:embed="rId2"/>
-          <a:stretch>
-            <a:fillRect/>
-          </a:stretch>
-        </p:blipFill>
-        <p:spPr>
-          <a:xfrm>
-            <a:off x="3111501" y="2043575"/>
-            <a:ext cx="918577" cy="949197"/>
-          </a:xfrm>
-          <a:prstGeom prst="rect">
-            <a:avLst/>
-          </a:prstGeom>
-          <a:ln w="12700">
-            <a:solidFill>
-              <a:schemeClr val="tx1"/>
-            </a:solidFill>
-          </a:ln>
-        </p:spPr>
-      </p:pic>
-      <p:pic>
-        <p:nvPicPr>
-          <p:cNvPr id="46" name="Picture 45">
-            <a:extLst>
-              <a:ext uri="{FF2B5EF4-FFF2-40B4-BE49-F238E27FC236}">
-                <a16:creationId xmlns:a16="http://schemas.microsoft.com/office/drawing/2014/main" id="{E08A8F1F-6FEC-4AC9-ABEA-AC6BFA30D146}"/>
-              </a:ext>
-            </a:extLst>
-          </p:cNvPr>
-          <p:cNvPicPr>
-            <a:picLocks noChangeAspect="1"/>
-          </p:cNvPicPr>
-          <p:nvPr/>
-        </p:nvPicPr>
-        <p:blipFill>
-          <a:blip r:embed="rId3">
-            <a:extLst>
-              <a:ext uri="{28A0092B-C50C-407E-A947-70E740481C1C}">
-                <a14:useLocalDpi xmlns:a14="http://schemas.microsoft.com/office/drawing/2010/main" val="0"/>
-              </a:ext>
-            </a:extLst>
-          </a:blip>
-          <a:stretch>
-            <a:fillRect/>
-          </a:stretch>
-        </p:blipFill>
-        <p:spPr>
-          <a:xfrm>
-            <a:off x="10845044" y="3070326"/>
-            <a:ext cx="799711" cy="799711"/>
-          </a:xfrm>
-          <a:prstGeom prst="rect">
-            <a:avLst/>
-          </a:prstGeom>
-          <a:ln w="12700">
-            <a:solidFill>
-              <a:schemeClr val="tx1"/>
-            </a:solidFill>
-          </a:ln>
-        </p:spPr>
-      </p:pic>
-      <p:cxnSp>
-        <p:nvCxnSpPr>
-          <p:cNvPr id="47" name="Straight Arrow Connector 46">
-            <a:extLst>
-              <a:ext uri="{FF2B5EF4-FFF2-40B4-BE49-F238E27FC236}">
-                <a16:creationId xmlns:a16="http://schemas.microsoft.com/office/drawing/2014/main" id="{0F47F04B-F24D-4B4F-AACC-79A9D94D4E20}"/>
-              </a:ext>
-            </a:extLst>
-          </p:cNvPr>
-          <p:cNvCxnSpPr>
-            <a:cxnSpLocks/>
-            <a:endCxn id="46" idx="1"/>
-          </p:cNvCxnSpPr>
-          <p:nvPr/>
-        </p:nvCxnSpPr>
-        <p:spPr>
-          <a:xfrm>
-            <a:off x="9440658" y="2615698"/>
-            <a:ext cx="1404386" cy="854484"/>
-          </a:xfrm>
-          <a:prstGeom prst="straightConnector1">
-            <a:avLst/>
-          </a:prstGeom>
-          <a:ln w="19050">
-            <a:tailEnd type="triangle"/>
-          </a:ln>
-        </p:spPr>
-        <p:style>
-          <a:lnRef idx="1">
-            <a:schemeClr val="accent1"/>
-          </a:lnRef>
-          <a:fillRef idx="0">
-            <a:schemeClr val="accent1"/>
-          </a:fillRef>
-          <a:effectRef idx="0">
-            <a:schemeClr val="accent1"/>
-          </a:effectRef>
-          <a:fontRef idx="minor">
-            <a:schemeClr val="tx1"/>
-          </a:fontRef>
-        </p:style>
-      </p:cxnSp>
-      <p:sp>
-        <p:nvSpPr>
-          <p:cNvPr id="57" name="Arrow: Right 56">
-            <a:extLst>
-              <a:ext uri="{FF2B5EF4-FFF2-40B4-BE49-F238E27FC236}">
-                <a16:creationId xmlns:a16="http://schemas.microsoft.com/office/drawing/2014/main" id="{AAA644A3-6DFB-47CC-9C7C-6B40FDA1A791}"/>
-              </a:ext>
-            </a:extLst>
-          </p:cNvPr>
-          <p:cNvSpPr/>
-          <p:nvPr/>
-        </p:nvSpPr>
-        <p:spPr>
-          <a:xfrm>
-            <a:off x="4212766" y="3184374"/>
-            <a:ext cx="1589817" cy="603848"/>
-          </a:xfrm>
-          <a:prstGeom prst="rightArrow">
-            <a:avLst/>
-          </a:prstGeom>
-          <a:solidFill>
-            <a:schemeClr val="accent4"/>
-          </a:solidFill>
-          <a:ln w="9525"/>
-        </p:spPr>
-        <p:style>
-          <a:lnRef idx="2">
-            <a:schemeClr val="accent2">
-              <a:shade val="50000"/>
-            </a:schemeClr>
-          </a:lnRef>
-          <a:fillRef idx="1">
-            <a:schemeClr val="accent2"/>
-          </a:fillRef>
-          <a:effectRef idx="0">
-            <a:schemeClr val="accent2"/>
-          </a:effectRef>
-          <a:fontRef idx="minor">
-            <a:schemeClr val="lt1"/>
-          </a:fontRef>
-        </p:style>
-        <p:txBody>
-          <a:bodyPr rtlCol="0" anchor="ctr"/>
-          <a:lstStyle/>
-          <a:p>
-            <a:pPr algn="ctr"/>
-            <a:endParaRPr lang="en-US" dirty="0"/>
-          </a:p>
-        </p:txBody>
-      </p:sp>
-      <p:cxnSp>
-        <p:nvCxnSpPr>
-          <p:cNvPr id="63" name="Straight Arrow Connector 62">
-            <a:extLst>
-              <a:ext uri="{FF2B5EF4-FFF2-40B4-BE49-F238E27FC236}">
-                <a16:creationId xmlns:a16="http://schemas.microsoft.com/office/drawing/2014/main" id="{44B0D219-4FEA-4963-92DF-52265902BB8D}"/>
-              </a:ext>
-            </a:extLst>
-          </p:cNvPr>
-          <p:cNvCxnSpPr>
-            <a:cxnSpLocks/>
-            <a:stCxn id="57" idx="1"/>
-          </p:cNvCxnSpPr>
-          <p:nvPr/>
-        </p:nvCxnSpPr>
-        <p:spPr>
-          <a:xfrm>
-            <a:off x="4212766" y="3486298"/>
-            <a:ext cx="1350566" cy="0"/>
-          </a:xfrm>
-          <a:prstGeom prst="straightConnector1">
-            <a:avLst/>
-          </a:prstGeom>
-          <a:ln w="12700">
-            <a:tailEnd type="triangle"/>
-          </a:ln>
-        </p:spPr>
-        <p:style>
-          <a:lnRef idx="1">
-            <a:schemeClr val="accent1"/>
-          </a:lnRef>
-          <a:fillRef idx="0">
-            <a:schemeClr val="accent1"/>
-          </a:fillRef>
-          <a:effectRef idx="0">
-            <a:schemeClr val="accent1"/>
-          </a:effectRef>
-          <a:fontRef idx="minor">
-            <a:schemeClr val="tx1"/>
-          </a:fontRef>
-        </p:style>
-      </p:cxnSp>
-      <p:cxnSp>
-        <p:nvCxnSpPr>
-          <p:cNvPr id="66" name="Straight Arrow Connector 65">
-            <a:extLst>
-              <a:ext uri="{FF2B5EF4-FFF2-40B4-BE49-F238E27FC236}">
-                <a16:creationId xmlns:a16="http://schemas.microsoft.com/office/drawing/2014/main" id="{A3FF7C00-1773-4E63-89A9-55EF270B28FD}"/>
-              </a:ext>
-            </a:extLst>
-          </p:cNvPr>
-          <p:cNvCxnSpPr>
-            <a:cxnSpLocks/>
-          </p:cNvCxnSpPr>
-          <p:nvPr/>
-        </p:nvCxnSpPr>
-        <p:spPr>
-          <a:xfrm>
-            <a:off x="4212766" y="3566508"/>
-            <a:ext cx="1350566" cy="0"/>
-          </a:xfrm>
-          <a:prstGeom prst="straightConnector1">
-            <a:avLst/>
-          </a:prstGeom>
-          <a:ln w="12700">
-            <a:tailEnd type="triangle"/>
-          </a:ln>
-        </p:spPr>
-        <p:style>
-          <a:lnRef idx="1">
-            <a:schemeClr val="accent1"/>
-          </a:lnRef>
-          <a:fillRef idx="0">
-            <a:schemeClr val="accent1"/>
-          </a:fillRef>
-          <a:effectRef idx="0">
-            <a:schemeClr val="accent1"/>
-          </a:effectRef>
-          <a:fontRef idx="minor">
-            <a:schemeClr val="tx1"/>
-          </a:fontRef>
-        </p:style>
-      </p:cxnSp>
-      <p:cxnSp>
-        <p:nvCxnSpPr>
-          <p:cNvPr id="67" name="Straight Arrow Connector 66">
-            <a:extLst>
-              <a:ext uri="{FF2B5EF4-FFF2-40B4-BE49-F238E27FC236}">
-                <a16:creationId xmlns:a16="http://schemas.microsoft.com/office/drawing/2014/main" id="{E7926E34-5699-4643-BA3A-09338B7326F3}"/>
-              </a:ext>
-            </a:extLst>
-          </p:cNvPr>
-          <p:cNvCxnSpPr>
-            <a:cxnSpLocks/>
-          </p:cNvCxnSpPr>
-          <p:nvPr/>
-        </p:nvCxnSpPr>
-        <p:spPr>
-          <a:xfrm>
-            <a:off x="4212766" y="3407049"/>
-            <a:ext cx="1350566" cy="0"/>
-          </a:xfrm>
-          <a:prstGeom prst="straightConnector1">
-            <a:avLst/>
-          </a:prstGeom>
-          <a:ln w="12700">
-            <a:tailEnd type="triangle"/>
-          </a:ln>
-        </p:spPr>
-        <p:style>
-          <a:lnRef idx="1">
-            <a:schemeClr val="accent1"/>
-          </a:lnRef>
-          <a:fillRef idx="0">
-            <a:schemeClr val="accent1"/>
-          </a:fillRef>
-          <a:effectRef idx="0">
-            <a:schemeClr val="accent1"/>
-          </a:effectRef>
-          <a:fontRef idx="minor">
-            <a:schemeClr val="tx1"/>
-          </a:fontRef>
-        </p:style>
-      </p:cxnSp>
-      <p:sp>
-        <p:nvSpPr>
-          <p:cNvPr id="69" name="Arrow: Right 68">
-            <a:extLst>
-              <a:ext uri="{FF2B5EF4-FFF2-40B4-BE49-F238E27FC236}">
-                <a16:creationId xmlns:a16="http://schemas.microsoft.com/office/drawing/2014/main" id="{B61E8C98-1548-4770-9644-8F408B898FE2}"/>
-              </a:ext>
-            </a:extLst>
-          </p:cNvPr>
-          <p:cNvSpPr/>
-          <p:nvPr/>
-        </p:nvSpPr>
-        <p:spPr>
-          <a:xfrm rot="20074028">
-            <a:off x="6890872" y="2810196"/>
-            <a:ext cx="1465467" cy="304819"/>
-          </a:xfrm>
-          <a:prstGeom prst="rightArrow">
-            <a:avLst/>
-          </a:prstGeom>
-          <a:solidFill>
-            <a:srgbClr val="FFC000"/>
-          </a:solidFill>
-          <a:ln w="9525"/>
-        </p:spPr>
-        <p:style>
-          <a:lnRef idx="2">
-            <a:schemeClr val="accent2">
-              <a:shade val="50000"/>
-            </a:schemeClr>
-          </a:lnRef>
-          <a:fillRef idx="1">
-            <a:schemeClr val="accent2"/>
-          </a:fillRef>
-          <a:effectRef idx="0">
-            <a:schemeClr val="accent2"/>
-          </a:effectRef>
-          <a:fontRef idx="minor">
-            <a:schemeClr val="lt1"/>
-          </a:fontRef>
-        </p:style>
-        <p:txBody>
-          <a:bodyPr rtlCol="0" anchor="ctr"/>
-          <a:lstStyle/>
-          <a:p>
-            <a:pPr algn="ctr"/>
-            <a:endParaRPr lang="en-US" dirty="0">
-              <a:solidFill>
-                <a:srgbClr val="92D050"/>
-              </a:solidFill>
-            </a:endParaRPr>
-          </a:p>
-        </p:txBody>
-      </p:sp>
-      <p:cxnSp>
-        <p:nvCxnSpPr>
-          <p:cNvPr id="87" name="Connector: Elbow 86">
-            <a:extLst>
-              <a:ext uri="{FF2B5EF4-FFF2-40B4-BE49-F238E27FC236}">
-                <a16:creationId xmlns:a16="http://schemas.microsoft.com/office/drawing/2014/main" id="{52743566-315B-4300-878F-C369AA598513}"/>
-              </a:ext>
-            </a:extLst>
-          </p:cNvPr>
-          <p:cNvCxnSpPr>
-            <a:cxnSpLocks/>
-            <a:stCxn id="46" idx="2"/>
-          </p:cNvCxnSpPr>
-          <p:nvPr/>
-        </p:nvCxnSpPr>
-        <p:spPr>
-          <a:xfrm rot="5400000">
-            <a:off x="6450229" y="447384"/>
-            <a:ext cx="1372019" cy="8217325"/>
-          </a:xfrm>
-          <a:prstGeom prst="bentConnector2">
-            <a:avLst/>
-          </a:prstGeom>
-          <a:ln w="19050">
-            <a:tailEnd type="triangle"/>
-          </a:ln>
-        </p:spPr>
-        <p:style>
-          <a:lnRef idx="1">
-            <a:schemeClr val="accent1"/>
-          </a:lnRef>
-          <a:fillRef idx="0">
-            <a:schemeClr val="accent1"/>
-          </a:fillRef>
-          <a:effectRef idx="0">
-            <a:schemeClr val="accent1"/>
-          </a:effectRef>
-          <a:fontRef idx="minor">
-            <a:schemeClr val="tx1"/>
-          </a:fontRef>
-        </p:style>
-      </p:cxnSp>
-      <p:sp>
-        <p:nvSpPr>
-          <p:cNvPr id="91" name="Arrow: Right 90">
-            <a:extLst>
-              <a:ext uri="{FF2B5EF4-FFF2-40B4-BE49-F238E27FC236}">
-                <a16:creationId xmlns:a16="http://schemas.microsoft.com/office/drawing/2014/main" id="{4DD817F5-17DC-47DC-9440-62BD78956D00}"/>
-              </a:ext>
-            </a:extLst>
-          </p:cNvPr>
-          <p:cNvSpPr/>
-          <p:nvPr/>
-        </p:nvSpPr>
-        <p:spPr>
-          <a:xfrm rot="912713">
-            <a:off x="6951920" y="3517880"/>
-            <a:ext cx="1343367" cy="285121"/>
-          </a:xfrm>
-          <a:prstGeom prst="rightArrow">
-            <a:avLst/>
-          </a:prstGeom>
-          <a:solidFill>
-            <a:srgbClr val="FFC000"/>
-          </a:solidFill>
-          <a:ln w="9525"/>
-        </p:spPr>
-        <p:style>
-          <a:lnRef idx="2">
-            <a:schemeClr val="accent2">
-              <a:shade val="50000"/>
-            </a:schemeClr>
-          </a:lnRef>
-          <a:fillRef idx="1">
-            <a:schemeClr val="accent2"/>
-          </a:fillRef>
-          <a:effectRef idx="0">
-            <a:schemeClr val="accent2"/>
-          </a:effectRef>
-          <a:fontRef idx="minor">
-            <a:schemeClr val="lt1"/>
-          </a:fontRef>
-        </p:style>
-        <p:txBody>
-          <a:bodyPr rtlCol="0" anchor="ctr"/>
-          <a:lstStyle/>
-          <a:p>
-            <a:pPr algn="ctr"/>
-            <a:endParaRPr lang="en-US" dirty="0">
-              <a:solidFill>
-                <a:srgbClr val="92D050"/>
-              </a:solidFill>
-            </a:endParaRPr>
-          </a:p>
-        </p:txBody>
-      </p:sp>
-      <p:sp>
-        <p:nvSpPr>
-          <p:cNvPr id="93" name="TextBox 92">
-            <a:extLst>
-              <a:ext uri="{FF2B5EF4-FFF2-40B4-BE49-F238E27FC236}">
-                <a16:creationId xmlns:a16="http://schemas.microsoft.com/office/drawing/2014/main" id="{CDC3E7B6-57CD-488F-B8EF-FEAA1641135F}"/>
-              </a:ext>
-            </a:extLst>
-          </p:cNvPr>
-          <p:cNvSpPr txBox="1"/>
-          <p:nvPr/>
-        </p:nvSpPr>
-        <p:spPr>
-          <a:xfrm>
-            <a:off x="5151776" y="5283655"/>
-            <a:ext cx="3300840" cy="307777"/>
-          </a:xfrm>
-          <a:prstGeom prst="rect">
-            <a:avLst/>
-          </a:prstGeom>
-          <a:noFill/>
-          <a:ln w="12700">
-            <a:noFill/>
-          </a:ln>
-        </p:spPr>
-        <p:txBody>
-          <a:bodyPr wrap="none" rtlCol="0">
-            <a:spAutoFit/>
-          </a:bodyPr>
-          <a:lstStyle/>
-          <a:p>
-            <a:r>
-              <a:rPr lang="en-US" sz="1400" dirty="0"/>
-              <a:t>Bi-directional communication with Device</a:t>
-            </a:r>
-          </a:p>
-        </p:txBody>
-      </p:sp>
-      <p:cxnSp>
-        <p:nvCxnSpPr>
-          <p:cNvPr id="95" name="Connector: Elbow 94">
-            <a:extLst>
-              <a:ext uri="{FF2B5EF4-FFF2-40B4-BE49-F238E27FC236}">
-                <a16:creationId xmlns:a16="http://schemas.microsoft.com/office/drawing/2014/main" id="{3D6A02E7-01B7-40EC-B38F-2B2B57B8F6A4}"/>
-              </a:ext>
-            </a:extLst>
-          </p:cNvPr>
-          <p:cNvCxnSpPr>
-            <a:cxnSpLocks/>
-          </p:cNvCxnSpPr>
-          <p:nvPr/>
-        </p:nvCxnSpPr>
-        <p:spPr>
-          <a:xfrm rot="10800000">
-            <a:off x="1098508" y="3761449"/>
-            <a:ext cx="1697684" cy="1480609"/>
-          </a:xfrm>
-          <a:prstGeom prst="bentConnector2">
-            <a:avLst/>
-          </a:prstGeom>
-          <a:ln w="19050">
-            <a:tailEnd type="triangle"/>
-          </a:ln>
-        </p:spPr>
-        <p:style>
-          <a:lnRef idx="1">
-            <a:schemeClr val="accent1"/>
-          </a:lnRef>
-          <a:fillRef idx="0">
-            <a:schemeClr val="accent1"/>
-          </a:fillRef>
-          <a:effectRef idx="0">
-            <a:schemeClr val="accent1"/>
-          </a:effectRef>
-          <a:fontRef idx="minor">
-            <a:schemeClr val="tx1"/>
-          </a:fontRef>
-        </p:style>
-      </p:cxnSp>
-      <p:cxnSp>
-        <p:nvCxnSpPr>
-          <p:cNvPr id="98" name="Straight Connector 97">
-            <a:extLst>
-              <a:ext uri="{FF2B5EF4-FFF2-40B4-BE49-F238E27FC236}">
-                <a16:creationId xmlns:a16="http://schemas.microsoft.com/office/drawing/2014/main" id="{A31FC459-FD9F-4D04-81D2-50FA92D78FB9}"/>
+          <p:cNvPr id="101" name="Straight Connector 100">
+            <a:extLst>
+              <a:ext uri="{FF2B5EF4-FFF2-40B4-BE49-F238E27FC236}">
+                <a16:creationId xmlns:a16="http://schemas.microsoft.com/office/drawing/2014/main" id="{C0850B3F-4BC1-4479-AC3A-AE932769E9E7}"/>
               </a:ext>
             </a:extLst>
           </p:cNvPr>
@@ -4613,90 +4097,7 @@
         </p:nvCxnSpPr>
         <p:spPr>
           <a:xfrm>
-            <a:off x="2034649" y="232965"/>
-            <a:ext cx="0" cy="6468176"/>
-          </a:xfrm>
-          <a:prstGeom prst="line">
-            <a:avLst/>
-          </a:prstGeom>
-        </p:spPr>
-        <p:style>
-          <a:lnRef idx="1">
-            <a:schemeClr val="accent1"/>
-          </a:lnRef>
-          <a:fillRef idx="0">
-            <a:schemeClr val="accent1"/>
-          </a:fillRef>
-          <a:effectRef idx="0">
-            <a:schemeClr val="accent1"/>
-          </a:effectRef>
-          <a:fontRef idx="minor">
-            <a:schemeClr val="tx1"/>
-          </a:fontRef>
-        </p:style>
-      </p:cxnSp>
-      <p:sp>
-        <p:nvSpPr>
-          <p:cNvPr id="100" name="Oval 99">
-            <a:extLst>
-              <a:ext uri="{FF2B5EF4-FFF2-40B4-BE49-F238E27FC236}">
-                <a16:creationId xmlns:a16="http://schemas.microsoft.com/office/drawing/2014/main" id="{97C76C57-6366-435E-8B81-E14A16DD6972}"/>
-              </a:ext>
-            </a:extLst>
-          </p:cNvPr>
-          <p:cNvSpPr/>
-          <p:nvPr/>
-        </p:nvSpPr>
-        <p:spPr>
-          <a:xfrm>
-            <a:off x="2747341" y="5057388"/>
-            <a:ext cx="304723" cy="369332"/>
-          </a:xfrm>
-          <a:prstGeom prst="ellipse">
-            <a:avLst/>
-          </a:prstGeom>
-          <a:ln w="12700"/>
-        </p:spPr>
-        <p:style>
-          <a:lnRef idx="2">
-            <a:schemeClr val="accent1">
-              <a:shade val="50000"/>
-            </a:schemeClr>
-          </a:lnRef>
-          <a:fillRef idx="1">
-            <a:schemeClr val="accent1"/>
-          </a:fillRef>
-          <a:effectRef idx="0">
-            <a:schemeClr val="accent1"/>
-          </a:effectRef>
-          <a:fontRef idx="minor">
-            <a:schemeClr val="lt1"/>
-          </a:fontRef>
-        </p:style>
-        <p:txBody>
-          <a:bodyPr rtlCol="0" anchor="ctr"/>
-          <a:lstStyle/>
-          <a:p>
-            <a:pPr algn="ctr"/>
-            <a:endParaRPr lang="en-US"/>
-          </a:p>
-        </p:txBody>
-      </p:sp>
-      <p:cxnSp>
-        <p:nvCxnSpPr>
-          <p:cNvPr id="101" name="Straight Connector 100">
-            <a:extLst>
-              <a:ext uri="{FF2B5EF4-FFF2-40B4-BE49-F238E27FC236}">
-                <a16:creationId xmlns:a16="http://schemas.microsoft.com/office/drawing/2014/main" id="{C0850B3F-4BC1-4479-AC3A-AE932769E9E7}"/>
-              </a:ext>
-            </a:extLst>
-          </p:cNvPr>
-          <p:cNvCxnSpPr/>
-          <p:nvPr/>
-        </p:nvCxnSpPr>
-        <p:spPr>
-          <a:xfrm>
-            <a:off x="10330022" y="180832"/>
+            <a:off x="10025222" y="242109"/>
             <a:ext cx="0" cy="6468176"/>
           </a:xfrm>
           <a:prstGeom prst="line">
@@ -4742,7 +4143,7 @@
               <a:gd name="adj1" fmla="val 41072391"/>
             </a:avLst>
           </a:prstGeom>
-          <a:ln w="19050">
+          <a:ln w="28575">
             <a:tailEnd type="triangle"/>
           </a:ln>
         </p:spPr>
@@ -4763,10 +4164,10 @@
       </p:cxnSp>
       <p:sp>
         <p:nvSpPr>
-          <p:cNvPr id="109" name="Oval 108">
-            <a:extLst>
-              <a:ext uri="{FF2B5EF4-FFF2-40B4-BE49-F238E27FC236}">
-                <a16:creationId xmlns:a16="http://schemas.microsoft.com/office/drawing/2014/main" id="{328C3762-D809-41DA-B58B-427C45D42F98}"/>
+          <p:cNvPr id="111" name="Rectangle 110">
+            <a:extLst>
+              <a:ext uri="{FF2B5EF4-FFF2-40B4-BE49-F238E27FC236}">
+                <a16:creationId xmlns:a16="http://schemas.microsoft.com/office/drawing/2014/main" id="{02D0B8AB-2571-455B-839D-8A89813913A1}"/>
               </a:ext>
             </a:extLst>
           </p:cNvPr>
@@ -4775,13 +4176,18 @@
         </p:nvSpPr>
         <p:spPr>
           <a:xfrm>
-            <a:off x="3952704" y="5483038"/>
-            <a:ext cx="304723" cy="369332"/>
-          </a:xfrm>
-          <a:prstGeom prst="ellipse">
+            <a:off x="10405293" y="503005"/>
+            <a:ext cx="1647809" cy="850625"/>
+          </a:xfrm>
+          <a:prstGeom prst="rect">
             <a:avLst/>
           </a:prstGeom>
-          <a:ln w="12700"/>
+          <a:solidFill>
+            <a:srgbClr val="1DC4FF"/>
+          </a:solidFill>
+          <a:ln w="3175">
+            <a:noFill/>
+          </a:ln>
         </p:spPr>
         <p:style>
           <a:lnRef idx="2">
@@ -4800,20 +4206,28 @@
           </a:fontRef>
         </p:style>
         <p:txBody>
-          <a:bodyPr rtlCol="0" anchor="ctr"/>
+          <a:bodyPr rot="0" spcFirstLastPara="0" vertOverflow="overflow" horzOverflow="overflow" vert="horz" wrap="square" lIns="91440" tIns="45720" rIns="91440" bIns="45720" numCol="1" spcCol="0" rtlCol="0" fromWordArt="0" anchor="ctr" anchorCtr="0" forceAA="0" compatLnSpc="1">
+            <a:prstTxWarp prst="textNoShape">
+              <a:avLst/>
+            </a:prstTxWarp>
+            <a:noAutofit/>
+          </a:bodyPr>
           <a:lstStyle/>
           <a:p>
             <a:pPr algn="ctr"/>
-            <a:endParaRPr lang="en-US"/>
-          </a:p>
-        </p:txBody>
-      </p:sp>
-      <p:sp>
-        <p:nvSpPr>
-          <p:cNvPr id="111" name="Rectangle 110">
-            <a:extLst>
-              <a:ext uri="{FF2B5EF4-FFF2-40B4-BE49-F238E27FC236}">
-                <a16:creationId xmlns:a16="http://schemas.microsoft.com/office/drawing/2014/main" id="{02D0B8AB-2571-455B-839D-8A89813913A1}"/>
+            <a:r>
+              <a:rPr lang="en-US" sz="1600" dirty="0"/>
+              <a:t>Custom Authentication</a:t>
+            </a:r>
+          </a:p>
+        </p:txBody>
+      </p:sp>
+      <p:sp>
+        <p:nvSpPr>
+          <p:cNvPr id="121" name="Rectangle: Rounded Corners 120">
+            <a:extLst>
+              <a:ext uri="{FF2B5EF4-FFF2-40B4-BE49-F238E27FC236}">
+                <a16:creationId xmlns:a16="http://schemas.microsoft.com/office/drawing/2014/main" id="{2FF5CAEF-6B54-455A-BB02-926A4BF1314F}"/>
               </a:ext>
             </a:extLst>
           </p:cNvPr>
@@ -4822,18 +4236,20 @@
         </p:nvSpPr>
         <p:spPr>
           <a:xfrm>
-            <a:off x="7875934" y="499137"/>
-            <a:ext cx="1714312" cy="821792"/>
-          </a:xfrm>
-          <a:prstGeom prst="rect">
-            <a:avLst/>
+            <a:off x="266957" y="2821976"/>
+            <a:ext cx="1192240" cy="812089"/>
+          </a:xfrm>
+          <a:prstGeom prst="roundRect">
+            <a:avLst>
+              <a:gd name="adj" fmla="val 1172"/>
+            </a:avLst>
           </a:prstGeom>
           <a:solidFill>
-            <a:srgbClr val="00B0F0"/>
+            <a:schemeClr val="bg1"/>
           </a:solidFill>
-          <a:ln w="12700">
+          <a:ln w="3175">
             <a:solidFill>
-              <a:schemeClr val="tx1"/>
+              <a:srgbClr val="0070C0"/>
             </a:solidFill>
           </a:ln>
         </p:spPr>
@@ -4854,42 +4270,208 @@
           </a:fontRef>
         </p:style>
         <p:txBody>
-          <a:bodyPr rtlCol="0" anchor="ctr"/>
+          <a:bodyPr rot="0" spcFirstLastPara="0" vertOverflow="overflow" horzOverflow="overflow" vert="horz" wrap="square" lIns="91440" tIns="45720" rIns="91440" bIns="45720" numCol="1" spcCol="0" rtlCol="0" fromWordArt="0" anchor="ctr" anchorCtr="0" forceAA="0" compatLnSpc="1">
+            <a:prstTxWarp prst="textNoShape">
+              <a:avLst/>
+            </a:prstTxWarp>
+            <a:noAutofit/>
+          </a:bodyPr>
           <a:lstStyle/>
           <a:p>
             <a:pPr algn="ctr"/>
             <a:r>
-              <a:rPr lang="en-US" dirty="0"/>
-              <a:t>Azure Active Directory </a:t>
+              <a:rPr lang="en-US" sz="2000"/>
+              <a:t>Devices</a:t>
+            </a:r>
+          </a:p>
+        </p:txBody>
+      </p:sp>
+      <p:sp>
+        <p:nvSpPr>
+          <p:cNvPr id="122" name="Rectangle: Rounded Corners 121">
+            <a:extLst>
+              <a:ext uri="{FF2B5EF4-FFF2-40B4-BE49-F238E27FC236}">
+                <a16:creationId xmlns:a16="http://schemas.microsoft.com/office/drawing/2014/main" id="{B1E6391E-E996-4B92-AAE3-F2636030C83A}"/>
+              </a:ext>
+            </a:extLst>
+          </p:cNvPr>
+          <p:cNvSpPr/>
+          <p:nvPr/>
+        </p:nvSpPr>
+        <p:spPr>
+          <a:xfrm>
+            <a:off x="387622" y="2949360"/>
+            <a:ext cx="1192240" cy="812089"/>
+          </a:xfrm>
+          <a:prstGeom prst="roundRect">
+            <a:avLst>
+              <a:gd name="adj" fmla="val 4725"/>
+            </a:avLst>
+          </a:prstGeom>
+          <a:solidFill>
+            <a:srgbClr val="1DC4FF"/>
+          </a:solidFill>
+          <a:ln w="3175">
+            <a:noFill/>
+          </a:ln>
+        </p:spPr>
+        <p:style>
+          <a:lnRef idx="2">
+            <a:schemeClr val="accent1">
+              <a:shade val="50000"/>
+            </a:schemeClr>
+          </a:lnRef>
+          <a:fillRef idx="1">
+            <a:schemeClr val="accent1"/>
+          </a:fillRef>
+          <a:effectRef idx="0">
+            <a:schemeClr val="accent1"/>
+          </a:effectRef>
+          <a:fontRef idx="minor">
+            <a:schemeClr val="lt1"/>
+          </a:fontRef>
+        </p:style>
+        <p:txBody>
+          <a:bodyPr rot="0" spcFirstLastPara="0" vertOverflow="overflow" horzOverflow="overflow" vert="horz" wrap="square" lIns="91440" tIns="45720" rIns="91440" bIns="45720" numCol="1" spcCol="0" rtlCol="0" fromWordArt="0" anchor="ctr" anchorCtr="0" forceAA="0" compatLnSpc="1">
+            <a:prstTxWarp prst="textNoShape">
+              <a:avLst/>
+            </a:prstTxWarp>
+            <a:noAutofit/>
+          </a:bodyPr>
+          <a:lstStyle/>
+          <a:p>
+            <a:pPr algn="ctr"/>
+            <a:r>
+              <a:rPr lang="en-US" sz="1600" dirty="0"/>
+              <a:t>Devices</a:t>
+            </a:r>
+            <a:endParaRPr lang="en-US" sz="2000" dirty="0"/>
+          </a:p>
+        </p:txBody>
+      </p:sp>
+      <p:sp>
+        <p:nvSpPr>
+          <p:cNvPr id="136" name="Rectangle: Rounded Corners 135">
+            <a:extLst>
+              <a:ext uri="{FF2B5EF4-FFF2-40B4-BE49-F238E27FC236}">
+                <a16:creationId xmlns:a16="http://schemas.microsoft.com/office/drawing/2014/main" id="{F4D74433-E65A-4960-BD5E-FAD5E7DBA1D2}"/>
+              </a:ext>
+            </a:extLst>
+          </p:cNvPr>
+          <p:cNvSpPr/>
+          <p:nvPr/>
+        </p:nvSpPr>
+        <p:spPr>
+          <a:xfrm>
+            <a:off x="10386387" y="4143016"/>
+            <a:ext cx="1491469" cy="390620"/>
+          </a:xfrm>
+          <a:prstGeom prst="roundRect">
+            <a:avLst>
+              <a:gd name="adj" fmla="val 0"/>
+            </a:avLst>
+          </a:prstGeom>
+          <a:solidFill>
+            <a:srgbClr val="1DC4FF"/>
+          </a:solidFill>
+          <a:ln w="3175">
+            <a:noFill/>
+          </a:ln>
+        </p:spPr>
+        <p:style>
+          <a:lnRef idx="2">
+            <a:schemeClr val="accent1">
+              <a:shade val="50000"/>
+            </a:schemeClr>
+          </a:lnRef>
+          <a:fillRef idx="1">
+            <a:schemeClr val="accent1"/>
+          </a:fillRef>
+          <a:effectRef idx="0">
+            <a:schemeClr val="accent1"/>
+          </a:effectRef>
+          <a:fontRef idx="minor">
+            <a:schemeClr val="lt1"/>
+          </a:fontRef>
+        </p:style>
+        <p:txBody>
+          <a:bodyPr rot="0" spcFirstLastPara="0" vertOverflow="overflow" horzOverflow="overflow" vert="horz" wrap="square" lIns="91440" tIns="45720" rIns="91440" bIns="45720" numCol="1" spcCol="0" rtlCol="0" fromWordArt="0" anchor="ctr" anchorCtr="0" forceAA="0" compatLnSpc="1">
+            <a:prstTxWarp prst="textNoShape">
+              <a:avLst/>
+            </a:prstTxWarp>
+            <a:noAutofit/>
+          </a:bodyPr>
+          <a:lstStyle/>
+          <a:p>
+            <a:pPr algn="ctr"/>
+            <a:r>
+              <a:rPr lang="en-US" sz="1600" dirty="0"/>
+              <a:t>Web Portal</a:t>
             </a:r>
           </a:p>
         </p:txBody>
       </p:sp>
       <p:cxnSp>
         <p:nvCxnSpPr>
-          <p:cNvPr id="112" name="Straight Arrow Connector 111">
-            <a:extLst>
-              <a:ext uri="{FF2B5EF4-FFF2-40B4-BE49-F238E27FC236}">
-                <a16:creationId xmlns:a16="http://schemas.microsoft.com/office/drawing/2014/main" id="{B2778FE8-356E-4394-9B63-35AC18B86703}"/>
+          <p:cNvPr id="49" name="Straight Arrow Connector 48">
+            <a:extLst>
+              <a:ext uri="{FF2B5EF4-FFF2-40B4-BE49-F238E27FC236}">
+                <a16:creationId xmlns:a16="http://schemas.microsoft.com/office/drawing/2014/main" id="{FA2E3E5E-83EA-45EE-8A8C-DE5AE892F1E2}"/>
               </a:ext>
             </a:extLst>
           </p:cNvPr>
           <p:cNvCxnSpPr>
             <a:cxnSpLocks/>
-            <a:stCxn id="46" idx="0"/>
-            <a:endCxn id="111" idx="2"/>
           </p:cNvCxnSpPr>
           <p:nvPr/>
         </p:nvCxnSpPr>
         <p:spPr>
-          <a:xfrm flipH="1" flipV="1">
-            <a:off x="8733090" y="1320929"/>
-            <a:ext cx="2511810" cy="1749397"/>
+          <a:xfrm>
+            <a:off x="4136757" y="1767918"/>
+            <a:ext cx="1259272" cy="0"/>
           </a:xfrm>
           <a:prstGeom prst="straightConnector1">
             <a:avLst/>
           </a:prstGeom>
-          <a:ln w="19050">
+          <a:noFill/>
+          <a:ln w="28575" cap="flat" cmpd="sng" algn="ctr">
+            <a:solidFill>
+              <a:srgbClr val="0078D7"/>
+            </a:solidFill>
+            <a:prstDash val="solid"/>
+            <a:miter lim="800000"/>
+            <a:tailEnd type="triangle"/>
+          </a:ln>
+          <a:effectLst/>
+        </p:spPr>
+      </p:cxnSp>
+      <p:cxnSp>
+        <p:nvCxnSpPr>
+          <p:cNvPr id="51" name="Straight Arrow Connector 50">
+            <a:extLst>
+              <a:ext uri="{FF2B5EF4-FFF2-40B4-BE49-F238E27FC236}">
+                <a16:creationId xmlns:a16="http://schemas.microsoft.com/office/drawing/2014/main" id="{35713B75-6105-4FBC-BB2A-2F9F57306BC3}"/>
+              </a:ext>
+            </a:extLst>
+          </p:cNvPr>
+          <p:cNvCxnSpPr>
+            <a:cxnSpLocks/>
+          </p:cNvCxnSpPr>
+          <p:nvPr/>
+        </p:nvCxnSpPr>
+        <p:spPr>
+          <a:xfrm flipH="1">
+            <a:off x="1567603" y="2385081"/>
+            <a:ext cx="1101564" cy="926550"/>
+          </a:xfrm>
+          <a:prstGeom prst="straightConnector1">
+            <a:avLst/>
+          </a:prstGeom>
+          <a:ln w="28575">
+            <a:solidFill>
+              <a:srgbClr val="0078D7"/>
+            </a:solidFill>
+            <a:headEnd type="triangle"/>
             <a:tailEnd type="triangle"/>
           </a:ln>
         </p:spPr>
@@ -4910,27 +4492,32 @@
       </p:cxnSp>
       <p:cxnSp>
         <p:nvCxnSpPr>
-          <p:cNvPr id="115" name="Straight Arrow Connector 114">
-            <a:extLst>
-              <a:ext uri="{FF2B5EF4-FFF2-40B4-BE49-F238E27FC236}">
-                <a16:creationId xmlns:a16="http://schemas.microsoft.com/office/drawing/2014/main" id="{B92273D2-2E6F-42CE-A94A-51F4509E261D}"/>
+          <p:cNvPr id="52" name="Straight Arrow Connector 51">
+            <a:extLst>
+              <a:ext uri="{FF2B5EF4-FFF2-40B4-BE49-F238E27FC236}">
+                <a16:creationId xmlns:a16="http://schemas.microsoft.com/office/drawing/2014/main" id="{62333726-A98F-4F9E-9618-4CFCAEB5579B}"/>
               </a:ext>
             </a:extLst>
           </p:cNvPr>
           <p:cNvCxnSpPr>
             <a:cxnSpLocks/>
+            <a:endCxn id="122" idx="3"/>
           </p:cNvCxnSpPr>
           <p:nvPr/>
         </p:nvCxnSpPr>
         <p:spPr>
-          <a:xfrm>
-            <a:off x="8365004" y="1302924"/>
-            <a:ext cx="2655415" cy="1845011"/>
+          <a:xfrm flipH="1">
+            <a:off x="1579862" y="2856967"/>
+            <a:ext cx="1075654" cy="498438"/>
           </a:xfrm>
           <a:prstGeom prst="straightConnector1">
             <a:avLst/>
           </a:prstGeom>
-          <a:ln w="19050">
+          <a:ln w="28575">
+            <a:solidFill>
+              <a:srgbClr val="0078D7"/>
+            </a:solidFill>
+            <a:headEnd type="triangle"/>
             <a:tailEnd type="triangle"/>
           </a:ln>
         </p:spPr>
@@ -4949,12 +4536,327 @@
           </a:fontRef>
         </p:style>
       </p:cxnSp>
-      <p:sp>
-        <p:nvSpPr>
-          <p:cNvPr id="121" name="Rectangle: Rounded Corners 120">
-            <a:extLst>
-              <a:ext uri="{FF2B5EF4-FFF2-40B4-BE49-F238E27FC236}">
-                <a16:creationId xmlns:a16="http://schemas.microsoft.com/office/drawing/2014/main" id="{2FF5CAEF-6B54-455A-BB02-926A4BF1314F}"/>
+      <p:cxnSp>
+        <p:nvCxnSpPr>
+          <p:cNvPr id="55" name="Straight Arrow Connector 54">
+            <a:extLst>
+              <a:ext uri="{FF2B5EF4-FFF2-40B4-BE49-F238E27FC236}">
+                <a16:creationId xmlns:a16="http://schemas.microsoft.com/office/drawing/2014/main" id="{6138742A-604C-4F12-9603-A97DE10878F3}"/>
+              </a:ext>
+            </a:extLst>
+          </p:cNvPr>
+          <p:cNvCxnSpPr>
+            <a:cxnSpLocks/>
+            <a:endCxn id="122" idx="3"/>
+          </p:cNvCxnSpPr>
+          <p:nvPr/>
+        </p:nvCxnSpPr>
+        <p:spPr>
+          <a:xfrm flipH="1">
+            <a:off x="1579862" y="3355404"/>
+            <a:ext cx="1196320" cy="1"/>
+          </a:xfrm>
+          <a:prstGeom prst="straightConnector1">
+            <a:avLst/>
+          </a:prstGeom>
+          <a:ln w="28575">
+            <a:solidFill>
+              <a:srgbClr val="0078D7"/>
+            </a:solidFill>
+            <a:headEnd type="triangle"/>
+            <a:tailEnd type="triangle"/>
+          </a:ln>
+        </p:spPr>
+        <p:style>
+          <a:lnRef idx="1">
+            <a:schemeClr val="accent1"/>
+          </a:lnRef>
+          <a:fillRef idx="0">
+            <a:schemeClr val="accent1"/>
+          </a:fillRef>
+          <a:effectRef idx="0">
+            <a:schemeClr val="accent1"/>
+          </a:effectRef>
+          <a:fontRef idx="minor">
+            <a:schemeClr val="tx1"/>
+          </a:fontRef>
+        </p:style>
+      </p:cxnSp>
+      <p:cxnSp>
+        <p:nvCxnSpPr>
+          <p:cNvPr id="59" name="Straight Arrow Connector 58">
+            <a:extLst>
+              <a:ext uri="{FF2B5EF4-FFF2-40B4-BE49-F238E27FC236}">
+                <a16:creationId xmlns:a16="http://schemas.microsoft.com/office/drawing/2014/main" id="{FACC756A-0481-472E-B083-9D2266AD85D6}"/>
+              </a:ext>
+            </a:extLst>
+          </p:cNvPr>
+          <p:cNvCxnSpPr>
+            <a:cxnSpLocks/>
+            <a:endCxn id="122" idx="3"/>
+          </p:cNvCxnSpPr>
+          <p:nvPr/>
+        </p:nvCxnSpPr>
+        <p:spPr>
+          <a:xfrm flipH="1" flipV="1">
+            <a:off x="1579862" y="3355405"/>
+            <a:ext cx="1089306" cy="375730"/>
+          </a:xfrm>
+          <a:prstGeom prst="straightConnector1">
+            <a:avLst/>
+          </a:prstGeom>
+          <a:ln w="28575">
+            <a:solidFill>
+              <a:srgbClr val="0078D7"/>
+            </a:solidFill>
+            <a:headEnd type="triangle"/>
+            <a:tailEnd type="triangle"/>
+          </a:ln>
+        </p:spPr>
+        <p:style>
+          <a:lnRef idx="1">
+            <a:schemeClr val="accent1"/>
+          </a:lnRef>
+          <a:fillRef idx="0">
+            <a:schemeClr val="accent1"/>
+          </a:fillRef>
+          <a:effectRef idx="0">
+            <a:schemeClr val="accent1"/>
+          </a:effectRef>
+          <a:fontRef idx="minor">
+            <a:schemeClr val="tx1"/>
+          </a:fontRef>
+        </p:style>
+      </p:cxnSp>
+      <p:cxnSp>
+        <p:nvCxnSpPr>
+          <p:cNvPr id="62" name="Straight Arrow Connector 61">
+            <a:extLst>
+              <a:ext uri="{FF2B5EF4-FFF2-40B4-BE49-F238E27FC236}">
+                <a16:creationId xmlns:a16="http://schemas.microsoft.com/office/drawing/2014/main" id="{5744B622-3243-4119-AC23-84D850BED0D2}"/>
+              </a:ext>
+            </a:extLst>
+          </p:cNvPr>
+          <p:cNvCxnSpPr>
+            <a:cxnSpLocks/>
+            <a:endCxn id="122" idx="3"/>
+          </p:cNvCxnSpPr>
+          <p:nvPr/>
+        </p:nvCxnSpPr>
+        <p:spPr>
+          <a:xfrm flipH="1" flipV="1">
+            <a:off x="1579862" y="3355405"/>
+            <a:ext cx="1075654" cy="749610"/>
+          </a:xfrm>
+          <a:prstGeom prst="straightConnector1">
+            <a:avLst/>
+          </a:prstGeom>
+          <a:ln w="28575">
+            <a:solidFill>
+              <a:srgbClr val="0078D7"/>
+            </a:solidFill>
+            <a:headEnd type="triangle"/>
+            <a:tailEnd type="triangle"/>
+          </a:ln>
+        </p:spPr>
+        <p:style>
+          <a:lnRef idx="1">
+            <a:schemeClr val="accent1"/>
+          </a:lnRef>
+          <a:fillRef idx="0">
+            <a:schemeClr val="accent1"/>
+          </a:fillRef>
+          <a:effectRef idx="0">
+            <a:schemeClr val="accent1"/>
+          </a:effectRef>
+          <a:fontRef idx="minor">
+            <a:schemeClr val="tx1"/>
+          </a:fontRef>
+        </p:style>
+      </p:cxnSp>
+      <p:cxnSp>
+        <p:nvCxnSpPr>
+          <p:cNvPr id="65" name="Straight Arrow Connector 64">
+            <a:extLst>
+              <a:ext uri="{FF2B5EF4-FFF2-40B4-BE49-F238E27FC236}">
+                <a16:creationId xmlns:a16="http://schemas.microsoft.com/office/drawing/2014/main" id="{EAF14B10-60BA-40AF-9F8F-A41B11408526}"/>
+              </a:ext>
+            </a:extLst>
+          </p:cNvPr>
+          <p:cNvCxnSpPr>
+            <a:cxnSpLocks/>
+            <a:stCxn id="131" idx="3"/>
+            <a:endCxn id="133" idx="1"/>
+          </p:cNvCxnSpPr>
+          <p:nvPr/>
+        </p:nvCxnSpPr>
+        <p:spPr>
+          <a:xfrm flipV="1">
+            <a:off x="7035819" y="972658"/>
+            <a:ext cx="1227447" cy="730849"/>
+          </a:xfrm>
+          <a:prstGeom prst="straightConnector1">
+            <a:avLst/>
+          </a:prstGeom>
+          <a:noFill/>
+          <a:ln w="28575" cap="flat" cmpd="sng" algn="ctr">
+            <a:solidFill>
+              <a:srgbClr val="0078D7"/>
+            </a:solidFill>
+            <a:prstDash val="solid"/>
+            <a:miter lim="800000"/>
+            <a:tailEnd type="triangle"/>
+          </a:ln>
+          <a:effectLst/>
+        </p:spPr>
+      </p:cxnSp>
+      <p:cxnSp>
+        <p:nvCxnSpPr>
+          <p:cNvPr id="68" name="Straight Arrow Connector 67">
+            <a:extLst>
+              <a:ext uri="{FF2B5EF4-FFF2-40B4-BE49-F238E27FC236}">
+                <a16:creationId xmlns:a16="http://schemas.microsoft.com/office/drawing/2014/main" id="{0D8F2811-2521-453A-BFEA-B96D000F674A}"/>
+              </a:ext>
+            </a:extLst>
+          </p:cNvPr>
+          <p:cNvCxnSpPr>
+            <a:cxnSpLocks/>
+            <a:stCxn id="131" idx="3"/>
+            <a:endCxn id="134" idx="1"/>
+          </p:cNvCxnSpPr>
+          <p:nvPr/>
+        </p:nvCxnSpPr>
+        <p:spPr>
+          <a:xfrm>
+            <a:off x="7035819" y="1703507"/>
+            <a:ext cx="1241434" cy="440948"/>
+          </a:xfrm>
+          <a:prstGeom prst="straightConnector1">
+            <a:avLst/>
+          </a:prstGeom>
+          <a:noFill/>
+          <a:ln w="28575" cap="flat" cmpd="sng" algn="ctr">
+            <a:solidFill>
+              <a:srgbClr val="0078D7"/>
+            </a:solidFill>
+            <a:prstDash val="solid"/>
+            <a:miter lim="800000"/>
+            <a:tailEnd type="triangle"/>
+          </a:ln>
+          <a:effectLst/>
+        </p:spPr>
+      </p:cxnSp>
+      <p:cxnSp>
+        <p:nvCxnSpPr>
+          <p:cNvPr id="70" name="Straight Arrow Connector 69">
+            <a:extLst>
+              <a:ext uri="{FF2B5EF4-FFF2-40B4-BE49-F238E27FC236}">
+                <a16:creationId xmlns:a16="http://schemas.microsoft.com/office/drawing/2014/main" id="{5CB1BAAB-5D77-4F54-8999-9CC12E782157}"/>
+              </a:ext>
+            </a:extLst>
+          </p:cNvPr>
+          <p:cNvCxnSpPr>
+            <a:cxnSpLocks/>
+            <a:stCxn id="111" idx="2"/>
+            <a:endCxn id="46" idx="0"/>
+          </p:cNvCxnSpPr>
+          <p:nvPr/>
+        </p:nvCxnSpPr>
+        <p:spPr>
+          <a:xfrm>
+            <a:off x="11229198" y="1353630"/>
+            <a:ext cx="7051" cy="1716697"/>
+          </a:xfrm>
+          <a:prstGeom prst="straightConnector1">
+            <a:avLst/>
+          </a:prstGeom>
+          <a:noFill/>
+          <a:ln w="28575" cap="flat" cmpd="sng" algn="ctr">
+            <a:solidFill>
+              <a:srgbClr val="0078D7"/>
+            </a:solidFill>
+            <a:prstDash val="solid"/>
+            <a:miter lim="800000"/>
+            <a:headEnd type="triangle" w="med" len="med"/>
+            <a:tailEnd type="triangle" w="med" len="med"/>
+          </a:ln>
+          <a:effectLst/>
+        </p:spPr>
+      </p:cxnSp>
+      <p:cxnSp>
+        <p:nvCxnSpPr>
+          <p:cNvPr id="73" name="Straight Arrow Connector 72">
+            <a:extLst>
+              <a:ext uri="{FF2B5EF4-FFF2-40B4-BE49-F238E27FC236}">
+                <a16:creationId xmlns:a16="http://schemas.microsoft.com/office/drawing/2014/main" id="{FE2800C5-5E66-48DC-9985-53720D515E38}"/>
+              </a:ext>
+            </a:extLst>
+          </p:cNvPr>
+          <p:cNvCxnSpPr>
+            <a:cxnSpLocks/>
+            <a:stCxn id="133" idx="3"/>
+            <a:endCxn id="46" idx="1"/>
+          </p:cNvCxnSpPr>
+          <p:nvPr/>
+        </p:nvCxnSpPr>
+        <p:spPr>
+          <a:xfrm>
+            <a:off x="9516671" y="972658"/>
+            <a:ext cx="1328374" cy="2488873"/>
+          </a:xfrm>
+          <a:prstGeom prst="straightConnector1">
+            <a:avLst/>
+          </a:prstGeom>
+          <a:noFill/>
+          <a:ln w="28575" cap="flat" cmpd="sng" algn="ctr">
+            <a:solidFill>
+              <a:srgbClr val="0078D7"/>
+            </a:solidFill>
+            <a:prstDash val="solid"/>
+            <a:miter lim="800000"/>
+            <a:tailEnd type="triangle"/>
+          </a:ln>
+          <a:effectLst/>
+        </p:spPr>
+      </p:cxnSp>
+      <p:pic>
+        <p:nvPicPr>
+          <p:cNvPr id="96" name="Picture 95">
+            <a:extLst>
+              <a:ext uri="{FF2B5EF4-FFF2-40B4-BE49-F238E27FC236}">
+                <a16:creationId xmlns:a16="http://schemas.microsoft.com/office/drawing/2014/main" id="{C4EAE335-B4E0-4072-8912-09123BAE9CB8}"/>
+              </a:ext>
+            </a:extLst>
+          </p:cNvPr>
+          <p:cNvPicPr>
+            <a:picLocks noChangeAspect="1"/>
+          </p:cNvPicPr>
+          <p:nvPr/>
+        </p:nvPicPr>
+        <p:blipFill>
+          <a:blip r:embed="rId4">
+            <a:biLevel thresh="25000"/>
+          </a:blip>
+          <a:stretch>
+            <a:fillRect/>
+          </a:stretch>
+        </p:blipFill>
+        <p:spPr>
+          <a:xfrm>
+            <a:off x="6575438" y="1192755"/>
+            <a:ext cx="416108" cy="321750"/>
+          </a:xfrm>
+          <a:prstGeom prst="rect">
+            <a:avLst/>
+          </a:prstGeom>
+        </p:spPr>
+      </p:pic>
+      <p:sp>
+        <p:nvSpPr>
+          <p:cNvPr id="128" name="Rectangle: Rounded Corners 127">
+            <a:extLst>
+              <a:ext uri="{FF2B5EF4-FFF2-40B4-BE49-F238E27FC236}">
+                <a16:creationId xmlns:a16="http://schemas.microsoft.com/office/drawing/2014/main" id="{DC6A999F-33FB-48DF-AC5A-294096781582}"/>
               </a:ext>
             </a:extLst>
           </p:cNvPr>
@@ -4963,12 +4865,20 @@
         </p:nvSpPr>
         <p:spPr>
           <a:xfrm>
-            <a:off x="266957" y="2821976"/>
-            <a:ext cx="1192240" cy="812089"/>
+            <a:off x="8024211" y="3039893"/>
+            <a:ext cx="1506447" cy="566290"/>
           </a:xfrm>
           <a:prstGeom prst="roundRect">
-            <a:avLst/>
+            <a:avLst>
+              <a:gd name="adj" fmla="val 2050"/>
+            </a:avLst>
           </a:prstGeom>
+          <a:solidFill>
+            <a:srgbClr val="1DC4FF"/>
+          </a:solidFill>
+          <a:ln w="3175">
+            <a:noFill/>
+          </a:ln>
         </p:spPr>
         <p:style>
           <a:lnRef idx="2">
@@ -4987,23 +4897,102 @@
           </a:fontRef>
         </p:style>
         <p:txBody>
-          <a:bodyPr rtlCol="0" anchor="ctr"/>
+          <a:bodyPr rot="0" spcFirstLastPara="0" vertOverflow="overflow" horzOverflow="overflow" vert="horz" wrap="square" lIns="91440" tIns="45720" rIns="91440" bIns="45720" numCol="1" spcCol="0" rtlCol="0" fromWordArt="0" anchor="ctr" anchorCtr="0" forceAA="0" compatLnSpc="1">
+            <a:prstTxWarp prst="textNoShape">
+              <a:avLst/>
+            </a:prstTxWarp>
+            <a:noAutofit/>
+          </a:bodyPr>
           <a:lstStyle/>
           <a:p>
             <a:pPr algn="ctr"/>
             <a:r>
-              <a:rPr lang="en-US"/>
-              <a:t>Devices</a:t>
-            </a:r>
-          </a:p>
-        </p:txBody>
-      </p:sp>
-      <p:sp>
-        <p:nvSpPr>
-          <p:cNvPr id="122" name="Rectangle: Rounded Corners 121">
-            <a:extLst>
-              <a:ext uri="{FF2B5EF4-FFF2-40B4-BE49-F238E27FC236}">
-                <a16:creationId xmlns:a16="http://schemas.microsoft.com/office/drawing/2014/main" id="{B1E6391E-E996-4B92-AAE3-F2636030C83A}"/>
+              <a:rPr lang="en-US" sz="1600" dirty="0"/>
+              <a:t>Azure</a:t>
+            </a:r>
+          </a:p>
+          <a:p>
+            <a:pPr algn="ctr"/>
+            <a:r>
+              <a:rPr lang="en-US" sz="1600" dirty="0"/>
+              <a:t>Functions</a:t>
+            </a:r>
+            <a:endParaRPr lang="en-US" sz="2000" dirty="0"/>
+          </a:p>
+        </p:txBody>
+      </p:sp>
+      <p:pic>
+        <p:nvPicPr>
+          <p:cNvPr id="120" name="Picture 119">
+            <a:extLst>
+              <a:ext uri="{FF2B5EF4-FFF2-40B4-BE49-F238E27FC236}">
+                <a16:creationId xmlns:a16="http://schemas.microsoft.com/office/drawing/2014/main" id="{5C8A66E9-50BB-45A0-B6D1-D1966823B7A4}"/>
+              </a:ext>
+            </a:extLst>
+          </p:cNvPr>
+          <p:cNvPicPr>
+            <a:picLocks noChangeAspect="1"/>
+          </p:cNvPicPr>
+          <p:nvPr/>
+        </p:nvPicPr>
+        <p:blipFill>
+          <a:blip r:embed="rId5"/>
+          <a:stretch>
+            <a:fillRect/>
+          </a:stretch>
+        </p:blipFill>
+        <p:spPr>
+          <a:xfrm>
+            <a:off x="9190892" y="3098525"/>
+            <a:ext cx="274943" cy="283718"/>
+          </a:xfrm>
+          <a:prstGeom prst="rect">
+            <a:avLst/>
+          </a:prstGeom>
+        </p:spPr>
+      </p:pic>
+      <p:cxnSp>
+        <p:nvCxnSpPr>
+          <p:cNvPr id="130" name="Straight Arrow Connector 129" title="eMail Alert">
+            <a:extLst>
+              <a:ext uri="{FF2B5EF4-FFF2-40B4-BE49-F238E27FC236}">
+                <a16:creationId xmlns:a16="http://schemas.microsoft.com/office/drawing/2014/main" id="{B72849D4-5670-409C-B761-AB4C8A3635E9}"/>
+              </a:ext>
+            </a:extLst>
+          </p:cNvPr>
+          <p:cNvCxnSpPr>
+            <a:cxnSpLocks/>
+            <a:stCxn id="131" idx="2"/>
+            <a:endCxn id="128" idx="0"/>
+          </p:cNvCxnSpPr>
+          <p:nvPr/>
+        </p:nvCxnSpPr>
+        <p:spPr>
+          <a:xfrm>
+            <a:off x="6215924" y="2256178"/>
+            <a:ext cx="2561511" cy="783715"/>
+          </a:xfrm>
+          <a:prstGeom prst="straightConnector1">
+            <a:avLst/>
+          </a:prstGeom>
+          <a:noFill/>
+          <a:ln w="28575" cap="flat" cmpd="sng" algn="ctr">
+            <a:solidFill>
+              <a:srgbClr val="0078D7"/>
+            </a:solidFill>
+            <a:prstDash val="solid"/>
+            <a:miter lim="800000"/>
+            <a:tailEnd type="triangle"/>
+          </a:ln>
+          <a:effectLst/>
+        </p:spPr>
+      </p:cxnSp>
+      <p:sp>
+        <p:nvSpPr>
+          <p:cNvPr id="140" name="Rectangle: Rounded Corners 139">
+            <a:extLst>
+              <a:ext uri="{FF2B5EF4-FFF2-40B4-BE49-F238E27FC236}">
+                <a16:creationId xmlns:a16="http://schemas.microsoft.com/office/drawing/2014/main" id="{3FC4F8F6-E6D9-4FAE-8D0F-F5583AE35B69}"/>
               </a:ext>
             </a:extLst>
           </p:cNvPr>
@@ -5012,12 +5001,20 @@
         </p:nvSpPr>
         <p:spPr>
           <a:xfrm>
-            <a:off x="387622" y="2949360"/>
-            <a:ext cx="1192240" cy="812089"/>
+            <a:off x="7750837" y="4099890"/>
+            <a:ext cx="1506447" cy="566290"/>
           </a:xfrm>
           <a:prstGeom prst="roundRect">
-            <a:avLst/>
+            <a:avLst>
+              <a:gd name="adj" fmla="val 2050"/>
+            </a:avLst>
           </a:prstGeom>
+          <a:solidFill>
+            <a:srgbClr val="1DC4FF"/>
+          </a:solidFill>
+          <a:ln w="3175">
+            <a:noFill/>
+          </a:ln>
         </p:spPr>
         <p:style>
           <a:lnRef idx="2">
@@ -5036,63 +5033,6 @@
           </a:fontRef>
         </p:style>
         <p:txBody>
-          <a:bodyPr rtlCol="0" anchor="ctr"/>
-          <a:lstStyle/>
-          <a:p>
-            <a:pPr algn="ctr"/>
-            <a:r>
-              <a:rPr lang="en-US" dirty="0"/>
-              <a:t>Devices</a:t>
-            </a:r>
-          </a:p>
-        </p:txBody>
-      </p:sp>
-      <p:sp>
-        <p:nvSpPr>
-          <p:cNvPr id="136" name="Rectangle: Rounded Corners 135">
-            <a:extLst>
-              <a:ext uri="{FF2B5EF4-FFF2-40B4-BE49-F238E27FC236}">
-                <a16:creationId xmlns:a16="http://schemas.microsoft.com/office/drawing/2014/main" id="{F4D74433-E65A-4960-BD5E-FAD5E7DBA1D2}"/>
-              </a:ext>
-            </a:extLst>
-          </p:cNvPr>
-          <p:cNvSpPr/>
-          <p:nvPr/>
-        </p:nvSpPr>
-        <p:spPr>
-          <a:xfrm>
-            <a:off x="10565971" y="3967665"/>
-            <a:ext cx="1441098" cy="302228"/>
-          </a:xfrm>
-          <a:prstGeom prst="roundRect">
-            <a:avLst/>
-          </a:prstGeom>
-          <a:solidFill>
-            <a:srgbClr val="00B0F0"/>
-          </a:solidFill>
-          <a:ln w="12700">
-            <a:solidFill>
-              <a:schemeClr val="tx1"/>
-            </a:solidFill>
-          </a:ln>
-        </p:spPr>
-        <p:style>
-          <a:lnRef idx="2">
-            <a:schemeClr val="accent1">
-              <a:shade val="50000"/>
-            </a:schemeClr>
-          </a:lnRef>
-          <a:fillRef idx="1">
-            <a:schemeClr val="accent1"/>
-          </a:fillRef>
-          <a:effectRef idx="0">
-            <a:schemeClr val="accent1"/>
-          </a:effectRef>
-          <a:fontRef idx="minor">
-            <a:schemeClr val="lt1"/>
-          </a:fontRef>
-        </p:style>
-        <p:txBody>
           <a:bodyPr rot="0" spcFirstLastPara="0" vertOverflow="overflow" horzOverflow="overflow" vert="horz" wrap="square" lIns="91440" tIns="45720" rIns="91440" bIns="45720" numCol="1" spcCol="0" rtlCol="0" fromWordArt="0" anchor="ctr" anchorCtr="0" forceAA="0" compatLnSpc="1">
             <a:prstTxWarp prst="textNoShape">
               <a:avLst/>
@@ -5103,8 +5043,223 @@
           <a:p>
             <a:pPr algn="ctr"/>
             <a:r>
-              <a:rPr lang="en-US" dirty="0"/>
-              <a:t>Web Portal</a:t>
+              <a:rPr lang="en-US" sz="1600" dirty="0"/>
+              <a:t>Azure</a:t>
+            </a:r>
+          </a:p>
+          <a:p>
+            <a:pPr algn="ctr"/>
+            <a:r>
+              <a:rPr lang="en-US" sz="1600" dirty="0"/>
+              <a:t>Functions</a:t>
+            </a:r>
+            <a:endParaRPr lang="en-US" sz="2000" dirty="0"/>
+          </a:p>
+        </p:txBody>
+      </p:sp>
+      <p:cxnSp>
+        <p:nvCxnSpPr>
+          <p:cNvPr id="141" name="Straight Arrow Connector 140">
+            <a:extLst>
+              <a:ext uri="{FF2B5EF4-FFF2-40B4-BE49-F238E27FC236}">
+                <a16:creationId xmlns:a16="http://schemas.microsoft.com/office/drawing/2014/main" id="{1AE99FB8-24EA-498A-8086-99C2A80A4E91}"/>
+              </a:ext>
+            </a:extLst>
+          </p:cNvPr>
+          <p:cNvCxnSpPr>
+            <a:cxnSpLocks/>
+            <a:stCxn id="140" idx="1"/>
+            <a:endCxn id="127" idx="3"/>
+          </p:cNvCxnSpPr>
+          <p:nvPr/>
+        </p:nvCxnSpPr>
+        <p:spPr>
+          <a:xfrm flipH="1" flipV="1">
+            <a:off x="4176677" y="3200028"/>
+            <a:ext cx="3574160" cy="1183007"/>
+          </a:xfrm>
+          <a:prstGeom prst="straightConnector1">
+            <a:avLst/>
+          </a:prstGeom>
+          <a:noFill/>
+          <a:ln w="28575" cap="flat" cmpd="sng" algn="ctr">
+            <a:solidFill>
+              <a:srgbClr val="0078D7"/>
+            </a:solidFill>
+            <a:prstDash val="solid"/>
+            <a:miter lim="800000"/>
+            <a:tailEnd type="triangle"/>
+          </a:ln>
+          <a:effectLst/>
+        </p:spPr>
+      </p:cxnSp>
+      <p:cxnSp>
+        <p:nvCxnSpPr>
+          <p:cNvPr id="144" name="Straight Arrow Connector 143">
+            <a:extLst>
+              <a:ext uri="{FF2B5EF4-FFF2-40B4-BE49-F238E27FC236}">
+                <a16:creationId xmlns:a16="http://schemas.microsoft.com/office/drawing/2014/main" id="{603FCF63-AE2D-44AC-B328-499224722003}"/>
+              </a:ext>
+            </a:extLst>
+          </p:cNvPr>
+          <p:cNvCxnSpPr>
+            <a:cxnSpLocks/>
+            <a:stCxn id="131" idx="2"/>
+            <a:endCxn id="140" idx="1"/>
+          </p:cNvCxnSpPr>
+          <p:nvPr/>
+        </p:nvCxnSpPr>
+        <p:spPr>
+          <a:xfrm>
+            <a:off x="6215924" y="2256178"/>
+            <a:ext cx="1534913" cy="2126857"/>
+          </a:xfrm>
+          <a:prstGeom prst="straightConnector1">
+            <a:avLst/>
+          </a:prstGeom>
+          <a:noFill/>
+          <a:ln w="28575" cap="flat" cmpd="sng" algn="ctr">
+            <a:solidFill>
+              <a:srgbClr val="0078D7"/>
+            </a:solidFill>
+            <a:prstDash val="solid"/>
+            <a:miter lim="800000"/>
+            <a:tailEnd type="triangle"/>
+          </a:ln>
+          <a:effectLst/>
+        </p:spPr>
+      </p:cxnSp>
+      <p:pic>
+        <p:nvPicPr>
+          <p:cNvPr id="149" name="Picture 148">
+            <a:extLst>
+              <a:ext uri="{FF2B5EF4-FFF2-40B4-BE49-F238E27FC236}">
+                <a16:creationId xmlns:a16="http://schemas.microsoft.com/office/drawing/2014/main" id="{7190AC16-5B57-4DBA-A2A2-9F5E64CFC36D}"/>
+              </a:ext>
+            </a:extLst>
+          </p:cNvPr>
+          <p:cNvPicPr>
+            <a:picLocks noChangeAspect="1"/>
+          </p:cNvPicPr>
+          <p:nvPr/>
+        </p:nvPicPr>
+        <p:blipFill>
+          <a:blip r:embed="rId5"/>
+          <a:stretch>
+            <a:fillRect/>
+          </a:stretch>
+        </p:blipFill>
+        <p:spPr>
+          <a:xfrm>
+            <a:off x="8932026" y="4147507"/>
+            <a:ext cx="274943" cy="283718"/>
+          </a:xfrm>
+          <a:prstGeom prst="rect">
+            <a:avLst/>
+          </a:prstGeom>
+        </p:spPr>
+      </p:pic>
+      <p:sp>
+        <p:nvSpPr>
+          <p:cNvPr id="150" name="TextBox 149">
+            <a:extLst>
+              <a:ext uri="{FF2B5EF4-FFF2-40B4-BE49-F238E27FC236}">
+                <a16:creationId xmlns:a16="http://schemas.microsoft.com/office/drawing/2014/main" id="{300135AA-E007-4FA3-A805-16B4EC37912F}"/>
+              </a:ext>
+            </a:extLst>
+          </p:cNvPr>
+          <p:cNvSpPr txBox="1"/>
+          <p:nvPr/>
+        </p:nvSpPr>
+        <p:spPr>
+          <a:xfrm rot="969151">
+            <a:off x="6957330" y="2648612"/>
+            <a:ext cx="1288558" cy="307777"/>
+          </a:xfrm>
+          <a:prstGeom prst="rect">
+            <a:avLst/>
+          </a:prstGeom>
+          <a:noFill/>
+        </p:spPr>
+        <p:txBody>
+          <a:bodyPr wrap="none" rtlCol="0">
+            <a:spAutoFit/>
+          </a:bodyPr>
+          <a:lstStyle/>
+          <a:p>
+            <a:r>
+              <a:rPr lang="en-US" sz="1400" dirty="0"/>
+              <a:t>Alert for e-mail</a:t>
+            </a:r>
+          </a:p>
+        </p:txBody>
+      </p:sp>
+      <p:sp>
+        <p:nvSpPr>
+          <p:cNvPr id="151" name="TextBox 150">
+            <a:extLst>
+              <a:ext uri="{FF2B5EF4-FFF2-40B4-BE49-F238E27FC236}">
+                <a16:creationId xmlns:a16="http://schemas.microsoft.com/office/drawing/2014/main" id="{08EB632C-DD55-4BC0-92DE-DB81A5FF4935}"/>
+              </a:ext>
+            </a:extLst>
+          </p:cNvPr>
+          <p:cNvSpPr txBox="1"/>
+          <p:nvPr/>
+        </p:nvSpPr>
+        <p:spPr>
+          <a:xfrm rot="3218606">
+            <a:off x="6249718" y="3171034"/>
+            <a:ext cx="1817549" cy="307777"/>
+          </a:xfrm>
+          <a:prstGeom prst="rect">
+            <a:avLst/>
+          </a:prstGeom>
+          <a:noFill/>
+        </p:spPr>
+        <p:txBody>
+          <a:bodyPr wrap="none" rtlCol="0">
+            <a:spAutoFit/>
+          </a:bodyPr>
+          <a:lstStyle/>
+          <a:p>
+            <a:r>
+              <a:rPr lang="en-US" sz="1400" dirty="0"/>
+              <a:t>Device rule processing</a:t>
+            </a:r>
+          </a:p>
+        </p:txBody>
+      </p:sp>
+      <p:sp>
+        <p:nvSpPr>
+          <p:cNvPr id="156" name="TextBox 155">
+            <a:extLst>
+              <a:ext uri="{FF2B5EF4-FFF2-40B4-BE49-F238E27FC236}">
+                <a16:creationId xmlns:a16="http://schemas.microsoft.com/office/drawing/2014/main" id="{5C91DEB2-C0DE-41AC-B03C-F5B6E929B31C}"/>
+              </a:ext>
+            </a:extLst>
+          </p:cNvPr>
+          <p:cNvSpPr txBox="1"/>
+          <p:nvPr/>
+        </p:nvSpPr>
+        <p:spPr>
+          <a:xfrm rot="1130945">
+            <a:off x="4893859" y="3767681"/>
+            <a:ext cx="2020810" cy="307777"/>
+          </a:xfrm>
+          <a:prstGeom prst="rect">
+            <a:avLst/>
+          </a:prstGeom>
+          <a:noFill/>
+        </p:spPr>
+        <p:txBody>
+          <a:bodyPr wrap="none" rtlCol="0">
+            <a:spAutoFit/>
+          </a:bodyPr>
+          <a:lstStyle/>
+          <a:p>
+            <a:r>
+              <a:rPr lang="en-US" sz="1400" dirty="0"/>
+              <a:t>Send command to device</a:t>
             </a:r>
           </a:p>
         </p:txBody>

</xml_diff>

<commit_message>
Added IoTHub component to the azure template...
</commit_message>
<xml_diff>
--- a/TechDesign.pptx
+++ b/TechDesign.pptx
@@ -273,7 +273,7 @@
           <a:p>
             <a:fld id="{91A10E39-C289-4936-BB8A-7D7F2E005D15}" type="datetimeFigureOut">
               <a:rPr lang="en-US" smtClean="0"/>
-              <a:t>3/18/2018</a:t>
+              <a:t>3/19/2018</a:t>
             </a:fld>
             <a:endParaRPr lang="en-US"/>
           </a:p>
@@ -471,7 +471,7 @@
           <a:p>
             <a:fld id="{91A10E39-C289-4936-BB8A-7D7F2E005D15}" type="datetimeFigureOut">
               <a:rPr lang="en-US" smtClean="0"/>
-              <a:t>3/18/2018</a:t>
+              <a:t>3/19/2018</a:t>
             </a:fld>
             <a:endParaRPr lang="en-US"/>
           </a:p>
@@ -679,7 +679,7 @@
           <a:p>
             <a:fld id="{91A10E39-C289-4936-BB8A-7D7F2E005D15}" type="datetimeFigureOut">
               <a:rPr lang="en-US" smtClean="0"/>
-              <a:t>3/18/2018</a:t>
+              <a:t>3/19/2018</a:t>
             </a:fld>
             <a:endParaRPr lang="en-US"/>
           </a:p>
@@ -877,7 +877,7 @@
           <a:p>
             <a:fld id="{91A10E39-C289-4936-BB8A-7D7F2E005D15}" type="datetimeFigureOut">
               <a:rPr lang="en-US" smtClean="0"/>
-              <a:t>3/18/2018</a:t>
+              <a:t>3/19/2018</a:t>
             </a:fld>
             <a:endParaRPr lang="en-US"/>
           </a:p>
@@ -1152,7 +1152,7 @@
           <a:p>
             <a:fld id="{91A10E39-C289-4936-BB8A-7D7F2E005D15}" type="datetimeFigureOut">
               <a:rPr lang="en-US" smtClean="0"/>
-              <a:t>3/18/2018</a:t>
+              <a:t>3/19/2018</a:t>
             </a:fld>
             <a:endParaRPr lang="en-US"/>
           </a:p>
@@ -1417,7 +1417,7 @@
           <a:p>
             <a:fld id="{91A10E39-C289-4936-BB8A-7D7F2E005D15}" type="datetimeFigureOut">
               <a:rPr lang="en-US" smtClean="0"/>
-              <a:t>3/18/2018</a:t>
+              <a:t>3/19/2018</a:t>
             </a:fld>
             <a:endParaRPr lang="en-US"/>
           </a:p>
@@ -1829,7 +1829,7 @@
           <a:p>
             <a:fld id="{91A10E39-C289-4936-BB8A-7D7F2E005D15}" type="datetimeFigureOut">
               <a:rPr lang="en-US" smtClean="0"/>
-              <a:t>3/18/2018</a:t>
+              <a:t>3/19/2018</a:t>
             </a:fld>
             <a:endParaRPr lang="en-US"/>
           </a:p>
@@ -1970,7 +1970,7 @@
           <a:p>
             <a:fld id="{91A10E39-C289-4936-BB8A-7D7F2E005D15}" type="datetimeFigureOut">
               <a:rPr lang="en-US" smtClean="0"/>
-              <a:t>3/18/2018</a:t>
+              <a:t>3/19/2018</a:t>
             </a:fld>
             <a:endParaRPr lang="en-US"/>
           </a:p>
@@ -2083,7 +2083,7 @@
           <a:p>
             <a:fld id="{91A10E39-C289-4936-BB8A-7D7F2E005D15}" type="datetimeFigureOut">
               <a:rPr lang="en-US" smtClean="0"/>
-              <a:t>3/18/2018</a:t>
+              <a:t>3/19/2018</a:t>
             </a:fld>
             <a:endParaRPr lang="en-US"/>
           </a:p>
@@ -2394,7 +2394,7 @@
           <a:p>
             <a:fld id="{91A10E39-C289-4936-BB8A-7D7F2E005D15}" type="datetimeFigureOut">
               <a:rPr lang="en-US" smtClean="0"/>
-              <a:t>3/18/2018</a:t>
+              <a:t>3/19/2018</a:t>
             </a:fld>
             <a:endParaRPr lang="en-US"/>
           </a:p>
@@ -2682,7 +2682,7 @@
           <a:p>
             <a:fld id="{91A10E39-C289-4936-BB8A-7D7F2E005D15}" type="datetimeFigureOut">
               <a:rPr lang="en-US" smtClean="0"/>
-              <a:t>3/18/2018</a:t>
+              <a:t>3/19/2018</a:t>
             </a:fld>
             <a:endParaRPr lang="en-US"/>
           </a:p>
@@ -2923,7 +2923,7 @@
           <a:p>
             <a:fld id="{91A10E39-C289-4936-BB8A-7D7F2E005D15}" type="datetimeFigureOut">
               <a:rPr lang="en-US" smtClean="0"/>
-              <a:t>3/18/2018</a:t>
+              <a:t>3/19/2018</a:t>
             </a:fld>
             <a:endParaRPr lang="en-US"/>
           </a:p>

</xml_diff>

<commit_message>
added outputs to template..
</commit_message>
<xml_diff>
--- a/TechDesign.pptx
+++ b/TechDesign.pptx
@@ -273,7 +273,7 @@
           <a:p>
             <a:fld id="{91A10E39-C289-4936-BB8A-7D7F2E005D15}" type="datetimeFigureOut">
               <a:rPr lang="en-US" smtClean="0"/>
-              <a:t>3/19/2018</a:t>
+              <a:t>3/21/2018</a:t>
             </a:fld>
             <a:endParaRPr lang="en-US"/>
           </a:p>
@@ -471,7 +471,7 @@
           <a:p>
             <a:fld id="{91A10E39-C289-4936-BB8A-7D7F2E005D15}" type="datetimeFigureOut">
               <a:rPr lang="en-US" smtClean="0"/>
-              <a:t>3/19/2018</a:t>
+              <a:t>3/21/2018</a:t>
             </a:fld>
             <a:endParaRPr lang="en-US"/>
           </a:p>
@@ -679,7 +679,7 @@
           <a:p>
             <a:fld id="{91A10E39-C289-4936-BB8A-7D7F2E005D15}" type="datetimeFigureOut">
               <a:rPr lang="en-US" smtClean="0"/>
-              <a:t>3/19/2018</a:t>
+              <a:t>3/21/2018</a:t>
             </a:fld>
             <a:endParaRPr lang="en-US"/>
           </a:p>
@@ -877,7 +877,7 @@
           <a:p>
             <a:fld id="{91A10E39-C289-4936-BB8A-7D7F2E005D15}" type="datetimeFigureOut">
               <a:rPr lang="en-US" smtClean="0"/>
-              <a:t>3/19/2018</a:t>
+              <a:t>3/21/2018</a:t>
             </a:fld>
             <a:endParaRPr lang="en-US"/>
           </a:p>
@@ -1152,7 +1152,7 @@
           <a:p>
             <a:fld id="{91A10E39-C289-4936-BB8A-7D7F2E005D15}" type="datetimeFigureOut">
               <a:rPr lang="en-US" smtClean="0"/>
-              <a:t>3/19/2018</a:t>
+              <a:t>3/21/2018</a:t>
             </a:fld>
             <a:endParaRPr lang="en-US"/>
           </a:p>
@@ -1417,7 +1417,7 @@
           <a:p>
             <a:fld id="{91A10E39-C289-4936-BB8A-7D7F2E005D15}" type="datetimeFigureOut">
               <a:rPr lang="en-US" smtClean="0"/>
-              <a:t>3/19/2018</a:t>
+              <a:t>3/21/2018</a:t>
             </a:fld>
             <a:endParaRPr lang="en-US"/>
           </a:p>
@@ -1829,7 +1829,7 @@
           <a:p>
             <a:fld id="{91A10E39-C289-4936-BB8A-7D7F2E005D15}" type="datetimeFigureOut">
               <a:rPr lang="en-US" smtClean="0"/>
-              <a:t>3/19/2018</a:t>
+              <a:t>3/21/2018</a:t>
             </a:fld>
             <a:endParaRPr lang="en-US"/>
           </a:p>
@@ -1970,7 +1970,7 @@
           <a:p>
             <a:fld id="{91A10E39-C289-4936-BB8A-7D7F2E005D15}" type="datetimeFigureOut">
               <a:rPr lang="en-US" smtClean="0"/>
-              <a:t>3/19/2018</a:t>
+              <a:t>3/21/2018</a:t>
             </a:fld>
             <a:endParaRPr lang="en-US"/>
           </a:p>
@@ -2083,7 +2083,7 @@
           <a:p>
             <a:fld id="{91A10E39-C289-4936-BB8A-7D7F2E005D15}" type="datetimeFigureOut">
               <a:rPr lang="en-US" smtClean="0"/>
-              <a:t>3/19/2018</a:t>
+              <a:t>3/21/2018</a:t>
             </a:fld>
             <a:endParaRPr lang="en-US"/>
           </a:p>
@@ -2394,7 +2394,7 @@
           <a:p>
             <a:fld id="{91A10E39-C289-4936-BB8A-7D7F2E005D15}" type="datetimeFigureOut">
               <a:rPr lang="en-US" smtClean="0"/>
-              <a:t>3/19/2018</a:t>
+              <a:t>3/21/2018</a:t>
             </a:fld>
             <a:endParaRPr lang="en-US"/>
           </a:p>
@@ -2682,7 +2682,7 @@
           <a:p>
             <a:fld id="{91A10E39-C289-4936-BB8A-7D7F2E005D15}" type="datetimeFigureOut">
               <a:rPr lang="en-US" smtClean="0"/>
-              <a:t>3/19/2018</a:t>
+              <a:t>3/21/2018</a:t>
             </a:fld>
             <a:endParaRPr lang="en-US"/>
           </a:p>
@@ -2923,7 +2923,7 @@
           <a:p>
             <a:fld id="{91A10E39-C289-4936-BB8A-7D7F2E005D15}" type="datetimeFigureOut">
               <a:rPr lang="en-US" smtClean="0"/>
-              <a:t>3/19/2018</a:t>
+              <a:t>3/21/2018</a:t>
             </a:fld>
             <a:endParaRPr lang="en-US"/>
           </a:p>
@@ -3583,7 +3583,7 @@
         <p:spPr>
           <a:xfrm>
             <a:off x="8277253" y="1670526"/>
-            <a:ext cx="1253405" cy="947857"/>
+            <a:ext cx="1576051" cy="495995"/>
           </a:xfrm>
           <a:prstGeom prst="roundRect">
             <a:avLst>
@@ -3625,7 +3625,7 @@
             <a:pPr algn="ctr"/>
             <a:r>
               <a:rPr lang="en-US" sz="1600" dirty="0"/>
-              <a:t>Storage</a:t>
+              <a:t>Storage - US</a:t>
             </a:r>
             <a:endParaRPr lang="en-US" sz="2000" dirty="0"/>
           </a:p>
@@ -3645,8 +3645,8 @@
         </p:nvSpPr>
         <p:spPr>
           <a:xfrm>
-            <a:off x="8263266" y="498729"/>
-            <a:ext cx="1253405" cy="947857"/>
+            <a:off x="8263266" y="498730"/>
+            <a:ext cx="1576054" cy="440948"/>
           </a:xfrm>
           <a:prstGeom prst="roundRect">
             <a:avLst>
@@ -3688,7 +3688,7 @@
             <a:pPr algn="ctr"/>
             <a:r>
               <a:rPr lang="en-US" sz="1600" dirty="0"/>
-              <a:t>Power BI</a:t>
+              <a:t>Storage - UK</a:t>
             </a:r>
           </a:p>
         </p:txBody>
@@ -3976,19 +3976,16 @@
           <p:cNvCxnSpPr>
             <a:cxnSpLocks/>
             <a:stCxn id="46" idx="2"/>
-            <a:endCxn id="122" idx="2"/>
           </p:cNvCxnSpPr>
           <p:nvPr/>
         </p:nvCxnSpPr>
         <p:spPr>
-          <a:xfrm rot="5400000" flipH="1">
-            <a:off x="6064353" y="-1319161"/>
-            <a:ext cx="91286" cy="10252507"/>
-          </a:xfrm>
-          <a:prstGeom prst="bentConnector3">
-            <a:avLst>
-              <a:gd name="adj1" fmla="val -1540475"/>
-            </a:avLst>
+          <a:xfrm rot="5400000">
+            <a:off x="9957521" y="3152499"/>
+            <a:ext cx="578492" cy="1978965"/>
+          </a:xfrm>
+          <a:prstGeom prst="bentConnector2">
+            <a:avLst/>
           </a:prstGeom>
           <a:ln w="28575">
             <a:tailEnd type="triangle"/>
@@ -4009,44 +4006,6 @@
           </a:fontRef>
         </p:style>
       </p:cxnSp>
-      <p:sp>
-        <p:nvSpPr>
-          <p:cNvPr id="93" name="TextBox 92">
-            <a:extLst>
-              <a:ext uri="{FF2B5EF4-FFF2-40B4-BE49-F238E27FC236}">
-                <a16:creationId xmlns:a16="http://schemas.microsoft.com/office/drawing/2014/main" id="{CDC3E7B6-57CD-488F-B8EF-FEAA1641135F}"/>
-              </a:ext>
-            </a:extLst>
-          </p:cNvPr>
-          <p:cNvSpPr txBox="1"/>
-          <p:nvPr/>
-        </p:nvSpPr>
-        <p:spPr>
-          <a:xfrm>
-            <a:off x="5151776" y="5283655"/>
-            <a:ext cx="3300840" cy="307777"/>
-          </a:xfrm>
-          <a:prstGeom prst="rect">
-            <a:avLst/>
-          </a:prstGeom>
-          <a:noFill/>
-          <a:ln w="12700">
-            <a:noFill/>
-          </a:ln>
-        </p:spPr>
-        <p:txBody>
-          <a:bodyPr wrap="none" rtlCol="0">
-            <a:spAutoFit/>
-          </a:bodyPr>
-          <a:lstStyle/>
-          <a:p>
-            <a:r>
-              <a:rPr lang="en-US" sz="1400" dirty="0"/>
-              <a:t>Bi-directional communication with Device</a:t>
-            </a:r>
-          </a:p>
-        </p:txBody>
-      </p:sp>
       <p:cxnSp>
         <p:nvCxnSpPr>
           <p:cNvPr id="98" name="Straight Connector 97">
@@ -4097,55 +4056,12 @@
         </p:nvCxnSpPr>
         <p:spPr>
           <a:xfrm>
-            <a:off x="10025222" y="242109"/>
+            <a:off x="10101422" y="242109"/>
             <a:ext cx="0" cy="6468176"/>
           </a:xfrm>
           <a:prstGeom prst="line">
             <a:avLst/>
           </a:prstGeom>
-        </p:spPr>
-        <p:style>
-          <a:lnRef idx="1">
-            <a:schemeClr val="accent1"/>
-          </a:lnRef>
-          <a:fillRef idx="0">
-            <a:schemeClr val="accent1"/>
-          </a:fillRef>
-          <a:effectRef idx="0">
-            <a:schemeClr val="accent1"/>
-          </a:effectRef>
-          <a:fontRef idx="minor">
-            <a:schemeClr val="tx1"/>
-          </a:fontRef>
-        </p:style>
-      </p:cxnSp>
-      <p:cxnSp>
-        <p:nvCxnSpPr>
-          <p:cNvPr id="103" name="Connector: Elbow 102">
-            <a:extLst>
-              <a:ext uri="{FF2B5EF4-FFF2-40B4-BE49-F238E27FC236}">
-                <a16:creationId xmlns:a16="http://schemas.microsoft.com/office/drawing/2014/main" id="{22901D9E-3413-4ECE-969F-2683440C2F4E}"/>
-              </a:ext>
-            </a:extLst>
-          </p:cNvPr>
-          <p:cNvCxnSpPr>
-            <a:cxnSpLocks/>
-          </p:cNvCxnSpPr>
-          <p:nvPr/>
-        </p:nvCxnSpPr>
-        <p:spPr>
-          <a:xfrm rot="16200000" flipH="1">
-            <a:off x="5880410" y="-1407966"/>
-            <a:ext cx="4810" cy="10276352"/>
-          </a:xfrm>
-          <a:prstGeom prst="bentConnector3">
-            <a:avLst>
-              <a:gd name="adj1" fmla="val 41072391"/>
-            </a:avLst>
-          </a:prstGeom>
-          <a:ln w="28575">
-            <a:tailEnd type="triangle"/>
-          </a:ln>
         </p:spPr>
         <p:style>
           <a:lnRef idx="1">
@@ -4363,8 +4279,8 @@
         </p:nvSpPr>
         <p:spPr>
           <a:xfrm>
-            <a:off x="10386387" y="4143016"/>
-            <a:ext cx="1491469" cy="390620"/>
+            <a:off x="10405293" y="4250225"/>
+            <a:ext cx="1617794" cy="390620"/>
           </a:xfrm>
           <a:prstGeom prst="roundRect">
             <a:avLst>
@@ -4692,8 +4608,8 @@
         </p:nvCxnSpPr>
         <p:spPr>
           <a:xfrm flipV="1">
-            <a:off x="7035819" y="972658"/>
-            <a:ext cx="1227447" cy="730849"/>
+            <a:off x="7035819" y="719204"/>
+            <a:ext cx="1227447" cy="984303"/>
           </a:xfrm>
           <a:prstGeom prst="straightConnector1">
             <a:avLst/>
@@ -4721,15 +4637,13 @@
           </p:cNvPr>
           <p:cNvCxnSpPr>
             <a:cxnSpLocks/>
-            <a:stCxn id="131" idx="3"/>
-            <a:endCxn id="134" idx="1"/>
           </p:cNvCxnSpPr>
           <p:nvPr/>
         </p:nvCxnSpPr>
         <p:spPr>
           <a:xfrm>
-            <a:off x="7035819" y="1703507"/>
-            <a:ext cx="1241434" cy="440948"/>
+            <a:off x="7042172" y="1684748"/>
+            <a:ext cx="1241434" cy="215017"/>
           </a:xfrm>
           <a:prstGeom prst="straightConnector1">
             <a:avLst/>
@@ -4783,26 +4697,158 @@
           <a:effectLst/>
         </p:spPr>
       </p:cxnSp>
+      <p:pic>
+        <p:nvPicPr>
+          <p:cNvPr id="96" name="Picture 95">
+            <a:extLst>
+              <a:ext uri="{FF2B5EF4-FFF2-40B4-BE49-F238E27FC236}">
+                <a16:creationId xmlns:a16="http://schemas.microsoft.com/office/drawing/2014/main" id="{C4EAE335-B4E0-4072-8912-09123BAE9CB8}"/>
+              </a:ext>
+            </a:extLst>
+          </p:cNvPr>
+          <p:cNvPicPr>
+            <a:picLocks noChangeAspect="1"/>
+          </p:cNvPicPr>
+          <p:nvPr/>
+        </p:nvPicPr>
+        <p:blipFill>
+          <a:blip r:embed="rId4">
+            <a:biLevel thresh="25000"/>
+          </a:blip>
+          <a:stretch>
+            <a:fillRect/>
+          </a:stretch>
+        </p:blipFill>
+        <p:spPr>
+          <a:xfrm>
+            <a:off x="6575438" y="1192755"/>
+            <a:ext cx="416108" cy="321750"/>
+          </a:xfrm>
+          <a:prstGeom prst="rect">
+            <a:avLst/>
+          </a:prstGeom>
+        </p:spPr>
+      </p:pic>
+      <p:sp>
+        <p:nvSpPr>
+          <p:cNvPr id="128" name="Rectangle: Rounded Corners 127">
+            <a:extLst>
+              <a:ext uri="{FF2B5EF4-FFF2-40B4-BE49-F238E27FC236}">
+                <a16:creationId xmlns:a16="http://schemas.microsoft.com/office/drawing/2014/main" id="{DC6A999F-33FB-48DF-AC5A-294096781582}"/>
+              </a:ext>
+            </a:extLst>
+          </p:cNvPr>
+          <p:cNvSpPr/>
+          <p:nvPr/>
+        </p:nvSpPr>
+        <p:spPr>
+          <a:xfrm>
+            <a:off x="8024211" y="3039893"/>
+            <a:ext cx="1506447" cy="566290"/>
+          </a:xfrm>
+          <a:prstGeom prst="roundRect">
+            <a:avLst>
+              <a:gd name="adj" fmla="val 2050"/>
+            </a:avLst>
+          </a:prstGeom>
+          <a:solidFill>
+            <a:srgbClr val="1DC4FF"/>
+          </a:solidFill>
+          <a:ln w="3175">
+            <a:noFill/>
+          </a:ln>
+        </p:spPr>
+        <p:style>
+          <a:lnRef idx="2">
+            <a:schemeClr val="accent1">
+              <a:shade val="50000"/>
+            </a:schemeClr>
+          </a:lnRef>
+          <a:fillRef idx="1">
+            <a:schemeClr val="accent1"/>
+          </a:fillRef>
+          <a:effectRef idx="0">
+            <a:schemeClr val="accent1"/>
+          </a:effectRef>
+          <a:fontRef idx="minor">
+            <a:schemeClr val="lt1"/>
+          </a:fontRef>
+        </p:style>
+        <p:txBody>
+          <a:bodyPr rot="0" spcFirstLastPara="0" vertOverflow="overflow" horzOverflow="overflow" vert="horz" wrap="square" lIns="91440" tIns="45720" rIns="91440" bIns="45720" numCol="1" spcCol="0" rtlCol="0" fromWordArt="0" anchor="ctr" anchorCtr="0" forceAA="0" compatLnSpc="1">
+            <a:prstTxWarp prst="textNoShape">
+              <a:avLst/>
+            </a:prstTxWarp>
+            <a:noAutofit/>
+          </a:bodyPr>
+          <a:lstStyle/>
+          <a:p>
+            <a:pPr algn="ctr"/>
+            <a:r>
+              <a:rPr lang="en-US" sz="1600" dirty="0"/>
+              <a:t>Azure</a:t>
+            </a:r>
+          </a:p>
+          <a:p>
+            <a:pPr algn="ctr"/>
+            <a:r>
+              <a:rPr lang="en-US" sz="1600" dirty="0"/>
+              <a:t>Functions</a:t>
+            </a:r>
+            <a:endParaRPr lang="en-US" sz="2000" dirty="0"/>
+          </a:p>
+        </p:txBody>
+      </p:sp>
+      <p:pic>
+        <p:nvPicPr>
+          <p:cNvPr id="120" name="Picture 119">
+            <a:extLst>
+              <a:ext uri="{FF2B5EF4-FFF2-40B4-BE49-F238E27FC236}">
+                <a16:creationId xmlns:a16="http://schemas.microsoft.com/office/drawing/2014/main" id="{5C8A66E9-50BB-45A0-B6D1-D1966823B7A4}"/>
+              </a:ext>
+            </a:extLst>
+          </p:cNvPr>
+          <p:cNvPicPr>
+            <a:picLocks noChangeAspect="1"/>
+          </p:cNvPicPr>
+          <p:nvPr/>
+        </p:nvPicPr>
+        <p:blipFill>
+          <a:blip r:embed="rId5"/>
+          <a:stretch>
+            <a:fillRect/>
+          </a:stretch>
+        </p:blipFill>
+        <p:spPr>
+          <a:xfrm>
+            <a:off x="9209942" y="3098525"/>
+            <a:ext cx="274943" cy="283718"/>
+          </a:xfrm>
+          <a:prstGeom prst="rect">
+            <a:avLst/>
+          </a:prstGeom>
+        </p:spPr>
+      </p:pic>
       <p:cxnSp>
         <p:nvCxnSpPr>
-          <p:cNvPr id="73" name="Straight Arrow Connector 72">
-            <a:extLst>
-              <a:ext uri="{FF2B5EF4-FFF2-40B4-BE49-F238E27FC236}">
-                <a16:creationId xmlns:a16="http://schemas.microsoft.com/office/drawing/2014/main" id="{FE2800C5-5E66-48DC-9985-53720D515E38}"/>
+          <p:cNvPr id="130" name="Straight Arrow Connector 129" title="eMail Alert">
+            <a:extLst>
+              <a:ext uri="{FF2B5EF4-FFF2-40B4-BE49-F238E27FC236}">
+                <a16:creationId xmlns:a16="http://schemas.microsoft.com/office/drawing/2014/main" id="{B72849D4-5670-409C-B761-AB4C8A3635E9}"/>
               </a:ext>
             </a:extLst>
           </p:cNvPr>
           <p:cNvCxnSpPr>
             <a:cxnSpLocks/>
-            <a:stCxn id="133" idx="3"/>
-            <a:endCxn id="46" idx="1"/>
+            <a:stCxn id="131" idx="2"/>
+            <a:endCxn id="128" idx="0"/>
           </p:cNvCxnSpPr>
           <p:nvPr/>
         </p:nvCxnSpPr>
         <p:spPr>
           <a:xfrm>
-            <a:off x="9516671" y="972658"/>
-            <a:ext cx="1328374" cy="2488873"/>
+            <a:off x="6215924" y="2256178"/>
+            <a:ext cx="2561511" cy="783715"/>
           </a:xfrm>
           <a:prstGeom prst="straightConnector1">
             <a:avLst/>
@@ -4819,44 +4865,12 @@
           <a:effectLst/>
         </p:spPr>
       </p:cxnSp>
-      <p:pic>
-        <p:nvPicPr>
-          <p:cNvPr id="96" name="Picture 95">
-            <a:extLst>
-              <a:ext uri="{FF2B5EF4-FFF2-40B4-BE49-F238E27FC236}">
-                <a16:creationId xmlns:a16="http://schemas.microsoft.com/office/drawing/2014/main" id="{C4EAE335-B4E0-4072-8912-09123BAE9CB8}"/>
-              </a:ext>
-            </a:extLst>
-          </p:cNvPr>
-          <p:cNvPicPr>
-            <a:picLocks noChangeAspect="1"/>
-          </p:cNvPicPr>
-          <p:nvPr/>
-        </p:nvPicPr>
-        <p:blipFill>
-          <a:blip r:embed="rId4">
-            <a:biLevel thresh="25000"/>
-          </a:blip>
-          <a:stretch>
-            <a:fillRect/>
-          </a:stretch>
-        </p:blipFill>
-        <p:spPr>
-          <a:xfrm>
-            <a:off x="6575438" y="1192755"/>
-            <a:ext cx="416108" cy="321750"/>
-          </a:xfrm>
-          <a:prstGeom prst="rect">
-            <a:avLst/>
-          </a:prstGeom>
-        </p:spPr>
-      </p:pic>
-      <p:sp>
-        <p:nvSpPr>
-          <p:cNvPr id="128" name="Rectangle: Rounded Corners 127">
-            <a:extLst>
-              <a:ext uri="{FF2B5EF4-FFF2-40B4-BE49-F238E27FC236}">
-                <a16:creationId xmlns:a16="http://schemas.microsoft.com/office/drawing/2014/main" id="{DC6A999F-33FB-48DF-AC5A-294096781582}"/>
+      <p:sp>
+        <p:nvSpPr>
+          <p:cNvPr id="140" name="Rectangle: Rounded Corners 139">
+            <a:extLst>
+              <a:ext uri="{FF2B5EF4-FFF2-40B4-BE49-F238E27FC236}">
+                <a16:creationId xmlns:a16="http://schemas.microsoft.com/office/drawing/2014/main" id="{3FC4F8F6-E6D9-4FAE-8D0F-F5583AE35B69}"/>
               </a:ext>
             </a:extLst>
           </p:cNvPr>
@@ -4865,8 +4879,8 @@
         </p:nvSpPr>
         <p:spPr>
           <a:xfrm>
-            <a:off x="8024211" y="3039893"/>
-            <a:ext cx="1506447" cy="566290"/>
+            <a:off x="7750837" y="4143016"/>
+            <a:ext cx="1506447" cy="523164"/>
           </a:xfrm>
           <a:prstGeom prst="roundRect">
             <a:avLst>
@@ -4921,56 +4935,24 @@
           </a:p>
         </p:txBody>
       </p:sp>
-      <p:pic>
-        <p:nvPicPr>
-          <p:cNvPr id="120" name="Picture 119">
-            <a:extLst>
-              <a:ext uri="{FF2B5EF4-FFF2-40B4-BE49-F238E27FC236}">
-                <a16:creationId xmlns:a16="http://schemas.microsoft.com/office/drawing/2014/main" id="{5C8A66E9-50BB-45A0-B6D1-D1966823B7A4}"/>
-              </a:ext>
-            </a:extLst>
-          </p:cNvPr>
-          <p:cNvPicPr>
-            <a:picLocks noChangeAspect="1"/>
-          </p:cNvPicPr>
-          <p:nvPr/>
-        </p:nvPicPr>
-        <p:blipFill>
-          <a:blip r:embed="rId5"/>
-          <a:stretch>
-            <a:fillRect/>
-          </a:stretch>
-        </p:blipFill>
-        <p:spPr>
-          <a:xfrm>
-            <a:off x="9190892" y="3098525"/>
-            <a:ext cx="274943" cy="283718"/>
-          </a:xfrm>
-          <a:prstGeom prst="rect">
-            <a:avLst/>
-          </a:prstGeom>
-        </p:spPr>
-      </p:pic>
       <p:cxnSp>
         <p:nvCxnSpPr>
-          <p:cNvPr id="130" name="Straight Arrow Connector 129" title="eMail Alert">
-            <a:extLst>
-              <a:ext uri="{FF2B5EF4-FFF2-40B4-BE49-F238E27FC236}">
-                <a16:creationId xmlns:a16="http://schemas.microsoft.com/office/drawing/2014/main" id="{B72849D4-5670-409C-B761-AB4C8A3635E9}"/>
+          <p:cNvPr id="141" name="Straight Arrow Connector 140">
+            <a:extLst>
+              <a:ext uri="{FF2B5EF4-FFF2-40B4-BE49-F238E27FC236}">
+                <a16:creationId xmlns:a16="http://schemas.microsoft.com/office/drawing/2014/main" id="{1AE99FB8-24EA-498A-8086-99C2A80A4E91}"/>
               </a:ext>
             </a:extLst>
           </p:cNvPr>
           <p:cNvCxnSpPr>
             <a:cxnSpLocks/>
-            <a:stCxn id="131" idx="2"/>
-            <a:endCxn id="128" idx="0"/>
           </p:cNvCxnSpPr>
           <p:nvPr/>
         </p:nvCxnSpPr>
         <p:spPr>
-          <a:xfrm>
-            <a:off x="6215924" y="2256178"/>
-            <a:ext cx="2561511" cy="783715"/>
+          <a:xfrm flipH="1" flipV="1">
+            <a:off x="4168288" y="4402056"/>
+            <a:ext cx="3574160" cy="10931"/>
           </a:xfrm>
           <a:prstGeom prst="straightConnector1">
             <a:avLst/>
@@ -4987,96 +4969,24 @@
           <a:effectLst/>
         </p:spPr>
       </p:cxnSp>
-      <p:sp>
-        <p:nvSpPr>
-          <p:cNvPr id="140" name="Rectangle: Rounded Corners 139">
-            <a:extLst>
-              <a:ext uri="{FF2B5EF4-FFF2-40B4-BE49-F238E27FC236}">
-                <a16:creationId xmlns:a16="http://schemas.microsoft.com/office/drawing/2014/main" id="{3FC4F8F6-E6D9-4FAE-8D0F-F5583AE35B69}"/>
-              </a:ext>
-            </a:extLst>
-          </p:cNvPr>
-          <p:cNvSpPr/>
-          <p:nvPr/>
-        </p:nvSpPr>
-        <p:spPr>
-          <a:xfrm>
-            <a:off x="7750837" y="4099890"/>
-            <a:ext cx="1506447" cy="566290"/>
-          </a:xfrm>
-          <a:prstGeom prst="roundRect">
-            <a:avLst>
-              <a:gd name="adj" fmla="val 2050"/>
-            </a:avLst>
-          </a:prstGeom>
-          <a:solidFill>
-            <a:srgbClr val="1DC4FF"/>
-          </a:solidFill>
-          <a:ln w="3175">
-            <a:noFill/>
-          </a:ln>
-        </p:spPr>
-        <p:style>
-          <a:lnRef idx="2">
-            <a:schemeClr val="accent1">
-              <a:shade val="50000"/>
-            </a:schemeClr>
-          </a:lnRef>
-          <a:fillRef idx="1">
-            <a:schemeClr val="accent1"/>
-          </a:fillRef>
-          <a:effectRef idx="0">
-            <a:schemeClr val="accent1"/>
-          </a:effectRef>
-          <a:fontRef idx="minor">
-            <a:schemeClr val="lt1"/>
-          </a:fontRef>
-        </p:style>
-        <p:txBody>
-          <a:bodyPr rot="0" spcFirstLastPara="0" vertOverflow="overflow" horzOverflow="overflow" vert="horz" wrap="square" lIns="91440" tIns="45720" rIns="91440" bIns="45720" numCol="1" spcCol="0" rtlCol="0" fromWordArt="0" anchor="ctr" anchorCtr="0" forceAA="0" compatLnSpc="1">
-            <a:prstTxWarp prst="textNoShape">
-              <a:avLst/>
-            </a:prstTxWarp>
-            <a:noAutofit/>
-          </a:bodyPr>
-          <a:lstStyle/>
-          <a:p>
-            <a:pPr algn="ctr"/>
-            <a:r>
-              <a:rPr lang="en-US" sz="1600" dirty="0"/>
-              <a:t>Azure</a:t>
-            </a:r>
-          </a:p>
-          <a:p>
-            <a:pPr algn="ctr"/>
-            <a:r>
-              <a:rPr lang="en-US" sz="1600" dirty="0"/>
-              <a:t>Functions</a:t>
-            </a:r>
-            <a:endParaRPr lang="en-US" sz="2000" dirty="0"/>
-          </a:p>
-        </p:txBody>
-      </p:sp>
       <p:cxnSp>
         <p:nvCxnSpPr>
-          <p:cNvPr id="141" name="Straight Arrow Connector 140">
-            <a:extLst>
-              <a:ext uri="{FF2B5EF4-FFF2-40B4-BE49-F238E27FC236}">
-                <a16:creationId xmlns:a16="http://schemas.microsoft.com/office/drawing/2014/main" id="{1AE99FB8-24EA-498A-8086-99C2A80A4E91}"/>
+          <p:cNvPr id="144" name="Straight Arrow Connector 143">
+            <a:extLst>
+              <a:ext uri="{FF2B5EF4-FFF2-40B4-BE49-F238E27FC236}">
+                <a16:creationId xmlns:a16="http://schemas.microsoft.com/office/drawing/2014/main" id="{603FCF63-AE2D-44AC-B328-499224722003}"/>
               </a:ext>
             </a:extLst>
           </p:cNvPr>
           <p:cNvCxnSpPr>
             <a:cxnSpLocks/>
-            <a:stCxn id="140" idx="1"/>
-            <a:endCxn id="127" idx="3"/>
           </p:cNvCxnSpPr>
           <p:nvPr/>
         </p:nvCxnSpPr>
         <p:spPr>
-          <a:xfrm flipH="1" flipV="1">
-            <a:off x="4176677" y="3200028"/>
-            <a:ext cx="3574160" cy="1183007"/>
+          <a:xfrm>
+            <a:off x="6246656" y="2298097"/>
+            <a:ext cx="2266930" cy="1844919"/>
           </a:xfrm>
           <a:prstGeom prst="straightConnector1">
             <a:avLst/>
@@ -5093,26 +5003,333 @@
           <a:effectLst/>
         </p:spPr>
       </p:cxnSp>
+      <p:pic>
+        <p:nvPicPr>
+          <p:cNvPr id="149" name="Picture 148">
+            <a:extLst>
+              <a:ext uri="{FF2B5EF4-FFF2-40B4-BE49-F238E27FC236}">
+                <a16:creationId xmlns:a16="http://schemas.microsoft.com/office/drawing/2014/main" id="{7190AC16-5B57-4DBA-A2A2-9F5E64CFC36D}"/>
+              </a:ext>
+            </a:extLst>
+          </p:cNvPr>
+          <p:cNvPicPr>
+            <a:picLocks noChangeAspect="1"/>
+          </p:cNvPicPr>
+          <p:nvPr/>
+        </p:nvPicPr>
+        <p:blipFill>
+          <a:blip r:embed="rId5"/>
+          <a:stretch>
+            <a:fillRect/>
+          </a:stretch>
+        </p:blipFill>
+        <p:spPr>
+          <a:xfrm>
+            <a:off x="8932026" y="4185607"/>
+            <a:ext cx="274943" cy="283718"/>
+          </a:xfrm>
+          <a:prstGeom prst="rect">
+            <a:avLst/>
+          </a:prstGeom>
+        </p:spPr>
+      </p:pic>
+      <p:sp>
+        <p:nvSpPr>
+          <p:cNvPr id="150" name="TextBox 149">
+            <a:extLst>
+              <a:ext uri="{FF2B5EF4-FFF2-40B4-BE49-F238E27FC236}">
+                <a16:creationId xmlns:a16="http://schemas.microsoft.com/office/drawing/2014/main" id="{300135AA-E007-4FA3-A805-16B4EC37912F}"/>
+              </a:ext>
+            </a:extLst>
+          </p:cNvPr>
+          <p:cNvSpPr txBox="1"/>
+          <p:nvPr/>
+        </p:nvSpPr>
+        <p:spPr>
+          <a:xfrm rot="969151">
+            <a:off x="6957330" y="2648612"/>
+            <a:ext cx="1288558" cy="307777"/>
+          </a:xfrm>
+          <a:prstGeom prst="rect">
+            <a:avLst/>
+          </a:prstGeom>
+          <a:noFill/>
+        </p:spPr>
+        <p:txBody>
+          <a:bodyPr wrap="none" rtlCol="0">
+            <a:spAutoFit/>
+          </a:bodyPr>
+          <a:lstStyle/>
+          <a:p>
+            <a:r>
+              <a:rPr lang="en-US" sz="1400" dirty="0"/>
+              <a:t>Alert for e-mail</a:t>
+            </a:r>
+          </a:p>
+        </p:txBody>
+      </p:sp>
+      <p:sp>
+        <p:nvSpPr>
+          <p:cNvPr id="151" name="TextBox 150">
+            <a:extLst>
+              <a:ext uri="{FF2B5EF4-FFF2-40B4-BE49-F238E27FC236}">
+                <a16:creationId xmlns:a16="http://schemas.microsoft.com/office/drawing/2014/main" id="{08EB632C-DD55-4BC0-92DE-DB81A5FF4935}"/>
+              </a:ext>
+            </a:extLst>
+          </p:cNvPr>
+          <p:cNvSpPr txBox="1"/>
+          <p:nvPr/>
+        </p:nvSpPr>
+        <p:spPr>
+          <a:xfrm rot="2443809">
+            <a:off x="6378334" y="3190266"/>
+            <a:ext cx="1817549" cy="307777"/>
+          </a:xfrm>
+          <a:prstGeom prst="rect">
+            <a:avLst/>
+          </a:prstGeom>
+          <a:noFill/>
+        </p:spPr>
+        <p:txBody>
+          <a:bodyPr wrap="none" rtlCol="0">
+            <a:spAutoFit/>
+          </a:bodyPr>
+          <a:lstStyle/>
+          <a:p>
+            <a:r>
+              <a:rPr lang="en-US" sz="1400" dirty="0"/>
+              <a:t>Device rule processing</a:t>
+            </a:r>
+          </a:p>
+        </p:txBody>
+      </p:sp>
+      <p:sp>
+        <p:nvSpPr>
+          <p:cNvPr id="156" name="TextBox 155">
+            <a:extLst>
+              <a:ext uri="{FF2B5EF4-FFF2-40B4-BE49-F238E27FC236}">
+                <a16:creationId xmlns:a16="http://schemas.microsoft.com/office/drawing/2014/main" id="{5C91DEB2-C0DE-41AC-B03C-F5B6E929B31C}"/>
+              </a:ext>
+            </a:extLst>
+          </p:cNvPr>
+          <p:cNvSpPr txBox="1"/>
+          <p:nvPr/>
+        </p:nvSpPr>
+        <p:spPr>
+          <a:xfrm>
+            <a:off x="4796667" y="4096337"/>
+            <a:ext cx="2020810" cy="307777"/>
+          </a:xfrm>
+          <a:prstGeom prst="rect">
+            <a:avLst/>
+          </a:prstGeom>
+          <a:noFill/>
+        </p:spPr>
+        <p:txBody>
+          <a:bodyPr wrap="none" rtlCol="0">
+            <a:spAutoFit/>
+          </a:bodyPr>
+          <a:lstStyle/>
+          <a:p>
+            <a:r>
+              <a:rPr lang="en-US" sz="1400" dirty="0"/>
+              <a:t>Send command to device</a:t>
+            </a:r>
+          </a:p>
+        </p:txBody>
+      </p:sp>
       <p:cxnSp>
         <p:nvCxnSpPr>
-          <p:cNvPr id="144" name="Straight Arrow Connector 143">
-            <a:extLst>
-              <a:ext uri="{FF2B5EF4-FFF2-40B4-BE49-F238E27FC236}">
-                <a16:creationId xmlns:a16="http://schemas.microsoft.com/office/drawing/2014/main" id="{603FCF63-AE2D-44AC-B328-499224722003}"/>
+          <p:cNvPr id="17" name="Connector: Elbow 16">
+            <a:extLst>
+              <a:ext uri="{FF2B5EF4-FFF2-40B4-BE49-F238E27FC236}">
+                <a16:creationId xmlns:a16="http://schemas.microsoft.com/office/drawing/2014/main" id="{8BF2667B-724F-49BE-BEE5-13E4E2D4E1C4}"/>
               </a:ext>
             </a:extLst>
           </p:cNvPr>
           <p:cNvCxnSpPr>
             <a:cxnSpLocks/>
-            <a:stCxn id="131" idx="2"/>
-            <a:endCxn id="140" idx="1"/>
           </p:cNvCxnSpPr>
           <p:nvPr/>
         </p:nvCxnSpPr>
         <p:spPr>
+          <a:xfrm rot="10800000">
+            <a:off x="1000521" y="3761449"/>
+            <a:ext cx="1685425" cy="669776"/>
+          </a:xfrm>
+          <a:prstGeom prst="bentConnector2">
+            <a:avLst/>
+          </a:prstGeom>
+          <a:ln w="28575">
+            <a:tailEnd type="triangle"/>
+          </a:ln>
+        </p:spPr>
+        <p:style>
+          <a:lnRef idx="1">
+            <a:schemeClr val="accent1"/>
+          </a:lnRef>
+          <a:fillRef idx="0">
+            <a:schemeClr val="accent1"/>
+          </a:fillRef>
+          <a:effectRef idx="0">
+            <a:schemeClr val="accent1"/>
+          </a:effectRef>
+          <a:fontRef idx="minor">
+            <a:schemeClr val="tx1"/>
+          </a:fontRef>
+        </p:style>
+      </p:cxnSp>
+      <p:sp>
+        <p:nvSpPr>
+          <p:cNvPr id="56" name="Rectangle: Rounded Corners 55">
+            <a:extLst>
+              <a:ext uri="{FF2B5EF4-FFF2-40B4-BE49-F238E27FC236}">
+                <a16:creationId xmlns:a16="http://schemas.microsoft.com/office/drawing/2014/main" id="{001978A4-3DB9-4D0E-B3A3-A319816951B5}"/>
+              </a:ext>
+            </a:extLst>
+          </p:cNvPr>
+          <p:cNvSpPr/>
+          <p:nvPr/>
+        </p:nvSpPr>
+        <p:spPr>
           <a:xfrm>
-            <a:off x="6215924" y="2256178"/>
-            <a:ext cx="1534913" cy="2126857"/>
+            <a:off x="7816934" y="5030722"/>
+            <a:ext cx="1598883" cy="850626"/>
+          </a:xfrm>
+          <a:prstGeom prst="roundRect">
+            <a:avLst>
+              <a:gd name="adj" fmla="val 2050"/>
+            </a:avLst>
+          </a:prstGeom>
+          <a:solidFill>
+            <a:srgbClr val="1DC4FF"/>
+          </a:solidFill>
+          <a:ln w="3175">
+            <a:noFill/>
+          </a:ln>
+        </p:spPr>
+        <p:style>
+          <a:lnRef idx="2">
+            <a:schemeClr val="accent1">
+              <a:shade val="50000"/>
+            </a:schemeClr>
+          </a:lnRef>
+          <a:fillRef idx="1">
+            <a:schemeClr val="accent1"/>
+          </a:fillRef>
+          <a:effectRef idx="0">
+            <a:schemeClr val="accent1"/>
+          </a:effectRef>
+          <a:fontRef idx="minor">
+            <a:schemeClr val="lt1"/>
+          </a:fontRef>
+        </p:style>
+        <p:txBody>
+          <a:bodyPr rot="0" spcFirstLastPara="0" vertOverflow="overflow" horzOverflow="overflow" vert="horz" wrap="square" lIns="91440" tIns="45720" rIns="91440" bIns="45720" numCol="1" spcCol="0" rtlCol="0" fromWordArt="0" anchor="ctr" anchorCtr="0" forceAA="0" compatLnSpc="1">
+            <a:prstTxWarp prst="textNoShape">
+              <a:avLst/>
+            </a:prstTxWarp>
+            <a:noAutofit/>
+          </a:bodyPr>
+          <a:lstStyle/>
+          <a:p>
+            <a:pPr algn="ctr"/>
+            <a:r>
+              <a:rPr lang="en-US" sz="1600" dirty="0"/>
+              <a:t>Storage -</a:t>
+            </a:r>
+          </a:p>
+          <a:p>
+            <a:pPr algn="ctr"/>
+            <a:r>
+              <a:rPr lang="en-US" sz="1400" dirty="0"/>
+              <a:t>User Data and Reference Data</a:t>
+            </a:r>
+            <a:endParaRPr lang="en-US" dirty="0"/>
+          </a:p>
+        </p:txBody>
+      </p:sp>
+      <p:sp>
+        <p:nvSpPr>
+          <p:cNvPr id="60" name="Rectangle: Rounded Corners 59">
+            <a:extLst>
+              <a:ext uri="{FF2B5EF4-FFF2-40B4-BE49-F238E27FC236}">
+                <a16:creationId xmlns:a16="http://schemas.microsoft.com/office/drawing/2014/main" id="{585C43DE-CA57-499B-BB72-897BDE210BB2}"/>
+              </a:ext>
+            </a:extLst>
+          </p:cNvPr>
+          <p:cNvSpPr/>
+          <p:nvPr/>
+        </p:nvSpPr>
+        <p:spPr>
+          <a:xfrm>
+            <a:off x="8266836" y="1061841"/>
+            <a:ext cx="1576051" cy="495995"/>
+          </a:xfrm>
+          <a:prstGeom prst="roundRect">
+            <a:avLst>
+              <a:gd name="adj" fmla="val 2050"/>
+            </a:avLst>
+          </a:prstGeom>
+          <a:solidFill>
+            <a:srgbClr val="1DC4FF"/>
+          </a:solidFill>
+          <a:ln w="3175">
+            <a:noFill/>
+          </a:ln>
+        </p:spPr>
+        <p:style>
+          <a:lnRef idx="2">
+            <a:schemeClr val="accent1">
+              <a:shade val="50000"/>
+            </a:schemeClr>
+          </a:lnRef>
+          <a:fillRef idx="1">
+            <a:schemeClr val="accent1"/>
+          </a:fillRef>
+          <a:effectRef idx="0">
+            <a:schemeClr val="accent1"/>
+          </a:effectRef>
+          <a:fontRef idx="minor">
+            <a:schemeClr val="lt1"/>
+          </a:fontRef>
+        </p:style>
+        <p:txBody>
+          <a:bodyPr rot="0" spcFirstLastPara="0" vertOverflow="overflow" horzOverflow="overflow" vert="horz" wrap="square" lIns="91440" tIns="45720" rIns="91440" bIns="45720" numCol="1" spcCol="0" rtlCol="0" fromWordArt="0" anchor="ctr" anchorCtr="0" forceAA="0" compatLnSpc="1">
+            <a:prstTxWarp prst="textNoShape">
+              <a:avLst/>
+            </a:prstTxWarp>
+            <a:noAutofit/>
+          </a:bodyPr>
+          <a:lstStyle/>
+          <a:p>
+            <a:pPr algn="ctr"/>
+            <a:r>
+              <a:rPr lang="en-US" sz="1600" dirty="0"/>
+              <a:t>Storage – Others</a:t>
+            </a:r>
+            <a:endParaRPr lang="en-US" sz="2000" dirty="0"/>
+          </a:p>
+        </p:txBody>
+      </p:sp>
+      <p:cxnSp>
+        <p:nvCxnSpPr>
+          <p:cNvPr id="61" name="Straight Arrow Connector 60">
+            <a:extLst>
+              <a:ext uri="{FF2B5EF4-FFF2-40B4-BE49-F238E27FC236}">
+                <a16:creationId xmlns:a16="http://schemas.microsoft.com/office/drawing/2014/main" id="{8C22B28C-B432-40B8-88D7-D324CDCFBD35}"/>
+              </a:ext>
+            </a:extLst>
+          </p:cNvPr>
+          <p:cNvCxnSpPr>
+            <a:cxnSpLocks/>
+          </p:cNvCxnSpPr>
+          <p:nvPr/>
+        </p:nvCxnSpPr>
+        <p:spPr>
+          <a:xfrm flipV="1">
+            <a:off x="7071304" y="1303964"/>
+            <a:ext cx="1186744" cy="391240"/>
           </a:xfrm>
           <a:prstGeom prst="straightConnector1">
             <a:avLst/>
@@ -5129,137 +5346,154 @@
           <a:effectLst/>
         </p:spPr>
       </p:cxnSp>
-      <p:pic>
-        <p:nvPicPr>
-          <p:cNvPr id="149" name="Picture 148">
-            <a:extLst>
-              <a:ext uri="{FF2B5EF4-FFF2-40B4-BE49-F238E27FC236}">
-                <a16:creationId xmlns:a16="http://schemas.microsoft.com/office/drawing/2014/main" id="{7190AC16-5B57-4DBA-A2A2-9F5E64CFC36D}"/>
-              </a:ext>
-            </a:extLst>
-          </p:cNvPr>
-          <p:cNvPicPr>
-            <a:picLocks noChangeAspect="1"/>
-          </p:cNvPicPr>
+      <p:cxnSp>
+        <p:nvCxnSpPr>
+          <p:cNvPr id="66" name="Straight Arrow Connector 65">
+            <a:extLst>
+              <a:ext uri="{FF2B5EF4-FFF2-40B4-BE49-F238E27FC236}">
+                <a16:creationId xmlns:a16="http://schemas.microsoft.com/office/drawing/2014/main" id="{AB731F85-EB5E-47A5-AB99-518A019F4B98}"/>
+              </a:ext>
+            </a:extLst>
+          </p:cNvPr>
+          <p:cNvCxnSpPr>
+            <a:cxnSpLocks/>
+            <a:stCxn id="56" idx="3"/>
+            <a:endCxn id="136" idx="2"/>
+          </p:cNvCxnSpPr>
           <p:nvPr/>
-        </p:nvPicPr>
-        <p:blipFill>
-          <a:blip r:embed="rId5"/>
-          <a:stretch>
-            <a:fillRect/>
-          </a:stretch>
-        </p:blipFill>
-        <p:spPr>
-          <a:xfrm>
-            <a:off x="8932026" y="4147507"/>
-            <a:ext cx="274943" cy="283718"/>
-          </a:xfrm>
-          <a:prstGeom prst="rect">
+        </p:nvCxnSpPr>
+        <p:spPr>
+          <a:xfrm flipV="1">
+            <a:off x="9415817" y="4640845"/>
+            <a:ext cx="1798373" cy="815190"/>
+          </a:xfrm>
+          <a:prstGeom prst="straightConnector1">
             <a:avLst/>
           </a:prstGeom>
-        </p:spPr>
-      </p:pic>
-      <p:sp>
-        <p:nvSpPr>
-          <p:cNvPr id="150" name="TextBox 149">
-            <a:extLst>
-              <a:ext uri="{FF2B5EF4-FFF2-40B4-BE49-F238E27FC236}">
-                <a16:creationId xmlns:a16="http://schemas.microsoft.com/office/drawing/2014/main" id="{300135AA-E007-4FA3-A805-16B4EC37912F}"/>
-              </a:ext>
-            </a:extLst>
-          </p:cNvPr>
-          <p:cNvSpPr txBox="1"/>
+          <a:ln w="28575">
+            <a:solidFill>
+              <a:srgbClr val="0078D7"/>
+            </a:solidFill>
+            <a:headEnd type="triangle"/>
+            <a:tailEnd type="triangle"/>
+          </a:ln>
+        </p:spPr>
+        <p:style>
+          <a:lnRef idx="1">
+            <a:schemeClr val="accent1"/>
+          </a:lnRef>
+          <a:fillRef idx="0">
+            <a:schemeClr val="accent1"/>
+          </a:fillRef>
+          <a:effectRef idx="0">
+            <a:schemeClr val="accent1"/>
+          </a:effectRef>
+          <a:fontRef idx="minor">
+            <a:schemeClr val="tx1"/>
+          </a:fontRef>
+        </p:style>
+      </p:cxnSp>
+      <p:cxnSp>
+        <p:nvCxnSpPr>
+          <p:cNvPr id="69" name="Connector: Elbow 68">
+            <a:extLst>
+              <a:ext uri="{FF2B5EF4-FFF2-40B4-BE49-F238E27FC236}">
+                <a16:creationId xmlns:a16="http://schemas.microsoft.com/office/drawing/2014/main" id="{6901F9BD-4742-4D1C-93CE-8D7814C7704C}"/>
+              </a:ext>
+            </a:extLst>
+          </p:cNvPr>
+          <p:cNvCxnSpPr>
+            <a:cxnSpLocks/>
+            <a:stCxn id="56" idx="1"/>
+            <a:endCxn id="131" idx="2"/>
+          </p:cNvCxnSpPr>
           <p:nvPr/>
-        </p:nvSpPr>
-        <p:spPr>
-          <a:xfrm rot="969151">
-            <a:off x="6957330" y="2648612"/>
-            <a:ext cx="1288558" cy="307777"/>
-          </a:xfrm>
-          <a:prstGeom prst="rect">
+        </p:nvCxnSpPr>
+        <p:spPr>
+          <a:xfrm rot="10800000">
+            <a:off x="6215924" y="2256179"/>
+            <a:ext cx="1601010" cy="3199857"/>
+          </a:xfrm>
+          <a:prstGeom prst="bentConnector2">
             <a:avLst/>
           </a:prstGeom>
-          <a:noFill/>
-        </p:spPr>
-        <p:txBody>
-          <a:bodyPr wrap="none" rtlCol="0">
-            <a:spAutoFit/>
+          <a:ln w="28575">
+            <a:tailEnd type="triangle"/>
+          </a:ln>
+        </p:spPr>
+        <p:style>
+          <a:lnRef idx="1">
+            <a:schemeClr val="accent1"/>
+          </a:lnRef>
+          <a:fillRef idx="0">
+            <a:schemeClr val="accent1"/>
+          </a:fillRef>
+          <a:effectRef idx="0">
+            <a:schemeClr val="accent1"/>
+          </a:effectRef>
+          <a:fontRef idx="minor">
+            <a:schemeClr val="tx1"/>
+          </a:fontRef>
+        </p:style>
+      </p:cxnSp>
+      <p:sp>
+        <p:nvSpPr>
+          <p:cNvPr id="79" name="Rectangle: Rounded Corners 78">
+            <a:extLst>
+              <a:ext uri="{FF2B5EF4-FFF2-40B4-BE49-F238E27FC236}">
+                <a16:creationId xmlns:a16="http://schemas.microsoft.com/office/drawing/2014/main" id="{127DB555-D30E-4A0A-93D3-7A6E89589804}"/>
+              </a:ext>
+            </a:extLst>
+          </p:cNvPr>
+          <p:cNvSpPr/>
+          <p:nvPr/>
+        </p:nvSpPr>
+        <p:spPr>
+          <a:xfrm>
+            <a:off x="2681427" y="6158346"/>
+            <a:ext cx="1495247" cy="390620"/>
+          </a:xfrm>
+          <a:prstGeom prst="roundRect">
+            <a:avLst>
+              <a:gd name="adj" fmla="val 0"/>
+            </a:avLst>
+          </a:prstGeom>
+          <a:solidFill>
+            <a:srgbClr val="1DC4FF"/>
+          </a:solidFill>
+          <a:ln w="3175">
+            <a:noFill/>
+          </a:ln>
+        </p:spPr>
+        <p:style>
+          <a:lnRef idx="2">
+            <a:schemeClr val="accent1">
+              <a:shade val="50000"/>
+            </a:schemeClr>
+          </a:lnRef>
+          <a:fillRef idx="1">
+            <a:schemeClr val="accent1"/>
+          </a:fillRef>
+          <a:effectRef idx="0">
+            <a:schemeClr val="accent1"/>
+          </a:effectRef>
+          <a:fontRef idx="minor">
+            <a:schemeClr val="lt1"/>
+          </a:fontRef>
+        </p:style>
+        <p:txBody>
+          <a:bodyPr rot="0" spcFirstLastPara="0" vertOverflow="overflow" horzOverflow="overflow" vert="horz" wrap="square" lIns="91440" tIns="45720" rIns="91440" bIns="45720" numCol="1" spcCol="0" rtlCol="0" fromWordArt="0" anchor="ctr" anchorCtr="0" forceAA="0" compatLnSpc="1">
+            <a:prstTxWarp prst="textNoShape">
+              <a:avLst/>
+            </a:prstTxWarp>
+            <a:noAutofit/>
           </a:bodyPr>
           <a:lstStyle/>
           <a:p>
-            <a:r>
-              <a:rPr lang="en-US" sz="1400" dirty="0"/>
-              <a:t>Alert for e-mail</a:t>
-            </a:r>
-          </a:p>
-        </p:txBody>
-      </p:sp>
-      <p:sp>
-        <p:nvSpPr>
-          <p:cNvPr id="151" name="TextBox 150">
-            <a:extLst>
-              <a:ext uri="{FF2B5EF4-FFF2-40B4-BE49-F238E27FC236}">
-                <a16:creationId xmlns:a16="http://schemas.microsoft.com/office/drawing/2014/main" id="{08EB632C-DD55-4BC0-92DE-DB81A5FF4935}"/>
-              </a:ext>
-            </a:extLst>
-          </p:cNvPr>
-          <p:cNvSpPr txBox="1"/>
-          <p:nvPr/>
-        </p:nvSpPr>
-        <p:spPr>
-          <a:xfrm rot="3218606">
-            <a:off x="6249718" y="3171034"/>
-            <a:ext cx="1817549" cy="307777"/>
-          </a:xfrm>
-          <a:prstGeom prst="rect">
-            <a:avLst/>
-          </a:prstGeom>
-          <a:noFill/>
-        </p:spPr>
-        <p:txBody>
-          <a:bodyPr wrap="none" rtlCol="0">
-            <a:spAutoFit/>
-          </a:bodyPr>
-          <a:lstStyle/>
-          <a:p>
-            <a:r>
-              <a:rPr lang="en-US" sz="1400" dirty="0"/>
-              <a:t>Device rule processing</a:t>
-            </a:r>
-          </a:p>
-        </p:txBody>
-      </p:sp>
-      <p:sp>
-        <p:nvSpPr>
-          <p:cNvPr id="156" name="TextBox 155">
-            <a:extLst>
-              <a:ext uri="{FF2B5EF4-FFF2-40B4-BE49-F238E27FC236}">
-                <a16:creationId xmlns:a16="http://schemas.microsoft.com/office/drawing/2014/main" id="{5C91DEB2-C0DE-41AC-B03C-F5B6E929B31C}"/>
-              </a:ext>
-            </a:extLst>
-          </p:cNvPr>
-          <p:cNvSpPr txBox="1"/>
-          <p:nvPr/>
-        </p:nvSpPr>
-        <p:spPr>
-          <a:xfrm rot="1130945">
-            <a:off x="4893859" y="3767681"/>
-            <a:ext cx="2020810" cy="307777"/>
-          </a:xfrm>
-          <a:prstGeom prst="rect">
-            <a:avLst/>
-          </a:prstGeom>
-          <a:noFill/>
-        </p:spPr>
-        <p:txBody>
-          <a:bodyPr wrap="none" rtlCol="0">
-            <a:spAutoFit/>
-          </a:bodyPr>
-          <a:lstStyle/>
-          <a:p>
-            <a:r>
-              <a:rPr lang="en-US" sz="1400" dirty="0"/>
-              <a:t>Send command to device</a:t>
+            <a:pPr algn="ctr"/>
+            <a:r>
+              <a:rPr lang="en-US" sz="1600" dirty="0"/>
+              <a:t>DPS</a:t>
             </a:r>
           </a:p>
         </p:txBody>

</xml_diff>

<commit_message>
Final changes and cost estimates added..
</commit_message>
<xml_diff>
--- a/TechDesign.pptx
+++ b/TechDesign.pptx
@@ -7,7 +7,9 @@
   <p:sldIdLst>
     <p:sldId id="257" r:id="rId2"/>
     <p:sldId id="256" r:id="rId3"/>
-    <p:sldId id="258" r:id="rId4"/>
+    <p:sldId id="260" r:id="rId4"/>
+    <p:sldId id="259" r:id="rId5"/>
+    <p:sldId id="258" r:id="rId6"/>
   </p:sldIdLst>
   <p:sldSz cx="12192000" cy="6858000"/>
   <p:notesSz cx="6858000" cy="9144000"/>
@@ -273,7 +275,7 @@
           <a:p>
             <a:fld id="{91A10E39-C289-4936-BB8A-7D7F2E005D15}" type="datetimeFigureOut">
               <a:rPr lang="en-US" smtClean="0"/>
-              <a:t>3/21/2018</a:t>
+              <a:t>3/22/2018</a:t>
             </a:fld>
             <a:endParaRPr lang="en-US"/>
           </a:p>
@@ -471,7 +473,7 @@
           <a:p>
             <a:fld id="{91A10E39-C289-4936-BB8A-7D7F2E005D15}" type="datetimeFigureOut">
               <a:rPr lang="en-US" smtClean="0"/>
-              <a:t>3/21/2018</a:t>
+              <a:t>3/22/2018</a:t>
             </a:fld>
             <a:endParaRPr lang="en-US"/>
           </a:p>
@@ -679,7 +681,7 @@
           <a:p>
             <a:fld id="{91A10E39-C289-4936-BB8A-7D7F2E005D15}" type="datetimeFigureOut">
               <a:rPr lang="en-US" smtClean="0"/>
-              <a:t>3/21/2018</a:t>
+              <a:t>3/22/2018</a:t>
             </a:fld>
             <a:endParaRPr lang="en-US"/>
           </a:p>
@@ -877,7 +879,7 @@
           <a:p>
             <a:fld id="{91A10E39-C289-4936-BB8A-7D7F2E005D15}" type="datetimeFigureOut">
               <a:rPr lang="en-US" smtClean="0"/>
-              <a:t>3/21/2018</a:t>
+              <a:t>3/22/2018</a:t>
             </a:fld>
             <a:endParaRPr lang="en-US"/>
           </a:p>
@@ -1152,7 +1154,7 @@
           <a:p>
             <a:fld id="{91A10E39-C289-4936-BB8A-7D7F2E005D15}" type="datetimeFigureOut">
               <a:rPr lang="en-US" smtClean="0"/>
-              <a:t>3/21/2018</a:t>
+              <a:t>3/22/2018</a:t>
             </a:fld>
             <a:endParaRPr lang="en-US"/>
           </a:p>
@@ -1417,7 +1419,7 @@
           <a:p>
             <a:fld id="{91A10E39-C289-4936-BB8A-7D7F2E005D15}" type="datetimeFigureOut">
               <a:rPr lang="en-US" smtClean="0"/>
-              <a:t>3/21/2018</a:t>
+              <a:t>3/22/2018</a:t>
             </a:fld>
             <a:endParaRPr lang="en-US"/>
           </a:p>
@@ -1829,7 +1831,7 @@
           <a:p>
             <a:fld id="{91A10E39-C289-4936-BB8A-7D7F2E005D15}" type="datetimeFigureOut">
               <a:rPr lang="en-US" smtClean="0"/>
-              <a:t>3/21/2018</a:t>
+              <a:t>3/22/2018</a:t>
             </a:fld>
             <a:endParaRPr lang="en-US"/>
           </a:p>
@@ -1970,7 +1972,7 @@
           <a:p>
             <a:fld id="{91A10E39-C289-4936-BB8A-7D7F2E005D15}" type="datetimeFigureOut">
               <a:rPr lang="en-US" smtClean="0"/>
-              <a:t>3/21/2018</a:t>
+              <a:t>3/22/2018</a:t>
             </a:fld>
             <a:endParaRPr lang="en-US"/>
           </a:p>
@@ -2083,7 +2085,7 @@
           <a:p>
             <a:fld id="{91A10E39-C289-4936-BB8A-7D7F2E005D15}" type="datetimeFigureOut">
               <a:rPr lang="en-US" smtClean="0"/>
-              <a:t>3/21/2018</a:t>
+              <a:t>3/22/2018</a:t>
             </a:fld>
             <a:endParaRPr lang="en-US"/>
           </a:p>
@@ -2394,7 +2396,7 @@
           <a:p>
             <a:fld id="{91A10E39-C289-4936-BB8A-7D7F2E005D15}" type="datetimeFigureOut">
               <a:rPr lang="en-US" smtClean="0"/>
-              <a:t>3/21/2018</a:t>
+              <a:t>3/22/2018</a:t>
             </a:fld>
             <a:endParaRPr lang="en-US"/>
           </a:p>
@@ -2682,7 +2684,7 @@
           <a:p>
             <a:fld id="{91A10E39-C289-4936-BB8A-7D7F2E005D15}" type="datetimeFigureOut">
               <a:rPr lang="en-US" smtClean="0"/>
-              <a:t>3/21/2018</a:t>
+              <a:t>3/22/2018</a:t>
             </a:fld>
             <a:endParaRPr lang="en-US"/>
           </a:p>
@@ -2923,7 +2925,7 @@
           <a:p>
             <a:fld id="{91A10E39-C289-4936-BB8A-7D7F2E005D15}" type="datetimeFigureOut">
               <a:rPr lang="en-US" smtClean="0"/>
-              <a:t>3/21/2018</a:t>
+              <a:t>3/22/2018</a:t>
             </a:fld>
             <a:endParaRPr lang="en-US"/>
           </a:p>
@@ -5348,53 +5350,6 @@
       </p:cxnSp>
       <p:cxnSp>
         <p:nvCxnSpPr>
-          <p:cNvPr id="66" name="Straight Arrow Connector 65">
-            <a:extLst>
-              <a:ext uri="{FF2B5EF4-FFF2-40B4-BE49-F238E27FC236}">
-                <a16:creationId xmlns:a16="http://schemas.microsoft.com/office/drawing/2014/main" id="{AB731F85-EB5E-47A5-AB99-518A019F4B98}"/>
-              </a:ext>
-            </a:extLst>
-          </p:cNvPr>
-          <p:cNvCxnSpPr>
-            <a:cxnSpLocks/>
-            <a:stCxn id="56" idx="3"/>
-            <a:endCxn id="136" idx="2"/>
-          </p:cNvCxnSpPr>
-          <p:nvPr/>
-        </p:nvCxnSpPr>
-        <p:spPr>
-          <a:xfrm flipV="1">
-            <a:off x="9415817" y="4640845"/>
-            <a:ext cx="1798373" cy="815190"/>
-          </a:xfrm>
-          <a:prstGeom prst="straightConnector1">
-            <a:avLst/>
-          </a:prstGeom>
-          <a:ln w="28575">
-            <a:solidFill>
-              <a:srgbClr val="0078D7"/>
-            </a:solidFill>
-            <a:headEnd type="triangle"/>
-            <a:tailEnd type="triangle"/>
-          </a:ln>
-        </p:spPr>
-        <p:style>
-          <a:lnRef idx="1">
-            <a:schemeClr val="accent1"/>
-          </a:lnRef>
-          <a:fillRef idx="0">
-            <a:schemeClr val="accent1"/>
-          </a:fillRef>
-          <a:effectRef idx="0">
-            <a:schemeClr val="accent1"/>
-          </a:effectRef>
-          <a:fontRef idx="minor">
-            <a:schemeClr val="tx1"/>
-          </a:fontRef>
-        </p:style>
-      </p:cxnSp>
-      <p:cxnSp>
-        <p:nvCxnSpPr>
           <p:cNvPr id="69" name="Connector: Elbow 68">
             <a:extLst>
               <a:ext uri="{FF2B5EF4-FFF2-40B4-BE49-F238E27FC236}">
@@ -5498,6 +5453,50 @@
           </a:p>
         </p:txBody>
       </p:sp>
+      <p:cxnSp>
+        <p:nvCxnSpPr>
+          <p:cNvPr id="43" name="Connector: Elbow 42">
+            <a:extLst>
+              <a:ext uri="{FF2B5EF4-FFF2-40B4-BE49-F238E27FC236}">
+                <a16:creationId xmlns:a16="http://schemas.microsoft.com/office/drawing/2014/main" id="{5251B8F3-678B-48B8-96DE-C9859888BF62}"/>
+              </a:ext>
+            </a:extLst>
+          </p:cNvPr>
+          <p:cNvCxnSpPr>
+            <a:cxnSpLocks/>
+            <a:endCxn id="56" idx="3"/>
+          </p:cNvCxnSpPr>
+          <p:nvPr/>
+        </p:nvCxnSpPr>
+        <p:spPr>
+          <a:xfrm rot="10800000" flipV="1">
+            <a:off x="9415817" y="4655521"/>
+            <a:ext cx="1820432" cy="800514"/>
+          </a:xfrm>
+          <a:prstGeom prst="bentConnector3">
+            <a:avLst>
+              <a:gd name="adj1" fmla="val -691"/>
+            </a:avLst>
+          </a:prstGeom>
+          <a:ln w="28575">
+            <a:tailEnd type="triangle"/>
+          </a:ln>
+        </p:spPr>
+        <p:style>
+          <a:lnRef idx="1">
+            <a:schemeClr val="accent1"/>
+          </a:lnRef>
+          <a:fillRef idx="0">
+            <a:schemeClr val="accent1"/>
+          </a:fillRef>
+          <a:effectRef idx="0">
+            <a:schemeClr val="accent1"/>
+          </a:effectRef>
+          <a:fontRef idx="minor">
+            <a:schemeClr val="tx1"/>
+          </a:fontRef>
+        </p:style>
+      </p:cxnSp>
     </p:spTree>
     <p:extLst>
       <p:ext uri="{BB962C8B-B14F-4D97-AF65-F5344CB8AC3E}">
@@ -5512,6 +5511,2407 @@
 </file>
 
 <file path=ppt/slides/slide3.xml><?xml version="1.0" encoding="utf-8"?>
+<p:sld xmlns:a="http://schemas.openxmlformats.org/drawingml/2006/main" xmlns:r="http://schemas.openxmlformats.org/officeDocument/2006/relationships" xmlns:p="http://schemas.openxmlformats.org/presentationml/2006/main">
+  <p:cSld>
+    <p:spTree>
+      <p:nvGrpSpPr>
+        <p:cNvPr id="1" name=""/>
+        <p:cNvGrpSpPr/>
+        <p:nvPr/>
+      </p:nvGrpSpPr>
+      <p:grpSpPr>
+        <a:xfrm>
+          <a:off x="0" y="0"/>
+          <a:ext cx="0" cy="0"/>
+          <a:chOff x="0" y="0"/>
+          <a:chExt cx="0" cy="0"/>
+        </a:xfrm>
+      </p:grpSpPr>
+      <p:sp>
+        <p:nvSpPr>
+          <p:cNvPr id="2" name="Title 1">
+            <a:extLst>
+              <a:ext uri="{FF2B5EF4-FFF2-40B4-BE49-F238E27FC236}">
+                <a16:creationId xmlns:a16="http://schemas.microsoft.com/office/drawing/2014/main" id="{D151488F-6879-4128-A580-C7E22AE917FC}"/>
+              </a:ext>
+            </a:extLst>
+          </p:cNvPr>
+          <p:cNvSpPr>
+            <a:spLocks noGrp="1"/>
+          </p:cNvSpPr>
+          <p:nvPr>
+            <p:ph type="title"/>
+          </p:nvPr>
+        </p:nvSpPr>
+        <p:spPr>
+          <a:xfrm>
+            <a:off x="838200" y="365126"/>
+            <a:ext cx="10515600" cy="347938"/>
+          </a:xfrm>
+        </p:spPr>
+        <p:txBody>
+          <a:bodyPr>
+            <a:normAutofit fontScale="90000"/>
+          </a:bodyPr>
+          <a:lstStyle/>
+          <a:p>
+            <a:r>
+              <a:rPr lang="en-US" i="1" u="sng" dirty="0"/>
+              <a:t>Some design ideas for Brain Storming	</a:t>
+            </a:r>
+          </a:p>
+        </p:txBody>
+      </p:sp>
+      <p:sp>
+        <p:nvSpPr>
+          <p:cNvPr id="3" name="Content Placeholder 2">
+            <a:extLst>
+              <a:ext uri="{FF2B5EF4-FFF2-40B4-BE49-F238E27FC236}">
+                <a16:creationId xmlns:a16="http://schemas.microsoft.com/office/drawing/2014/main" id="{407FFA3E-5C9D-4451-AC40-F5ACC6CC48C0}"/>
+              </a:ext>
+            </a:extLst>
+          </p:cNvPr>
+          <p:cNvSpPr>
+            <a:spLocks noGrp="1"/>
+          </p:cNvSpPr>
+          <p:nvPr>
+            <p:ph idx="1"/>
+          </p:nvPr>
+        </p:nvSpPr>
+        <p:spPr>
+          <a:xfrm>
+            <a:off x="838199" y="1031846"/>
+            <a:ext cx="10788941" cy="5603846"/>
+          </a:xfrm>
+        </p:spPr>
+        <p:txBody>
+          <a:bodyPr>
+            <a:normAutofit/>
+          </a:bodyPr>
+          <a:lstStyle/>
+          <a:p>
+            <a:r>
+              <a:rPr lang="en-US" dirty="0"/>
+              <a:t>In this solution, IoTHub can be provisioned from any region and can register devices across the globe.</a:t>
+            </a:r>
+          </a:p>
+          <a:p>
+            <a:endParaRPr lang="en-US" dirty="0"/>
+          </a:p>
+          <a:p>
+            <a:r>
+              <a:rPr lang="en-US" dirty="0"/>
+              <a:t>Using the message location property, the data is saved is in Europe or US region. Data at rest is taken care of.</a:t>
+            </a:r>
+          </a:p>
+          <a:p>
+            <a:endParaRPr lang="en-US" dirty="0"/>
+          </a:p>
+          <a:p>
+            <a:r>
+              <a:rPr lang="en-US" dirty="0"/>
+              <a:t>If data at flight need to be handled separately, then devices from US region will be registered to IoTHub in US region, same for Europe and can have a one IoTHub to handle all other regions.</a:t>
+            </a:r>
+          </a:p>
+          <a:p>
+            <a:endParaRPr lang="en-US" dirty="0"/>
+          </a:p>
+          <a:p>
+            <a:r>
+              <a:rPr lang="en-US" dirty="0"/>
+              <a:t>POC’s can de identified and worked upon based on discussions.</a:t>
+            </a:r>
+          </a:p>
+          <a:p>
+            <a:endParaRPr lang="en-US" dirty="0"/>
+          </a:p>
+          <a:p>
+            <a:endParaRPr lang="en-US" dirty="0"/>
+          </a:p>
+        </p:txBody>
+      </p:sp>
+    </p:spTree>
+    <p:extLst>
+      <p:ext uri="{BB962C8B-B14F-4D97-AF65-F5344CB8AC3E}">
+        <p14:creationId xmlns:p14="http://schemas.microsoft.com/office/powerpoint/2010/main" val="725364641"/>
+      </p:ext>
+    </p:extLst>
+  </p:cSld>
+  <p:clrMapOvr>
+    <a:masterClrMapping/>
+  </p:clrMapOvr>
+</p:sld>
+</file>
+
+<file path=ppt/slides/slide4.xml><?xml version="1.0" encoding="utf-8"?>
+<p:sld xmlns:a="http://schemas.openxmlformats.org/drawingml/2006/main" xmlns:r="http://schemas.openxmlformats.org/officeDocument/2006/relationships" xmlns:p="http://schemas.openxmlformats.org/presentationml/2006/main">
+  <p:cSld>
+    <p:bg>
+      <p:bgPr>
+        <a:solidFill>
+          <a:schemeClr val="bg1"/>
+        </a:solidFill>
+        <a:effectLst/>
+      </p:bgPr>
+    </p:bg>
+    <p:spTree>
+      <p:nvGrpSpPr>
+        <p:cNvPr id="1" name=""/>
+        <p:cNvGrpSpPr/>
+        <p:nvPr/>
+      </p:nvGrpSpPr>
+      <p:grpSpPr>
+        <a:xfrm>
+          <a:off x="0" y="0"/>
+          <a:ext cx="0" cy="0"/>
+          <a:chOff x="0" y="0"/>
+          <a:chExt cx="0" cy="0"/>
+        </a:xfrm>
+      </p:grpSpPr>
+      <p:sp>
+        <p:nvSpPr>
+          <p:cNvPr id="134" name="Rectangle: Rounded Corners 133">
+            <a:extLst>
+              <a:ext uri="{FF2B5EF4-FFF2-40B4-BE49-F238E27FC236}">
+                <a16:creationId xmlns:a16="http://schemas.microsoft.com/office/drawing/2014/main" id="{90F3144A-E3AF-4CB4-9C9E-5F011BD74E66}"/>
+              </a:ext>
+            </a:extLst>
+          </p:cNvPr>
+          <p:cNvSpPr/>
+          <p:nvPr/>
+        </p:nvSpPr>
+        <p:spPr>
+          <a:xfrm>
+            <a:off x="8277253" y="1670526"/>
+            <a:ext cx="1576051" cy="495995"/>
+          </a:xfrm>
+          <a:prstGeom prst="roundRect">
+            <a:avLst>
+              <a:gd name="adj" fmla="val 2050"/>
+            </a:avLst>
+          </a:prstGeom>
+          <a:solidFill>
+            <a:srgbClr val="1DC4FF"/>
+          </a:solidFill>
+          <a:ln w="3175">
+            <a:noFill/>
+          </a:ln>
+        </p:spPr>
+        <p:style>
+          <a:lnRef idx="2">
+            <a:schemeClr val="accent1">
+              <a:shade val="50000"/>
+            </a:schemeClr>
+          </a:lnRef>
+          <a:fillRef idx="1">
+            <a:schemeClr val="accent1"/>
+          </a:fillRef>
+          <a:effectRef idx="0">
+            <a:schemeClr val="accent1"/>
+          </a:effectRef>
+          <a:fontRef idx="minor">
+            <a:schemeClr val="lt1"/>
+          </a:fontRef>
+        </p:style>
+        <p:txBody>
+          <a:bodyPr rot="0" spcFirstLastPara="0" vertOverflow="overflow" horzOverflow="overflow" vert="horz" wrap="square" lIns="91440" tIns="45720" rIns="91440" bIns="45720" numCol="1" spcCol="0" rtlCol="0" fromWordArt="0" anchor="ctr" anchorCtr="0" forceAA="0" compatLnSpc="1">
+            <a:prstTxWarp prst="textNoShape">
+              <a:avLst/>
+            </a:prstTxWarp>
+            <a:noAutofit/>
+          </a:bodyPr>
+          <a:lstStyle/>
+          <a:p>
+            <a:pPr algn="ctr"/>
+            <a:r>
+              <a:rPr lang="en-US" sz="1600" dirty="0"/>
+              <a:t>Storage - US</a:t>
+            </a:r>
+            <a:endParaRPr lang="en-US" sz="2000" dirty="0"/>
+          </a:p>
+        </p:txBody>
+      </p:sp>
+      <p:sp>
+        <p:nvSpPr>
+          <p:cNvPr id="133" name="Rectangle: Rounded Corners 132">
+            <a:extLst>
+              <a:ext uri="{FF2B5EF4-FFF2-40B4-BE49-F238E27FC236}">
+                <a16:creationId xmlns:a16="http://schemas.microsoft.com/office/drawing/2014/main" id="{B7D023A9-8B6A-46A4-8CDB-AF718387E1E9}"/>
+              </a:ext>
+            </a:extLst>
+          </p:cNvPr>
+          <p:cNvSpPr/>
+          <p:nvPr/>
+        </p:nvSpPr>
+        <p:spPr>
+          <a:xfrm>
+            <a:off x="8263266" y="498730"/>
+            <a:ext cx="1576054" cy="440948"/>
+          </a:xfrm>
+          <a:prstGeom prst="roundRect">
+            <a:avLst>
+              <a:gd name="adj" fmla="val 0"/>
+            </a:avLst>
+          </a:prstGeom>
+          <a:solidFill>
+            <a:srgbClr val="1DC4FF"/>
+          </a:solidFill>
+          <a:ln w="3175">
+            <a:noFill/>
+          </a:ln>
+        </p:spPr>
+        <p:style>
+          <a:lnRef idx="2">
+            <a:schemeClr val="accent1">
+              <a:shade val="50000"/>
+            </a:schemeClr>
+          </a:lnRef>
+          <a:fillRef idx="1">
+            <a:schemeClr val="accent1"/>
+          </a:fillRef>
+          <a:effectRef idx="0">
+            <a:schemeClr val="accent1"/>
+          </a:effectRef>
+          <a:fontRef idx="minor">
+            <a:schemeClr val="lt1"/>
+          </a:fontRef>
+        </p:style>
+        <p:txBody>
+          <a:bodyPr rot="0" spcFirstLastPara="0" vertOverflow="overflow" horzOverflow="overflow" vert="horz" wrap="square" lIns="91440" tIns="45720" rIns="91440" bIns="45720" numCol="1" spcCol="0" rtlCol="0" fromWordArt="0" anchor="ctr" anchorCtr="0" forceAA="0" compatLnSpc="1">
+            <a:prstTxWarp prst="textNoShape">
+              <a:avLst/>
+            </a:prstTxWarp>
+            <a:noAutofit/>
+          </a:bodyPr>
+          <a:lstStyle/>
+          <a:p>
+            <a:pPr algn="ctr"/>
+            <a:r>
+              <a:rPr lang="en-US" sz="1600" dirty="0"/>
+              <a:t>Storage - UK</a:t>
+            </a:r>
+          </a:p>
+        </p:txBody>
+      </p:sp>
+      <p:sp>
+        <p:nvSpPr>
+          <p:cNvPr id="131" name="Rectangle: Rounded Corners 130">
+            <a:extLst>
+              <a:ext uri="{FF2B5EF4-FFF2-40B4-BE49-F238E27FC236}">
+                <a16:creationId xmlns:a16="http://schemas.microsoft.com/office/drawing/2014/main" id="{593820FD-F3FE-4B62-89E6-A1DC27974C89}"/>
+              </a:ext>
+            </a:extLst>
+          </p:cNvPr>
+          <p:cNvSpPr/>
+          <p:nvPr/>
+        </p:nvSpPr>
+        <p:spPr>
+          <a:xfrm>
+            <a:off x="5396029" y="1150836"/>
+            <a:ext cx="1639790" cy="1105342"/>
+          </a:xfrm>
+          <a:prstGeom prst="roundRect">
+            <a:avLst>
+              <a:gd name="adj" fmla="val 0"/>
+            </a:avLst>
+          </a:prstGeom>
+          <a:solidFill>
+            <a:srgbClr val="1DC4FF"/>
+          </a:solidFill>
+          <a:ln w="3175">
+            <a:noFill/>
+          </a:ln>
+        </p:spPr>
+        <p:style>
+          <a:lnRef idx="2">
+            <a:schemeClr val="accent1">
+              <a:shade val="50000"/>
+            </a:schemeClr>
+          </a:lnRef>
+          <a:fillRef idx="1">
+            <a:schemeClr val="accent1"/>
+          </a:fillRef>
+          <a:effectRef idx="0">
+            <a:schemeClr val="accent1"/>
+          </a:effectRef>
+          <a:fontRef idx="minor">
+            <a:schemeClr val="lt1"/>
+          </a:fontRef>
+        </p:style>
+        <p:txBody>
+          <a:bodyPr rot="0" spcFirstLastPara="0" vertOverflow="overflow" horzOverflow="overflow" vert="horz" wrap="square" lIns="91440" tIns="45720" rIns="91440" bIns="45720" numCol="1" spcCol="0" rtlCol="0" fromWordArt="0" anchor="ctr" anchorCtr="0" forceAA="0" compatLnSpc="1">
+            <a:prstTxWarp prst="textNoShape">
+              <a:avLst/>
+            </a:prstTxWarp>
+            <a:noAutofit/>
+          </a:bodyPr>
+          <a:lstStyle/>
+          <a:p>
+            <a:pPr algn="ctr"/>
+            <a:r>
+              <a:rPr lang="en-US" sz="1600" dirty="0"/>
+              <a:t>Stream </a:t>
+            </a:r>
+          </a:p>
+          <a:p>
+            <a:pPr algn="ctr"/>
+            <a:r>
+              <a:rPr lang="en-US" sz="1600" dirty="0"/>
+              <a:t>Analytics</a:t>
+            </a:r>
+          </a:p>
+        </p:txBody>
+      </p:sp>
+      <p:sp>
+        <p:nvSpPr>
+          <p:cNvPr id="127" name="Rectangle: Rounded Corners 126">
+            <a:extLst>
+              <a:ext uri="{FF2B5EF4-FFF2-40B4-BE49-F238E27FC236}">
+                <a16:creationId xmlns:a16="http://schemas.microsoft.com/office/drawing/2014/main" id="{88F07507-8E82-43A9-B595-1720B8748D8C}"/>
+              </a:ext>
+            </a:extLst>
+          </p:cNvPr>
+          <p:cNvSpPr/>
+          <p:nvPr/>
+        </p:nvSpPr>
+        <p:spPr>
+          <a:xfrm>
+            <a:off x="2681427" y="500750"/>
+            <a:ext cx="1441343" cy="2628800"/>
+          </a:xfrm>
+          <a:prstGeom prst="roundRect">
+            <a:avLst>
+              <a:gd name="adj" fmla="val 2720"/>
+            </a:avLst>
+          </a:prstGeom>
+          <a:solidFill>
+            <a:srgbClr val="1DC4FF"/>
+          </a:solidFill>
+          <a:ln w="3175">
+            <a:noFill/>
+          </a:ln>
+        </p:spPr>
+        <p:style>
+          <a:lnRef idx="2">
+            <a:schemeClr val="accent1">
+              <a:shade val="50000"/>
+            </a:schemeClr>
+          </a:lnRef>
+          <a:fillRef idx="1">
+            <a:schemeClr val="accent1"/>
+          </a:fillRef>
+          <a:effectRef idx="0">
+            <a:schemeClr val="accent1"/>
+          </a:effectRef>
+          <a:fontRef idx="minor">
+            <a:schemeClr val="lt1"/>
+          </a:fontRef>
+        </p:style>
+        <p:txBody>
+          <a:bodyPr rot="0" spcFirstLastPara="0" vertOverflow="overflow" horzOverflow="overflow" vert="horz" wrap="square" lIns="91440" tIns="45720" rIns="91440" bIns="45720" numCol="1" spcCol="0" rtlCol="0" fromWordArt="0" anchor="ctr" anchorCtr="0" forceAA="0" compatLnSpc="1">
+            <a:prstTxWarp prst="textNoShape">
+              <a:avLst/>
+            </a:prstTxWarp>
+            <a:noAutofit/>
+          </a:bodyPr>
+          <a:lstStyle/>
+          <a:p>
+            <a:pPr algn="ctr"/>
+            <a:r>
+              <a:rPr lang="en-US" sz="1600" dirty="0"/>
+              <a:t>IOT Hub - 1</a:t>
+            </a:r>
+          </a:p>
+        </p:txBody>
+      </p:sp>
+      <p:sp>
+        <p:nvSpPr>
+          <p:cNvPr id="123" name="Rectangle: Rounded Corners 122">
+            <a:extLst>
+              <a:ext uri="{FF2B5EF4-FFF2-40B4-BE49-F238E27FC236}">
+                <a16:creationId xmlns:a16="http://schemas.microsoft.com/office/drawing/2014/main" id="{4F0A67B4-910D-44DF-A365-2D5DEABFD208}"/>
+              </a:ext>
+            </a:extLst>
+          </p:cNvPr>
+          <p:cNvSpPr/>
+          <p:nvPr/>
+        </p:nvSpPr>
+        <p:spPr>
+          <a:xfrm>
+            <a:off x="148519" y="2664108"/>
+            <a:ext cx="1192240" cy="812089"/>
+          </a:xfrm>
+          <a:prstGeom prst="roundRect">
+            <a:avLst>
+              <a:gd name="adj" fmla="val 0"/>
+            </a:avLst>
+          </a:prstGeom>
+          <a:solidFill>
+            <a:schemeClr val="bg1"/>
+          </a:solidFill>
+          <a:ln w="3175">
+            <a:solidFill>
+              <a:srgbClr val="0070C0"/>
+            </a:solidFill>
+          </a:ln>
+        </p:spPr>
+        <p:style>
+          <a:lnRef idx="2">
+            <a:schemeClr val="accent1">
+              <a:shade val="50000"/>
+            </a:schemeClr>
+          </a:lnRef>
+          <a:fillRef idx="1">
+            <a:schemeClr val="accent1"/>
+          </a:fillRef>
+          <a:effectRef idx="0">
+            <a:schemeClr val="accent1"/>
+          </a:effectRef>
+          <a:fontRef idx="minor">
+            <a:schemeClr val="lt1"/>
+          </a:fontRef>
+        </p:style>
+        <p:txBody>
+          <a:bodyPr rot="0" spcFirstLastPara="0" vertOverflow="overflow" horzOverflow="overflow" vert="horz" wrap="square" lIns="91440" tIns="45720" rIns="91440" bIns="45720" numCol="1" spcCol="0" rtlCol="0" fromWordArt="0" anchor="ctr" anchorCtr="0" forceAA="0" compatLnSpc="1">
+            <a:prstTxWarp prst="textNoShape">
+              <a:avLst/>
+            </a:prstTxWarp>
+            <a:noAutofit/>
+          </a:bodyPr>
+          <a:lstStyle/>
+          <a:p>
+            <a:pPr algn="ctr"/>
+            <a:r>
+              <a:rPr lang="en-US" sz="2000"/>
+              <a:t>Devices</a:t>
+            </a:r>
+          </a:p>
+        </p:txBody>
+      </p:sp>
+      <p:pic>
+        <p:nvPicPr>
+          <p:cNvPr id="24" name="Picture 23">
+            <a:extLst>
+              <a:ext uri="{FF2B5EF4-FFF2-40B4-BE49-F238E27FC236}">
+                <a16:creationId xmlns:a16="http://schemas.microsoft.com/office/drawing/2014/main" id="{5BB752C6-9044-4217-B80E-5DBDABBE5147}"/>
+              </a:ext>
+            </a:extLst>
+          </p:cNvPr>
+          <p:cNvPicPr>
+            <a:picLocks noChangeAspect="1"/>
+          </p:cNvPicPr>
+          <p:nvPr/>
+        </p:nvPicPr>
+        <p:blipFill>
+          <a:blip r:embed="rId2"/>
+          <a:stretch>
+            <a:fillRect/>
+          </a:stretch>
+        </p:blipFill>
+        <p:spPr>
+          <a:xfrm>
+            <a:off x="3129213" y="2177741"/>
+            <a:ext cx="488061" cy="504330"/>
+          </a:xfrm>
+          <a:prstGeom prst="rect">
+            <a:avLst/>
+          </a:prstGeom>
+          <a:ln w="12700">
+            <a:solidFill>
+              <a:schemeClr val="tx1"/>
+            </a:solidFill>
+          </a:ln>
+        </p:spPr>
+      </p:pic>
+      <p:pic>
+        <p:nvPicPr>
+          <p:cNvPr id="46" name="Picture 45">
+            <a:extLst>
+              <a:ext uri="{FF2B5EF4-FFF2-40B4-BE49-F238E27FC236}">
+                <a16:creationId xmlns:a16="http://schemas.microsoft.com/office/drawing/2014/main" id="{E08A8F1F-6FEC-4AC9-ABEA-AC6BFA30D146}"/>
+              </a:ext>
+            </a:extLst>
+          </p:cNvPr>
+          <p:cNvPicPr>
+            <a:picLocks noChangeAspect="1"/>
+          </p:cNvPicPr>
+          <p:nvPr/>
+        </p:nvPicPr>
+        <p:blipFill>
+          <a:blip r:embed="rId3">
+            <a:extLst>
+              <a:ext uri="{28A0092B-C50C-407E-A947-70E740481C1C}">
+                <a14:useLocalDpi xmlns:a14="http://schemas.microsoft.com/office/drawing/2010/main" val="0"/>
+              </a:ext>
+            </a:extLst>
+          </a:blip>
+          <a:stretch>
+            <a:fillRect/>
+          </a:stretch>
+        </p:blipFill>
+        <p:spPr>
+          <a:xfrm>
+            <a:off x="10845045" y="3070327"/>
+            <a:ext cx="782408" cy="782408"/>
+          </a:xfrm>
+          <a:prstGeom prst="rect">
+            <a:avLst/>
+          </a:prstGeom>
+          <a:ln w="12700">
+            <a:solidFill>
+              <a:schemeClr val="tx1"/>
+            </a:solidFill>
+          </a:ln>
+        </p:spPr>
+      </p:pic>
+      <p:cxnSp>
+        <p:nvCxnSpPr>
+          <p:cNvPr id="87" name="Connector: Elbow 86">
+            <a:extLst>
+              <a:ext uri="{FF2B5EF4-FFF2-40B4-BE49-F238E27FC236}">
+                <a16:creationId xmlns:a16="http://schemas.microsoft.com/office/drawing/2014/main" id="{52743566-315B-4300-878F-C369AA598513}"/>
+              </a:ext>
+            </a:extLst>
+          </p:cNvPr>
+          <p:cNvCxnSpPr>
+            <a:cxnSpLocks/>
+            <a:stCxn id="46" idx="2"/>
+          </p:cNvCxnSpPr>
+          <p:nvPr/>
+        </p:nvCxnSpPr>
+        <p:spPr>
+          <a:xfrm rot="5400000">
+            <a:off x="9957521" y="3152499"/>
+            <a:ext cx="578492" cy="1978965"/>
+          </a:xfrm>
+          <a:prstGeom prst="bentConnector2">
+            <a:avLst/>
+          </a:prstGeom>
+          <a:ln w="28575">
+            <a:tailEnd type="triangle"/>
+          </a:ln>
+        </p:spPr>
+        <p:style>
+          <a:lnRef idx="1">
+            <a:schemeClr val="accent1"/>
+          </a:lnRef>
+          <a:fillRef idx="0">
+            <a:schemeClr val="accent1"/>
+          </a:fillRef>
+          <a:effectRef idx="0">
+            <a:schemeClr val="accent1"/>
+          </a:effectRef>
+          <a:fontRef idx="minor">
+            <a:schemeClr val="tx1"/>
+          </a:fontRef>
+        </p:style>
+      </p:cxnSp>
+      <p:cxnSp>
+        <p:nvCxnSpPr>
+          <p:cNvPr id="98" name="Straight Connector 97">
+            <a:extLst>
+              <a:ext uri="{FF2B5EF4-FFF2-40B4-BE49-F238E27FC236}">
+                <a16:creationId xmlns:a16="http://schemas.microsoft.com/office/drawing/2014/main" id="{A31FC459-FD9F-4D04-81D2-50FA92D78FB9}"/>
+              </a:ext>
+            </a:extLst>
+          </p:cNvPr>
+          <p:cNvCxnSpPr/>
+          <p:nvPr/>
+        </p:nvCxnSpPr>
+        <p:spPr>
+          <a:xfrm>
+            <a:off x="2034649" y="232965"/>
+            <a:ext cx="0" cy="6468176"/>
+          </a:xfrm>
+          <a:prstGeom prst="line">
+            <a:avLst/>
+          </a:prstGeom>
+        </p:spPr>
+        <p:style>
+          <a:lnRef idx="1">
+            <a:schemeClr val="accent1"/>
+          </a:lnRef>
+          <a:fillRef idx="0">
+            <a:schemeClr val="accent1"/>
+          </a:fillRef>
+          <a:effectRef idx="0">
+            <a:schemeClr val="accent1"/>
+          </a:effectRef>
+          <a:fontRef idx="minor">
+            <a:schemeClr val="tx1"/>
+          </a:fontRef>
+        </p:style>
+      </p:cxnSp>
+      <p:cxnSp>
+        <p:nvCxnSpPr>
+          <p:cNvPr id="101" name="Straight Connector 100">
+            <a:extLst>
+              <a:ext uri="{FF2B5EF4-FFF2-40B4-BE49-F238E27FC236}">
+                <a16:creationId xmlns:a16="http://schemas.microsoft.com/office/drawing/2014/main" id="{C0850B3F-4BC1-4479-AC3A-AE932769E9E7}"/>
+              </a:ext>
+            </a:extLst>
+          </p:cNvPr>
+          <p:cNvCxnSpPr/>
+          <p:nvPr/>
+        </p:nvCxnSpPr>
+        <p:spPr>
+          <a:xfrm>
+            <a:off x="10101422" y="242109"/>
+            <a:ext cx="0" cy="6468176"/>
+          </a:xfrm>
+          <a:prstGeom prst="line">
+            <a:avLst/>
+          </a:prstGeom>
+        </p:spPr>
+        <p:style>
+          <a:lnRef idx="1">
+            <a:schemeClr val="accent1"/>
+          </a:lnRef>
+          <a:fillRef idx="0">
+            <a:schemeClr val="accent1"/>
+          </a:fillRef>
+          <a:effectRef idx="0">
+            <a:schemeClr val="accent1"/>
+          </a:effectRef>
+          <a:fontRef idx="minor">
+            <a:schemeClr val="tx1"/>
+          </a:fontRef>
+        </p:style>
+      </p:cxnSp>
+      <p:sp>
+        <p:nvSpPr>
+          <p:cNvPr id="111" name="Rectangle 110">
+            <a:extLst>
+              <a:ext uri="{FF2B5EF4-FFF2-40B4-BE49-F238E27FC236}">
+                <a16:creationId xmlns:a16="http://schemas.microsoft.com/office/drawing/2014/main" id="{02D0B8AB-2571-455B-839D-8A89813913A1}"/>
+              </a:ext>
+            </a:extLst>
+          </p:cNvPr>
+          <p:cNvSpPr/>
+          <p:nvPr/>
+        </p:nvSpPr>
+        <p:spPr>
+          <a:xfrm>
+            <a:off x="10405293" y="503005"/>
+            <a:ext cx="1647809" cy="850625"/>
+          </a:xfrm>
+          <a:prstGeom prst="rect">
+            <a:avLst/>
+          </a:prstGeom>
+          <a:solidFill>
+            <a:srgbClr val="1DC4FF"/>
+          </a:solidFill>
+          <a:ln w="3175">
+            <a:noFill/>
+          </a:ln>
+        </p:spPr>
+        <p:style>
+          <a:lnRef idx="2">
+            <a:schemeClr val="accent1">
+              <a:shade val="50000"/>
+            </a:schemeClr>
+          </a:lnRef>
+          <a:fillRef idx="1">
+            <a:schemeClr val="accent1"/>
+          </a:fillRef>
+          <a:effectRef idx="0">
+            <a:schemeClr val="accent1"/>
+          </a:effectRef>
+          <a:fontRef idx="minor">
+            <a:schemeClr val="lt1"/>
+          </a:fontRef>
+        </p:style>
+        <p:txBody>
+          <a:bodyPr rot="0" spcFirstLastPara="0" vertOverflow="overflow" horzOverflow="overflow" vert="horz" wrap="square" lIns="91440" tIns="45720" rIns="91440" bIns="45720" numCol="1" spcCol="0" rtlCol="0" fromWordArt="0" anchor="ctr" anchorCtr="0" forceAA="0" compatLnSpc="1">
+            <a:prstTxWarp prst="textNoShape">
+              <a:avLst/>
+            </a:prstTxWarp>
+            <a:noAutofit/>
+          </a:bodyPr>
+          <a:lstStyle/>
+          <a:p>
+            <a:pPr algn="ctr"/>
+            <a:r>
+              <a:rPr lang="en-US" sz="1600" dirty="0"/>
+              <a:t>Custom Authentication</a:t>
+            </a:r>
+          </a:p>
+        </p:txBody>
+      </p:sp>
+      <p:sp>
+        <p:nvSpPr>
+          <p:cNvPr id="121" name="Rectangle: Rounded Corners 120">
+            <a:extLst>
+              <a:ext uri="{FF2B5EF4-FFF2-40B4-BE49-F238E27FC236}">
+                <a16:creationId xmlns:a16="http://schemas.microsoft.com/office/drawing/2014/main" id="{2FF5CAEF-6B54-455A-BB02-926A4BF1314F}"/>
+              </a:ext>
+            </a:extLst>
+          </p:cNvPr>
+          <p:cNvSpPr/>
+          <p:nvPr/>
+        </p:nvSpPr>
+        <p:spPr>
+          <a:xfrm>
+            <a:off x="266957" y="2821976"/>
+            <a:ext cx="1192240" cy="812089"/>
+          </a:xfrm>
+          <a:prstGeom prst="roundRect">
+            <a:avLst>
+              <a:gd name="adj" fmla="val 1172"/>
+            </a:avLst>
+          </a:prstGeom>
+          <a:solidFill>
+            <a:schemeClr val="bg1"/>
+          </a:solidFill>
+          <a:ln w="3175">
+            <a:solidFill>
+              <a:srgbClr val="0070C0"/>
+            </a:solidFill>
+          </a:ln>
+        </p:spPr>
+        <p:style>
+          <a:lnRef idx="2">
+            <a:schemeClr val="accent1">
+              <a:shade val="50000"/>
+            </a:schemeClr>
+          </a:lnRef>
+          <a:fillRef idx="1">
+            <a:schemeClr val="accent1"/>
+          </a:fillRef>
+          <a:effectRef idx="0">
+            <a:schemeClr val="accent1"/>
+          </a:effectRef>
+          <a:fontRef idx="minor">
+            <a:schemeClr val="lt1"/>
+          </a:fontRef>
+        </p:style>
+        <p:txBody>
+          <a:bodyPr rot="0" spcFirstLastPara="0" vertOverflow="overflow" horzOverflow="overflow" vert="horz" wrap="square" lIns="91440" tIns="45720" rIns="91440" bIns="45720" numCol="1" spcCol="0" rtlCol="0" fromWordArt="0" anchor="ctr" anchorCtr="0" forceAA="0" compatLnSpc="1">
+            <a:prstTxWarp prst="textNoShape">
+              <a:avLst/>
+            </a:prstTxWarp>
+            <a:noAutofit/>
+          </a:bodyPr>
+          <a:lstStyle/>
+          <a:p>
+            <a:pPr algn="ctr"/>
+            <a:r>
+              <a:rPr lang="en-US" sz="2000"/>
+              <a:t>Devices</a:t>
+            </a:r>
+          </a:p>
+        </p:txBody>
+      </p:sp>
+      <p:sp>
+        <p:nvSpPr>
+          <p:cNvPr id="122" name="Rectangle: Rounded Corners 121">
+            <a:extLst>
+              <a:ext uri="{FF2B5EF4-FFF2-40B4-BE49-F238E27FC236}">
+                <a16:creationId xmlns:a16="http://schemas.microsoft.com/office/drawing/2014/main" id="{B1E6391E-E996-4B92-AAE3-F2636030C83A}"/>
+              </a:ext>
+            </a:extLst>
+          </p:cNvPr>
+          <p:cNvSpPr/>
+          <p:nvPr/>
+        </p:nvSpPr>
+        <p:spPr>
+          <a:xfrm>
+            <a:off x="387622" y="2949360"/>
+            <a:ext cx="1192240" cy="812089"/>
+          </a:xfrm>
+          <a:prstGeom prst="roundRect">
+            <a:avLst>
+              <a:gd name="adj" fmla="val 4725"/>
+            </a:avLst>
+          </a:prstGeom>
+          <a:solidFill>
+            <a:srgbClr val="1DC4FF"/>
+          </a:solidFill>
+          <a:ln w="3175">
+            <a:noFill/>
+          </a:ln>
+        </p:spPr>
+        <p:style>
+          <a:lnRef idx="2">
+            <a:schemeClr val="accent1">
+              <a:shade val="50000"/>
+            </a:schemeClr>
+          </a:lnRef>
+          <a:fillRef idx="1">
+            <a:schemeClr val="accent1"/>
+          </a:fillRef>
+          <a:effectRef idx="0">
+            <a:schemeClr val="accent1"/>
+          </a:effectRef>
+          <a:fontRef idx="minor">
+            <a:schemeClr val="lt1"/>
+          </a:fontRef>
+        </p:style>
+        <p:txBody>
+          <a:bodyPr rot="0" spcFirstLastPara="0" vertOverflow="overflow" horzOverflow="overflow" vert="horz" wrap="square" lIns="91440" tIns="45720" rIns="91440" bIns="45720" numCol="1" spcCol="0" rtlCol="0" fromWordArt="0" anchor="ctr" anchorCtr="0" forceAA="0" compatLnSpc="1">
+            <a:prstTxWarp prst="textNoShape">
+              <a:avLst/>
+            </a:prstTxWarp>
+            <a:noAutofit/>
+          </a:bodyPr>
+          <a:lstStyle/>
+          <a:p>
+            <a:pPr algn="ctr"/>
+            <a:r>
+              <a:rPr lang="en-US" sz="1600" dirty="0"/>
+              <a:t>Devices</a:t>
+            </a:r>
+            <a:endParaRPr lang="en-US" sz="2000" dirty="0"/>
+          </a:p>
+        </p:txBody>
+      </p:sp>
+      <p:sp>
+        <p:nvSpPr>
+          <p:cNvPr id="136" name="Rectangle: Rounded Corners 135">
+            <a:extLst>
+              <a:ext uri="{FF2B5EF4-FFF2-40B4-BE49-F238E27FC236}">
+                <a16:creationId xmlns:a16="http://schemas.microsoft.com/office/drawing/2014/main" id="{F4D74433-E65A-4960-BD5E-FAD5E7DBA1D2}"/>
+              </a:ext>
+            </a:extLst>
+          </p:cNvPr>
+          <p:cNvSpPr/>
+          <p:nvPr/>
+        </p:nvSpPr>
+        <p:spPr>
+          <a:xfrm>
+            <a:off x="10405293" y="4250225"/>
+            <a:ext cx="1617794" cy="390620"/>
+          </a:xfrm>
+          <a:prstGeom prst="roundRect">
+            <a:avLst>
+              <a:gd name="adj" fmla="val 0"/>
+            </a:avLst>
+          </a:prstGeom>
+          <a:solidFill>
+            <a:srgbClr val="1DC4FF"/>
+          </a:solidFill>
+          <a:ln w="3175">
+            <a:noFill/>
+          </a:ln>
+        </p:spPr>
+        <p:style>
+          <a:lnRef idx="2">
+            <a:schemeClr val="accent1">
+              <a:shade val="50000"/>
+            </a:schemeClr>
+          </a:lnRef>
+          <a:fillRef idx="1">
+            <a:schemeClr val="accent1"/>
+          </a:fillRef>
+          <a:effectRef idx="0">
+            <a:schemeClr val="accent1"/>
+          </a:effectRef>
+          <a:fontRef idx="minor">
+            <a:schemeClr val="lt1"/>
+          </a:fontRef>
+        </p:style>
+        <p:txBody>
+          <a:bodyPr rot="0" spcFirstLastPara="0" vertOverflow="overflow" horzOverflow="overflow" vert="horz" wrap="square" lIns="91440" tIns="45720" rIns="91440" bIns="45720" numCol="1" spcCol="0" rtlCol="0" fromWordArt="0" anchor="ctr" anchorCtr="0" forceAA="0" compatLnSpc="1">
+            <a:prstTxWarp prst="textNoShape">
+              <a:avLst/>
+            </a:prstTxWarp>
+            <a:noAutofit/>
+          </a:bodyPr>
+          <a:lstStyle/>
+          <a:p>
+            <a:pPr algn="ctr"/>
+            <a:r>
+              <a:rPr lang="en-US" sz="1600" dirty="0"/>
+              <a:t>Web Portal</a:t>
+            </a:r>
+          </a:p>
+        </p:txBody>
+      </p:sp>
+      <p:cxnSp>
+        <p:nvCxnSpPr>
+          <p:cNvPr id="49" name="Straight Arrow Connector 48">
+            <a:extLst>
+              <a:ext uri="{FF2B5EF4-FFF2-40B4-BE49-F238E27FC236}">
+                <a16:creationId xmlns:a16="http://schemas.microsoft.com/office/drawing/2014/main" id="{FA2E3E5E-83EA-45EE-8A8C-DE5AE892F1E2}"/>
+              </a:ext>
+            </a:extLst>
+          </p:cNvPr>
+          <p:cNvCxnSpPr>
+            <a:cxnSpLocks/>
+          </p:cNvCxnSpPr>
+          <p:nvPr/>
+        </p:nvCxnSpPr>
+        <p:spPr>
+          <a:xfrm>
+            <a:off x="4136757" y="1767918"/>
+            <a:ext cx="1259272" cy="0"/>
+          </a:xfrm>
+          <a:prstGeom prst="straightConnector1">
+            <a:avLst/>
+          </a:prstGeom>
+          <a:noFill/>
+          <a:ln w="28575" cap="flat" cmpd="sng" algn="ctr">
+            <a:solidFill>
+              <a:srgbClr val="0078D7"/>
+            </a:solidFill>
+            <a:prstDash val="solid"/>
+            <a:miter lim="800000"/>
+            <a:tailEnd type="triangle"/>
+          </a:ln>
+          <a:effectLst/>
+        </p:spPr>
+      </p:cxnSp>
+      <p:cxnSp>
+        <p:nvCxnSpPr>
+          <p:cNvPr id="51" name="Straight Arrow Connector 50">
+            <a:extLst>
+              <a:ext uri="{FF2B5EF4-FFF2-40B4-BE49-F238E27FC236}">
+                <a16:creationId xmlns:a16="http://schemas.microsoft.com/office/drawing/2014/main" id="{35713B75-6105-4FBC-BB2A-2F9F57306BC3}"/>
+              </a:ext>
+            </a:extLst>
+          </p:cNvPr>
+          <p:cNvCxnSpPr>
+            <a:cxnSpLocks/>
+          </p:cNvCxnSpPr>
+          <p:nvPr/>
+        </p:nvCxnSpPr>
+        <p:spPr>
+          <a:xfrm flipH="1">
+            <a:off x="1567603" y="2385081"/>
+            <a:ext cx="1101564" cy="926550"/>
+          </a:xfrm>
+          <a:prstGeom prst="straightConnector1">
+            <a:avLst/>
+          </a:prstGeom>
+          <a:ln w="28575">
+            <a:solidFill>
+              <a:srgbClr val="0078D7"/>
+            </a:solidFill>
+            <a:headEnd type="triangle"/>
+            <a:tailEnd type="triangle"/>
+          </a:ln>
+        </p:spPr>
+        <p:style>
+          <a:lnRef idx="1">
+            <a:schemeClr val="accent1"/>
+          </a:lnRef>
+          <a:fillRef idx="0">
+            <a:schemeClr val="accent1"/>
+          </a:fillRef>
+          <a:effectRef idx="0">
+            <a:schemeClr val="accent1"/>
+          </a:effectRef>
+          <a:fontRef idx="minor">
+            <a:schemeClr val="tx1"/>
+          </a:fontRef>
+        </p:style>
+      </p:cxnSp>
+      <p:cxnSp>
+        <p:nvCxnSpPr>
+          <p:cNvPr id="52" name="Straight Arrow Connector 51">
+            <a:extLst>
+              <a:ext uri="{FF2B5EF4-FFF2-40B4-BE49-F238E27FC236}">
+                <a16:creationId xmlns:a16="http://schemas.microsoft.com/office/drawing/2014/main" id="{62333726-A98F-4F9E-9618-4CFCAEB5579B}"/>
+              </a:ext>
+            </a:extLst>
+          </p:cNvPr>
+          <p:cNvCxnSpPr>
+            <a:cxnSpLocks/>
+            <a:endCxn id="122" idx="3"/>
+          </p:cNvCxnSpPr>
+          <p:nvPr/>
+        </p:nvCxnSpPr>
+        <p:spPr>
+          <a:xfrm flipH="1">
+            <a:off x="1579862" y="2856967"/>
+            <a:ext cx="1075654" cy="498438"/>
+          </a:xfrm>
+          <a:prstGeom prst="straightConnector1">
+            <a:avLst/>
+          </a:prstGeom>
+          <a:ln w="28575">
+            <a:solidFill>
+              <a:srgbClr val="0078D7"/>
+            </a:solidFill>
+            <a:headEnd type="triangle"/>
+            <a:tailEnd type="triangle"/>
+          </a:ln>
+        </p:spPr>
+        <p:style>
+          <a:lnRef idx="1">
+            <a:schemeClr val="accent1"/>
+          </a:lnRef>
+          <a:fillRef idx="0">
+            <a:schemeClr val="accent1"/>
+          </a:fillRef>
+          <a:effectRef idx="0">
+            <a:schemeClr val="accent1"/>
+          </a:effectRef>
+          <a:fontRef idx="minor">
+            <a:schemeClr val="tx1"/>
+          </a:fontRef>
+        </p:style>
+      </p:cxnSp>
+      <p:cxnSp>
+        <p:nvCxnSpPr>
+          <p:cNvPr id="55" name="Straight Arrow Connector 54">
+            <a:extLst>
+              <a:ext uri="{FF2B5EF4-FFF2-40B4-BE49-F238E27FC236}">
+                <a16:creationId xmlns:a16="http://schemas.microsoft.com/office/drawing/2014/main" id="{6138742A-604C-4F12-9603-A97DE10878F3}"/>
+              </a:ext>
+            </a:extLst>
+          </p:cNvPr>
+          <p:cNvCxnSpPr>
+            <a:cxnSpLocks/>
+            <a:endCxn id="122" idx="3"/>
+          </p:cNvCxnSpPr>
+          <p:nvPr/>
+        </p:nvCxnSpPr>
+        <p:spPr>
+          <a:xfrm flipH="1">
+            <a:off x="1579862" y="3355404"/>
+            <a:ext cx="1196320" cy="1"/>
+          </a:xfrm>
+          <a:prstGeom prst="straightConnector1">
+            <a:avLst/>
+          </a:prstGeom>
+          <a:ln w="28575">
+            <a:solidFill>
+              <a:srgbClr val="0078D7"/>
+            </a:solidFill>
+            <a:headEnd type="triangle"/>
+            <a:tailEnd type="triangle"/>
+          </a:ln>
+        </p:spPr>
+        <p:style>
+          <a:lnRef idx="1">
+            <a:schemeClr val="accent1"/>
+          </a:lnRef>
+          <a:fillRef idx="0">
+            <a:schemeClr val="accent1"/>
+          </a:fillRef>
+          <a:effectRef idx="0">
+            <a:schemeClr val="accent1"/>
+          </a:effectRef>
+          <a:fontRef idx="minor">
+            <a:schemeClr val="tx1"/>
+          </a:fontRef>
+        </p:style>
+      </p:cxnSp>
+      <p:cxnSp>
+        <p:nvCxnSpPr>
+          <p:cNvPr id="59" name="Straight Arrow Connector 58">
+            <a:extLst>
+              <a:ext uri="{FF2B5EF4-FFF2-40B4-BE49-F238E27FC236}">
+                <a16:creationId xmlns:a16="http://schemas.microsoft.com/office/drawing/2014/main" id="{FACC756A-0481-472E-B083-9D2266AD85D6}"/>
+              </a:ext>
+            </a:extLst>
+          </p:cNvPr>
+          <p:cNvCxnSpPr>
+            <a:cxnSpLocks/>
+            <a:endCxn id="122" idx="3"/>
+          </p:cNvCxnSpPr>
+          <p:nvPr/>
+        </p:nvCxnSpPr>
+        <p:spPr>
+          <a:xfrm flipH="1" flipV="1">
+            <a:off x="1579862" y="3355405"/>
+            <a:ext cx="1089306" cy="375730"/>
+          </a:xfrm>
+          <a:prstGeom prst="straightConnector1">
+            <a:avLst/>
+          </a:prstGeom>
+          <a:ln w="28575">
+            <a:solidFill>
+              <a:srgbClr val="0078D7"/>
+            </a:solidFill>
+            <a:headEnd type="triangle"/>
+            <a:tailEnd type="triangle"/>
+          </a:ln>
+        </p:spPr>
+        <p:style>
+          <a:lnRef idx="1">
+            <a:schemeClr val="accent1"/>
+          </a:lnRef>
+          <a:fillRef idx="0">
+            <a:schemeClr val="accent1"/>
+          </a:fillRef>
+          <a:effectRef idx="0">
+            <a:schemeClr val="accent1"/>
+          </a:effectRef>
+          <a:fontRef idx="minor">
+            <a:schemeClr val="tx1"/>
+          </a:fontRef>
+        </p:style>
+      </p:cxnSp>
+      <p:cxnSp>
+        <p:nvCxnSpPr>
+          <p:cNvPr id="62" name="Straight Arrow Connector 61">
+            <a:extLst>
+              <a:ext uri="{FF2B5EF4-FFF2-40B4-BE49-F238E27FC236}">
+                <a16:creationId xmlns:a16="http://schemas.microsoft.com/office/drawing/2014/main" id="{5744B622-3243-4119-AC23-84D850BED0D2}"/>
+              </a:ext>
+            </a:extLst>
+          </p:cNvPr>
+          <p:cNvCxnSpPr>
+            <a:cxnSpLocks/>
+            <a:endCxn id="122" idx="3"/>
+          </p:cNvCxnSpPr>
+          <p:nvPr/>
+        </p:nvCxnSpPr>
+        <p:spPr>
+          <a:xfrm flipH="1" flipV="1">
+            <a:off x="1579862" y="3355405"/>
+            <a:ext cx="1075654" cy="749610"/>
+          </a:xfrm>
+          <a:prstGeom prst="straightConnector1">
+            <a:avLst/>
+          </a:prstGeom>
+          <a:ln w="28575">
+            <a:solidFill>
+              <a:srgbClr val="0078D7"/>
+            </a:solidFill>
+            <a:headEnd type="triangle"/>
+            <a:tailEnd type="triangle"/>
+          </a:ln>
+        </p:spPr>
+        <p:style>
+          <a:lnRef idx="1">
+            <a:schemeClr val="accent1"/>
+          </a:lnRef>
+          <a:fillRef idx="0">
+            <a:schemeClr val="accent1"/>
+          </a:fillRef>
+          <a:effectRef idx="0">
+            <a:schemeClr val="accent1"/>
+          </a:effectRef>
+          <a:fontRef idx="minor">
+            <a:schemeClr val="tx1"/>
+          </a:fontRef>
+        </p:style>
+      </p:cxnSp>
+      <p:cxnSp>
+        <p:nvCxnSpPr>
+          <p:cNvPr id="65" name="Straight Arrow Connector 64">
+            <a:extLst>
+              <a:ext uri="{FF2B5EF4-FFF2-40B4-BE49-F238E27FC236}">
+                <a16:creationId xmlns:a16="http://schemas.microsoft.com/office/drawing/2014/main" id="{EAF14B10-60BA-40AF-9F8F-A41B11408526}"/>
+              </a:ext>
+            </a:extLst>
+          </p:cNvPr>
+          <p:cNvCxnSpPr>
+            <a:cxnSpLocks/>
+            <a:stCxn id="131" idx="3"/>
+            <a:endCxn id="133" idx="1"/>
+          </p:cNvCxnSpPr>
+          <p:nvPr/>
+        </p:nvCxnSpPr>
+        <p:spPr>
+          <a:xfrm flipV="1">
+            <a:off x="7035819" y="719204"/>
+            <a:ext cx="1227447" cy="984303"/>
+          </a:xfrm>
+          <a:prstGeom prst="straightConnector1">
+            <a:avLst/>
+          </a:prstGeom>
+          <a:noFill/>
+          <a:ln w="28575" cap="flat" cmpd="sng" algn="ctr">
+            <a:solidFill>
+              <a:srgbClr val="0078D7"/>
+            </a:solidFill>
+            <a:prstDash val="solid"/>
+            <a:miter lim="800000"/>
+            <a:tailEnd type="triangle"/>
+          </a:ln>
+          <a:effectLst/>
+        </p:spPr>
+      </p:cxnSp>
+      <p:cxnSp>
+        <p:nvCxnSpPr>
+          <p:cNvPr id="68" name="Straight Arrow Connector 67">
+            <a:extLst>
+              <a:ext uri="{FF2B5EF4-FFF2-40B4-BE49-F238E27FC236}">
+                <a16:creationId xmlns:a16="http://schemas.microsoft.com/office/drawing/2014/main" id="{0D8F2811-2521-453A-BFEA-B96D000F674A}"/>
+              </a:ext>
+            </a:extLst>
+          </p:cNvPr>
+          <p:cNvCxnSpPr>
+            <a:cxnSpLocks/>
+          </p:cNvCxnSpPr>
+          <p:nvPr/>
+        </p:nvCxnSpPr>
+        <p:spPr>
+          <a:xfrm>
+            <a:off x="7042172" y="1684748"/>
+            <a:ext cx="1241434" cy="215017"/>
+          </a:xfrm>
+          <a:prstGeom prst="straightConnector1">
+            <a:avLst/>
+          </a:prstGeom>
+          <a:noFill/>
+          <a:ln w="28575" cap="flat" cmpd="sng" algn="ctr">
+            <a:solidFill>
+              <a:srgbClr val="0078D7"/>
+            </a:solidFill>
+            <a:prstDash val="solid"/>
+            <a:miter lim="800000"/>
+            <a:tailEnd type="triangle"/>
+          </a:ln>
+          <a:effectLst/>
+        </p:spPr>
+      </p:cxnSp>
+      <p:cxnSp>
+        <p:nvCxnSpPr>
+          <p:cNvPr id="70" name="Straight Arrow Connector 69">
+            <a:extLst>
+              <a:ext uri="{FF2B5EF4-FFF2-40B4-BE49-F238E27FC236}">
+                <a16:creationId xmlns:a16="http://schemas.microsoft.com/office/drawing/2014/main" id="{5CB1BAAB-5D77-4F54-8999-9CC12E782157}"/>
+              </a:ext>
+            </a:extLst>
+          </p:cNvPr>
+          <p:cNvCxnSpPr>
+            <a:cxnSpLocks/>
+            <a:stCxn id="111" idx="2"/>
+            <a:endCxn id="46" idx="0"/>
+          </p:cNvCxnSpPr>
+          <p:nvPr/>
+        </p:nvCxnSpPr>
+        <p:spPr>
+          <a:xfrm>
+            <a:off x="11229198" y="1353630"/>
+            <a:ext cx="7051" cy="1716697"/>
+          </a:xfrm>
+          <a:prstGeom prst="straightConnector1">
+            <a:avLst/>
+          </a:prstGeom>
+          <a:noFill/>
+          <a:ln w="28575" cap="flat" cmpd="sng" algn="ctr">
+            <a:solidFill>
+              <a:srgbClr val="0078D7"/>
+            </a:solidFill>
+            <a:prstDash val="solid"/>
+            <a:miter lim="800000"/>
+            <a:headEnd type="triangle" w="med" len="med"/>
+            <a:tailEnd type="triangle" w="med" len="med"/>
+          </a:ln>
+          <a:effectLst/>
+        </p:spPr>
+      </p:cxnSp>
+      <p:pic>
+        <p:nvPicPr>
+          <p:cNvPr id="96" name="Picture 95">
+            <a:extLst>
+              <a:ext uri="{FF2B5EF4-FFF2-40B4-BE49-F238E27FC236}">
+                <a16:creationId xmlns:a16="http://schemas.microsoft.com/office/drawing/2014/main" id="{C4EAE335-B4E0-4072-8912-09123BAE9CB8}"/>
+              </a:ext>
+            </a:extLst>
+          </p:cNvPr>
+          <p:cNvPicPr>
+            <a:picLocks noChangeAspect="1"/>
+          </p:cNvPicPr>
+          <p:nvPr/>
+        </p:nvPicPr>
+        <p:blipFill>
+          <a:blip r:embed="rId4">
+            <a:biLevel thresh="25000"/>
+          </a:blip>
+          <a:stretch>
+            <a:fillRect/>
+          </a:stretch>
+        </p:blipFill>
+        <p:spPr>
+          <a:xfrm>
+            <a:off x="6575438" y="1192755"/>
+            <a:ext cx="416108" cy="321750"/>
+          </a:xfrm>
+          <a:prstGeom prst="rect">
+            <a:avLst/>
+          </a:prstGeom>
+        </p:spPr>
+      </p:pic>
+      <p:sp>
+        <p:nvSpPr>
+          <p:cNvPr id="128" name="Rectangle: Rounded Corners 127">
+            <a:extLst>
+              <a:ext uri="{FF2B5EF4-FFF2-40B4-BE49-F238E27FC236}">
+                <a16:creationId xmlns:a16="http://schemas.microsoft.com/office/drawing/2014/main" id="{DC6A999F-33FB-48DF-AC5A-294096781582}"/>
+              </a:ext>
+            </a:extLst>
+          </p:cNvPr>
+          <p:cNvSpPr/>
+          <p:nvPr/>
+        </p:nvSpPr>
+        <p:spPr>
+          <a:xfrm>
+            <a:off x="8024211" y="3039893"/>
+            <a:ext cx="1506447" cy="566290"/>
+          </a:xfrm>
+          <a:prstGeom prst="roundRect">
+            <a:avLst>
+              <a:gd name="adj" fmla="val 2050"/>
+            </a:avLst>
+          </a:prstGeom>
+          <a:solidFill>
+            <a:srgbClr val="1DC4FF"/>
+          </a:solidFill>
+          <a:ln w="3175">
+            <a:noFill/>
+          </a:ln>
+        </p:spPr>
+        <p:style>
+          <a:lnRef idx="2">
+            <a:schemeClr val="accent1">
+              <a:shade val="50000"/>
+            </a:schemeClr>
+          </a:lnRef>
+          <a:fillRef idx="1">
+            <a:schemeClr val="accent1"/>
+          </a:fillRef>
+          <a:effectRef idx="0">
+            <a:schemeClr val="accent1"/>
+          </a:effectRef>
+          <a:fontRef idx="minor">
+            <a:schemeClr val="lt1"/>
+          </a:fontRef>
+        </p:style>
+        <p:txBody>
+          <a:bodyPr rot="0" spcFirstLastPara="0" vertOverflow="overflow" horzOverflow="overflow" vert="horz" wrap="square" lIns="91440" tIns="45720" rIns="91440" bIns="45720" numCol="1" spcCol="0" rtlCol="0" fromWordArt="0" anchor="ctr" anchorCtr="0" forceAA="0" compatLnSpc="1">
+            <a:prstTxWarp prst="textNoShape">
+              <a:avLst/>
+            </a:prstTxWarp>
+            <a:noAutofit/>
+          </a:bodyPr>
+          <a:lstStyle/>
+          <a:p>
+            <a:pPr algn="ctr"/>
+            <a:r>
+              <a:rPr lang="en-US" sz="1600" dirty="0"/>
+              <a:t>Azure</a:t>
+            </a:r>
+          </a:p>
+          <a:p>
+            <a:pPr algn="ctr"/>
+            <a:r>
+              <a:rPr lang="en-US" sz="1600" dirty="0"/>
+              <a:t>Functions</a:t>
+            </a:r>
+            <a:endParaRPr lang="en-US" sz="2000" dirty="0"/>
+          </a:p>
+        </p:txBody>
+      </p:sp>
+      <p:pic>
+        <p:nvPicPr>
+          <p:cNvPr id="120" name="Picture 119">
+            <a:extLst>
+              <a:ext uri="{FF2B5EF4-FFF2-40B4-BE49-F238E27FC236}">
+                <a16:creationId xmlns:a16="http://schemas.microsoft.com/office/drawing/2014/main" id="{5C8A66E9-50BB-45A0-B6D1-D1966823B7A4}"/>
+              </a:ext>
+            </a:extLst>
+          </p:cNvPr>
+          <p:cNvPicPr>
+            <a:picLocks noChangeAspect="1"/>
+          </p:cNvPicPr>
+          <p:nvPr/>
+        </p:nvPicPr>
+        <p:blipFill>
+          <a:blip r:embed="rId5"/>
+          <a:stretch>
+            <a:fillRect/>
+          </a:stretch>
+        </p:blipFill>
+        <p:spPr>
+          <a:xfrm>
+            <a:off x="9209942" y="3098525"/>
+            <a:ext cx="274943" cy="283718"/>
+          </a:xfrm>
+          <a:prstGeom prst="rect">
+            <a:avLst/>
+          </a:prstGeom>
+        </p:spPr>
+      </p:pic>
+      <p:cxnSp>
+        <p:nvCxnSpPr>
+          <p:cNvPr id="130" name="Straight Arrow Connector 129" title="eMail Alert">
+            <a:extLst>
+              <a:ext uri="{FF2B5EF4-FFF2-40B4-BE49-F238E27FC236}">
+                <a16:creationId xmlns:a16="http://schemas.microsoft.com/office/drawing/2014/main" id="{B72849D4-5670-409C-B761-AB4C8A3635E9}"/>
+              </a:ext>
+            </a:extLst>
+          </p:cNvPr>
+          <p:cNvCxnSpPr>
+            <a:cxnSpLocks/>
+            <a:stCxn id="131" idx="2"/>
+            <a:endCxn id="128" idx="0"/>
+          </p:cNvCxnSpPr>
+          <p:nvPr/>
+        </p:nvCxnSpPr>
+        <p:spPr>
+          <a:xfrm>
+            <a:off x="6215924" y="2256178"/>
+            <a:ext cx="2561511" cy="783715"/>
+          </a:xfrm>
+          <a:prstGeom prst="straightConnector1">
+            <a:avLst/>
+          </a:prstGeom>
+          <a:noFill/>
+          <a:ln w="28575" cap="flat" cmpd="sng" algn="ctr">
+            <a:solidFill>
+              <a:srgbClr val="0078D7"/>
+            </a:solidFill>
+            <a:prstDash val="solid"/>
+            <a:miter lim="800000"/>
+            <a:tailEnd type="triangle"/>
+          </a:ln>
+          <a:effectLst/>
+        </p:spPr>
+      </p:cxnSp>
+      <p:sp>
+        <p:nvSpPr>
+          <p:cNvPr id="140" name="Rectangle: Rounded Corners 139">
+            <a:extLst>
+              <a:ext uri="{FF2B5EF4-FFF2-40B4-BE49-F238E27FC236}">
+                <a16:creationId xmlns:a16="http://schemas.microsoft.com/office/drawing/2014/main" id="{3FC4F8F6-E6D9-4FAE-8D0F-F5583AE35B69}"/>
+              </a:ext>
+            </a:extLst>
+          </p:cNvPr>
+          <p:cNvSpPr/>
+          <p:nvPr/>
+        </p:nvSpPr>
+        <p:spPr>
+          <a:xfrm>
+            <a:off x="7750837" y="4143016"/>
+            <a:ext cx="1506447" cy="523164"/>
+          </a:xfrm>
+          <a:prstGeom prst="roundRect">
+            <a:avLst>
+              <a:gd name="adj" fmla="val 2050"/>
+            </a:avLst>
+          </a:prstGeom>
+          <a:solidFill>
+            <a:srgbClr val="1DC4FF"/>
+          </a:solidFill>
+          <a:ln w="3175">
+            <a:noFill/>
+          </a:ln>
+        </p:spPr>
+        <p:style>
+          <a:lnRef idx="2">
+            <a:schemeClr val="accent1">
+              <a:shade val="50000"/>
+            </a:schemeClr>
+          </a:lnRef>
+          <a:fillRef idx="1">
+            <a:schemeClr val="accent1"/>
+          </a:fillRef>
+          <a:effectRef idx="0">
+            <a:schemeClr val="accent1"/>
+          </a:effectRef>
+          <a:fontRef idx="minor">
+            <a:schemeClr val="lt1"/>
+          </a:fontRef>
+        </p:style>
+        <p:txBody>
+          <a:bodyPr rot="0" spcFirstLastPara="0" vertOverflow="overflow" horzOverflow="overflow" vert="horz" wrap="square" lIns="91440" tIns="45720" rIns="91440" bIns="45720" numCol="1" spcCol="0" rtlCol="0" fromWordArt="0" anchor="ctr" anchorCtr="0" forceAA="0" compatLnSpc="1">
+            <a:prstTxWarp prst="textNoShape">
+              <a:avLst/>
+            </a:prstTxWarp>
+            <a:noAutofit/>
+          </a:bodyPr>
+          <a:lstStyle/>
+          <a:p>
+            <a:pPr algn="ctr"/>
+            <a:r>
+              <a:rPr lang="en-US" sz="1600" dirty="0"/>
+              <a:t>Azure</a:t>
+            </a:r>
+          </a:p>
+          <a:p>
+            <a:pPr algn="ctr"/>
+            <a:r>
+              <a:rPr lang="en-US" sz="1600" dirty="0"/>
+              <a:t>Functions</a:t>
+            </a:r>
+            <a:endParaRPr lang="en-US" sz="2000" dirty="0"/>
+          </a:p>
+        </p:txBody>
+      </p:sp>
+      <p:cxnSp>
+        <p:nvCxnSpPr>
+          <p:cNvPr id="141" name="Straight Arrow Connector 140">
+            <a:extLst>
+              <a:ext uri="{FF2B5EF4-FFF2-40B4-BE49-F238E27FC236}">
+                <a16:creationId xmlns:a16="http://schemas.microsoft.com/office/drawing/2014/main" id="{1AE99FB8-24EA-498A-8086-99C2A80A4E91}"/>
+              </a:ext>
+            </a:extLst>
+          </p:cNvPr>
+          <p:cNvCxnSpPr>
+            <a:cxnSpLocks/>
+          </p:cNvCxnSpPr>
+          <p:nvPr/>
+        </p:nvCxnSpPr>
+        <p:spPr>
+          <a:xfrm flipH="1" flipV="1">
+            <a:off x="4168288" y="4402056"/>
+            <a:ext cx="3574160" cy="10931"/>
+          </a:xfrm>
+          <a:prstGeom prst="straightConnector1">
+            <a:avLst/>
+          </a:prstGeom>
+          <a:noFill/>
+          <a:ln w="28575" cap="flat" cmpd="sng" algn="ctr">
+            <a:solidFill>
+              <a:srgbClr val="0078D7"/>
+            </a:solidFill>
+            <a:prstDash val="solid"/>
+            <a:miter lim="800000"/>
+            <a:tailEnd type="triangle"/>
+          </a:ln>
+          <a:effectLst/>
+        </p:spPr>
+      </p:cxnSp>
+      <p:cxnSp>
+        <p:nvCxnSpPr>
+          <p:cNvPr id="144" name="Straight Arrow Connector 143">
+            <a:extLst>
+              <a:ext uri="{FF2B5EF4-FFF2-40B4-BE49-F238E27FC236}">
+                <a16:creationId xmlns:a16="http://schemas.microsoft.com/office/drawing/2014/main" id="{603FCF63-AE2D-44AC-B328-499224722003}"/>
+              </a:ext>
+            </a:extLst>
+          </p:cNvPr>
+          <p:cNvCxnSpPr>
+            <a:cxnSpLocks/>
+          </p:cNvCxnSpPr>
+          <p:nvPr/>
+        </p:nvCxnSpPr>
+        <p:spPr>
+          <a:xfrm>
+            <a:off x="6246656" y="2298097"/>
+            <a:ext cx="2266930" cy="1844919"/>
+          </a:xfrm>
+          <a:prstGeom prst="straightConnector1">
+            <a:avLst/>
+          </a:prstGeom>
+          <a:noFill/>
+          <a:ln w="28575" cap="flat" cmpd="sng" algn="ctr">
+            <a:solidFill>
+              <a:srgbClr val="0078D7"/>
+            </a:solidFill>
+            <a:prstDash val="solid"/>
+            <a:miter lim="800000"/>
+            <a:tailEnd type="triangle"/>
+          </a:ln>
+          <a:effectLst/>
+        </p:spPr>
+      </p:cxnSp>
+      <p:pic>
+        <p:nvPicPr>
+          <p:cNvPr id="149" name="Picture 148">
+            <a:extLst>
+              <a:ext uri="{FF2B5EF4-FFF2-40B4-BE49-F238E27FC236}">
+                <a16:creationId xmlns:a16="http://schemas.microsoft.com/office/drawing/2014/main" id="{7190AC16-5B57-4DBA-A2A2-9F5E64CFC36D}"/>
+              </a:ext>
+            </a:extLst>
+          </p:cNvPr>
+          <p:cNvPicPr>
+            <a:picLocks noChangeAspect="1"/>
+          </p:cNvPicPr>
+          <p:nvPr/>
+        </p:nvPicPr>
+        <p:blipFill>
+          <a:blip r:embed="rId5"/>
+          <a:stretch>
+            <a:fillRect/>
+          </a:stretch>
+        </p:blipFill>
+        <p:spPr>
+          <a:xfrm>
+            <a:off x="8932026" y="4185607"/>
+            <a:ext cx="274943" cy="283718"/>
+          </a:xfrm>
+          <a:prstGeom prst="rect">
+            <a:avLst/>
+          </a:prstGeom>
+        </p:spPr>
+      </p:pic>
+      <p:sp>
+        <p:nvSpPr>
+          <p:cNvPr id="150" name="TextBox 149">
+            <a:extLst>
+              <a:ext uri="{FF2B5EF4-FFF2-40B4-BE49-F238E27FC236}">
+                <a16:creationId xmlns:a16="http://schemas.microsoft.com/office/drawing/2014/main" id="{300135AA-E007-4FA3-A805-16B4EC37912F}"/>
+              </a:ext>
+            </a:extLst>
+          </p:cNvPr>
+          <p:cNvSpPr txBox="1"/>
+          <p:nvPr/>
+        </p:nvSpPr>
+        <p:spPr>
+          <a:xfrm rot="969151">
+            <a:off x="6957330" y="2648612"/>
+            <a:ext cx="1288558" cy="307777"/>
+          </a:xfrm>
+          <a:prstGeom prst="rect">
+            <a:avLst/>
+          </a:prstGeom>
+          <a:noFill/>
+        </p:spPr>
+        <p:txBody>
+          <a:bodyPr wrap="none" rtlCol="0">
+            <a:spAutoFit/>
+          </a:bodyPr>
+          <a:lstStyle/>
+          <a:p>
+            <a:r>
+              <a:rPr lang="en-US" sz="1400" dirty="0"/>
+              <a:t>Alert for e-mail</a:t>
+            </a:r>
+          </a:p>
+        </p:txBody>
+      </p:sp>
+      <p:sp>
+        <p:nvSpPr>
+          <p:cNvPr id="151" name="TextBox 150">
+            <a:extLst>
+              <a:ext uri="{FF2B5EF4-FFF2-40B4-BE49-F238E27FC236}">
+                <a16:creationId xmlns:a16="http://schemas.microsoft.com/office/drawing/2014/main" id="{08EB632C-DD55-4BC0-92DE-DB81A5FF4935}"/>
+              </a:ext>
+            </a:extLst>
+          </p:cNvPr>
+          <p:cNvSpPr txBox="1"/>
+          <p:nvPr/>
+        </p:nvSpPr>
+        <p:spPr>
+          <a:xfrm rot="2443809">
+            <a:off x="6378334" y="3190266"/>
+            <a:ext cx="1817549" cy="307777"/>
+          </a:xfrm>
+          <a:prstGeom prst="rect">
+            <a:avLst/>
+          </a:prstGeom>
+          <a:noFill/>
+        </p:spPr>
+        <p:txBody>
+          <a:bodyPr wrap="none" rtlCol="0">
+            <a:spAutoFit/>
+          </a:bodyPr>
+          <a:lstStyle/>
+          <a:p>
+            <a:r>
+              <a:rPr lang="en-US" sz="1400" dirty="0"/>
+              <a:t>Device rule processing</a:t>
+            </a:r>
+          </a:p>
+        </p:txBody>
+      </p:sp>
+      <p:sp>
+        <p:nvSpPr>
+          <p:cNvPr id="156" name="TextBox 155">
+            <a:extLst>
+              <a:ext uri="{FF2B5EF4-FFF2-40B4-BE49-F238E27FC236}">
+                <a16:creationId xmlns:a16="http://schemas.microsoft.com/office/drawing/2014/main" id="{5C91DEB2-C0DE-41AC-B03C-F5B6E929B31C}"/>
+              </a:ext>
+            </a:extLst>
+          </p:cNvPr>
+          <p:cNvSpPr txBox="1"/>
+          <p:nvPr/>
+        </p:nvSpPr>
+        <p:spPr>
+          <a:xfrm>
+            <a:off x="4796667" y="4096337"/>
+            <a:ext cx="2020810" cy="307777"/>
+          </a:xfrm>
+          <a:prstGeom prst="rect">
+            <a:avLst/>
+          </a:prstGeom>
+          <a:noFill/>
+        </p:spPr>
+        <p:txBody>
+          <a:bodyPr wrap="none" rtlCol="0">
+            <a:spAutoFit/>
+          </a:bodyPr>
+          <a:lstStyle/>
+          <a:p>
+            <a:r>
+              <a:rPr lang="en-US" sz="1400" dirty="0"/>
+              <a:t>Send command to device</a:t>
+            </a:r>
+          </a:p>
+        </p:txBody>
+      </p:sp>
+      <p:cxnSp>
+        <p:nvCxnSpPr>
+          <p:cNvPr id="17" name="Connector: Elbow 16">
+            <a:extLst>
+              <a:ext uri="{FF2B5EF4-FFF2-40B4-BE49-F238E27FC236}">
+                <a16:creationId xmlns:a16="http://schemas.microsoft.com/office/drawing/2014/main" id="{8BF2667B-724F-49BE-BEE5-13E4E2D4E1C4}"/>
+              </a:ext>
+            </a:extLst>
+          </p:cNvPr>
+          <p:cNvCxnSpPr>
+            <a:cxnSpLocks/>
+          </p:cNvCxnSpPr>
+          <p:nvPr/>
+        </p:nvCxnSpPr>
+        <p:spPr>
+          <a:xfrm rot="10800000">
+            <a:off x="1000521" y="3761449"/>
+            <a:ext cx="1685425" cy="669776"/>
+          </a:xfrm>
+          <a:prstGeom prst="bentConnector2">
+            <a:avLst/>
+          </a:prstGeom>
+          <a:ln w="28575">
+            <a:tailEnd type="triangle"/>
+          </a:ln>
+        </p:spPr>
+        <p:style>
+          <a:lnRef idx="1">
+            <a:schemeClr val="accent1"/>
+          </a:lnRef>
+          <a:fillRef idx="0">
+            <a:schemeClr val="accent1"/>
+          </a:fillRef>
+          <a:effectRef idx="0">
+            <a:schemeClr val="accent1"/>
+          </a:effectRef>
+          <a:fontRef idx="minor">
+            <a:schemeClr val="tx1"/>
+          </a:fontRef>
+        </p:style>
+      </p:cxnSp>
+      <p:sp>
+        <p:nvSpPr>
+          <p:cNvPr id="56" name="Rectangle: Rounded Corners 55">
+            <a:extLst>
+              <a:ext uri="{FF2B5EF4-FFF2-40B4-BE49-F238E27FC236}">
+                <a16:creationId xmlns:a16="http://schemas.microsoft.com/office/drawing/2014/main" id="{001978A4-3DB9-4D0E-B3A3-A319816951B5}"/>
+              </a:ext>
+            </a:extLst>
+          </p:cNvPr>
+          <p:cNvSpPr/>
+          <p:nvPr/>
+        </p:nvSpPr>
+        <p:spPr>
+          <a:xfrm>
+            <a:off x="7816934" y="5030722"/>
+            <a:ext cx="1598883" cy="850626"/>
+          </a:xfrm>
+          <a:prstGeom prst="roundRect">
+            <a:avLst>
+              <a:gd name="adj" fmla="val 2050"/>
+            </a:avLst>
+          </a:prstGeom>
+          <a:solidFill>
+            <a:srgbClr val="1DC4FF"/>
+          </a:solidFill>
+          <a:ln w="3175">
+            <a:noFill/>
+          </a:ln>
+        </p:spPr>
+        <p:style>
+          <a:lnRef idx="2">
+            <a:schemeClr val="accent1">
+              <a:shade val="50000"/>
+            </a:schemeClr>
+          </a:lnRef>
+          <a:fillRef idx="1">
+            <a:schemeClr val="accent1"/>
+          </a:fillRef>
+          <a:effectRef idx="0">
+            <a:schemeClr val="accent1"/>
+          </a:effectRef>
+          <a:fontRef idx="minor">
+            <a:schemeClr val="lt1"/>
+          </a:fontRef>
+        </p:style>
+        <p:txBody>
+          <a:bodyPr rot="0" spcFirstLastPara="0" vertOverflow="overflow" horzOverflow="overflow" vert="horz" wrap="square" lIns="91440" tIns="45720" rIns="91440" bIns="45720" numCol="1" spcCol="0" rtlCol="0" fromWordArt="0" anchor="ctr" anchorCtr="0" forceAA="0" compatLnSpc="1">
+            <a:prstTxWarp prst="textNoShape">
+              <a:avLst/>
+            </a:prstTxWarp>
+            <a:noAutofit/>
+          </a:bodyPr>
+          <a:lstStyle/>
+          <a:p>
+            <a:pPr algn="ctr"/>
+            <a:r>
+              <a:rPr lang="en-US" sz="1600" dirty="0"/>
+              <a:t>Storage -</a:t>
+            </a:r>
+          </a:p>
+          <a:p>
+            <a:pPr algn="ctr"/>
+            <a:r>
+              <a:rPr lang="en-US" sz="1400" dirty="0"/>
+              <a:t>User Data and Reference Data</a:t>
+            </a:r>
+            <a:endParaRPr lang="en-US" dirty="0"/>
+          </a:p>
+        </p:txBody>
+      </p:sp>
+      <p:sp>
+        <p:nvSpPr>
+          <p:cNvPr id="60" name="Rectangle: Rounded Corners 59">
+            <a:extLst>
+              <a:ext uri="{FF2B5EF4-FFF2-40B4-BE49-F238E27FC236}">
+                <a16:creationId xmlns:a16="http://schemas.microsoft.com/office/drawing/2014/main" id="{585C43DE-CA57-499B-BB72-897BDE210BB2}"/>
+              </a:ext>
+            </a:extLst>
+          </p:cNvPr>
+          <p:cNvSpPr/>
+          <p:nvPr/>
+        </p:nvSpPr>
+        <p:spPr>
+          <a:xfrm>
+            <a:off x="8266836" y="1061841"/>
+            <a:ext cx="1576051" cy="495995"/>
+          </a:xfrm>
+          <a:prstGeom prst="roundRect">
+            <a:avLst>
+              <a:gd name="adj" fmla="val 2050"/>
+            </a:avLst>
+          </a:prstGeom>
+          <a:solidFill>
+            <a:srgbClr val="1DC4FF"/>
+          </a:solidFill>
+          <a:ln w="3175">
+            <a:noFill/>
+          </a:ln>
+        </p:spPr>
+        <p:style>
+          <a:lnRef idx="2">
+            <a:schemeClr val="accent1">
+              <a:shade val="50000"/>
+            </a:schemeClr>
+          </a:lnRef>
+          <a:fillRef idx="1">
+            <a:schemeClr val="accent1"/>
+          </a:fillRef>
+          <a:effectRef idx="0">
+            <a:schemeClr val="accent1"/>
+          </a:effectRef>
+          <a:fontRef idx="minor">
+            <a:schemeClr val="lt1"/>
+          </a:fontRef>
+        </p:style>
+        <p:txBody>
+          <a:bodyPr rot="0" spcFirstLastPara="0" vertOverflow="overflow" horzOverflow="overflow" vert="horz" wrap="square" lIns="91440" tIns="45720" rIns="91440" bIns="45720" numCol="1" spcCol="0" rtlCol="0" fromWordArt="0" anchor="ctr" anchorCtr="0" forceAA="0" compatLnSpc="1">
+            <a:prstTxWarp prst="textNoShape">
+              <a:avLst/>
+            </a:prstTxWarp>
+            <a:noAutofit/>
+          </a:bodyPr>
+          <a:lstStyle/>
+          <a:p>
+            <a:pPr algn="ctr"/>
+            <a:r>
+              <a:rPr lang="en-US" sz="1600" dirty="0"/>
+              <a:t>Storage – Others</a:t>
+            </a:r>
+            <a:endParaRPr lang="en-US" sz="2000" dirty="0"/>
+          </a:p>
+        </p:txBody>
+      </p:sp>
+      <p:cxnSp>
+        <p:nvCxnSpPr>
+          <p:cNvPr id="61" name="Straight Arrow Connector 60">
+            <a:extLst>
+              <a:ext uri="{FF2B5EF4-FFF2-40B4-BE49-F238E27FC236}">
+                <a16:creationId xmlns:a16="http://schemas.microsoft.com/office/drawing/2014/main" id="{8C22B28C-B432-40B8-88D7-D324CDCFBD35}"/>
+              </a:ext>
+            </a:extLst>
+          </p:cNvPr>
+          <p:cNvCxnSpPr>
+            <a:cxnSpLocks/>
+          </p:cNvCxnSpPr>
+          <p:nvPr/>
+        </p:nvCxnSpPr>
+        <p:spPr>
+          <a:xfrm flipV="1">
+            <a:off x="7071304" y="1303964"/>
+            <a:ext cx="1186744" cy="391240"/>
+          </a:xfrm>
+          <a:prstGeom prst="straightConnector1">
+            <a:avLst/>
+          </a:prstGeom>
+          <a:noFill/>
+          <a:ln w="28575" cap="flat" cmpd="sng" algn="ctr">
+            <a:solidFill>
+              <a:srgbClr val="0078D7"/>
+            </a:solidFill>
+            <a:prstDash val="solid"/>
+            <a:miter lim="800000"/>
+            <a:tailEnd type="triangle"/>
+          </a:ln>
+          <a:effectLst/>
+        </p:spPr>
+      </p:cxnSp>
+      <p:cxnSp>
+        <p:nvCxnSpPr>
+          <p:cNvPr id="69" name="Connector: Elbow 68">
+            <a:extLst>
+              <a:ext uri="{FF2B5EF4-FFF2-40B4-BE49-F238E27FC236}">
+                <a16:creationId xmlns:a16="http://schemas.microsoft.com/office/drawing/2014/main" id="{6901F9BD-4742-4D1C-93CE-8D7814C7704C}"/>
+              </a:ext>
+            </a:extLst>
+          </p:cNvPr>
+          <p:cNvCxnSpPr>
+            <a:cxnSpLocks/>
+            <a:stCxn id="56" idx="1"/>
+            <a:endCxn id="131" idx="2"/>
+          </p:cNvCxnSpPr>
+          <p:nvPr/>
+        </p:nvCxnSpPr>
+        <p:spPr>
+          <a:xfrm rot="10800000">
+            <a:off x="6215924" y="2256179"/>
+            <a:ext cx="1601010" cy="3199857"/>
+          </a:xfrm>
+          <a:prstGeom prst="bentConnector2">
+            <a:avLst/>
+          </a:prstGeom>
+          <a:ln w="28575">
+            <a:tailEnd type="triangle"/>
+          </a:ln>
+        </p:spPr>
+        <p:style>
+          <a:lnRef idx="1">
+            <a:schemeClr val="accent1"/>
+          </a:lnRef>
+          <a:fillRef idx="0">
+            <a:schemeClr val="accent1"/>
+          </a:fillRef>
+          <a:effectRef idx="0">
+            <a:schemeClr val="accent1"/>
+          </a:effectRef>
+          <a:fontRef idx="minor">
+            <a:schemeClr val="tx1"/>
+          </a:fontRef>
+        </p:style>
+      </p:cxnSp>
+      <p:sp>
+        <p:nvSpPr>
+          <p:cNvPr id="79" name="Rectangle: Rounded Corners 78">
+            <a:extLst>
+              <a:ext uri="{FF2B5EF4-FFF2-40B4-BE49-F238E27FC236}">
+                <a16:creationId xmlns:a16="http://schemas.microsoft.com/office/drawing/2014/main" id="{127DB555-D30E-4A0A-93D3-7A6E89589804}"/>
+              </a:ext>
+            </a:extLst>
+          </p:cNvPr>
+          <p:cNvSpPr/>
+          <p:nvPr/>
+        </p:nvSpPr>
+        <p:spPr>
+          <a:xfrm>
+            <a:off x="2681427" y="6158346"/>
+            <a:ext cx="1495247" cy="390620"/>
+          </a:xfrm>
+          <a:prstGeom prst="roundRect">
+            <a:avLst>
+              <a:gd name="adj" fmla="val 0"/>
+            </a:avLst>
+          </a:prstGeom>
+          <a:solidFill>
+            <a:srgbClr val="1DC4FF"/>
+          </a:solidFill>
+          <a:ln w="3175">
+            <a:noFill/>
+          </a:ln>
+        </p:spPr>
+        <p:style>
+          <a:lnRef idx="2">
+            <a:schemeClr val="accent1">
+              <a:shade val="50000"/>
+            </a:schemeClr>
+          </a:lnRef>
+          <a:fillRef idx="1">
+            <a:schemeClr val="accent1"/>
+          </a:fillRef>
+          <a:effectRef idx="0">
+            <a:schemeClr val="accent1"/>
+          </a:effectRef>
+          <a:fontRef idx="minor">
+            <a:schemeClr val="lt1"/>
+          </a:fontRef>
+        </p:style>
+        <p:txBody>
+          <a:bodyPr rot="0" spcFirstLastPara="0" vertOverflow="overflow" horzOverflow="overflow" vert="horz" wrap="square" lIns="91440" tIns="45720" rIns="91440" bIns="45720" numCol="1" spcCol="0" rtlCol="0" fromWordArt="0" anchor="ctr" anchorCtr="0" forceAA="0" compatLnSpc="1">
+            <a:prstTxWarp prst="textNoShape">
+              <a:avLst/>
+            </a:prstTxWarp>
+            <a:noAutofit/>
+          </a:bodyPr>
+          <a:lstStyle/>
+          <a:p>
+            <a:pPr algn="ctr"/>
+            <a:r>
+              <a:rPr lang="en-US" sz="1600" dirty="0"/>
+              <a:t>DPS</a:t>
+            </a:r>
+          </a:p>
+        </p:txBody>
+      </p:sp>
+      <p:cxnSp>
+        <p:nvCxnSpPr>
+          <p:cNvPr id="43" name="Connector: Elbow 42">
+            <a:extLst>
+              <a:ext uri="{FF2B5EF4-FFF2-40B4-BE49-F238E27FC236}">
+                <a16:creationId xmlns:a16="http://schemas.microsoft.com/office/drawing/2014/main" id="{5251B8F3-678B-48B8-96DE-C9859888BF62}"/>
+              </a:ext>
+            </a:extLst>
+          </p:cNvPr>
+          <p:cNvCxnSpPr>
+            <a:cxnSpLocks/>
+            <a:endCxn id="56" idx="3"/>
+          </p:cNvCxnSpPr>
+          <p:nvPr/>
+        </p:nvCxnSpPr>
+        <p:spPr>
+          <a:xfrm rot="10800000" flipV="1">
+            <a:off x="9415817" y="4655521"/>
+            <a:ext cx="1820432" cy="800514"/>
+          </a:xfrm>
+          <a:prstGeom prst="bentConnector3">
+            <a:avLst>
+              <a:gd name="adj1" fmla="val -691"/>
+            </a:avLst>
+          </a:prstGeom>
+          <a:ln w="28575">
+            <a:tailEnd type="triangle"/>
+          </a:ln>
+        </p:spPr>
+        <p:style>
+          <a:lnRef idx="1">
+            <a:schemeClr val="accent1"/>
+          </a:lnRef>
+          <a:fillRef idx="0">
+            <a:schemeClr val="accent1"/>
+          </a:fillRef>
+          <a:effectRef idx="0">
+            <a:schemeClr val="accent1"/>
+          </a:effectRef>
+          <a:fontRef idx="minor">
+            <a:schemeClr val="tx1"/>
+          </a:fontRef>
+        </p:style>
+      </p:cxnSp>
+      <p:sp>
+        <p:nvSpPr>
+          <p:cNvPr id="44" name="Title 1">
+            <a:extLst>
+              <a:ext uri="{FF2B5EF4-FFF2-40B4-BE49-F238E27FC236}">
+                <a16:creationId xmlns:a16="http://schemas.microsoft.com/office/drawing/2014/main" id="{03CC617B-9659-420C-973D-7EFAA093267E}"/>
+              </a:ext>
+            </a:extLst>
+          </p:cNvPr>
+          <p:cNvSpPr txBox="1">
+            <a:spLocks/>
+          </p:cNvSpPr>
+          <p:nvPr/>
+        </p:nvSpPr>
+        <p:spPr>
+          <a:xfrm>
+            <a:off x="0" y="0"/>
+            <a:ext cx="12192000" cy="440949"/>
+          </a:xfrm>
+          <a:prstGeom prst="rect">
+            <a:avLst/>
+          </a:prstGeom>
+          <a:solidFill>
+            <a:srgbClr val="0070C0"/>
+          </a:solidFill>
+          <a:ln w="12700" cap="flat" cmpd="sng" algn="ctr">
+            <a:solidFill>
+              <a:schemeClr val="tx1"/>
+            </a:solidFill>
+            <a:prstDash val="solid"/>
+            <a:miter lim="800000"/>
+          </a:ln>
+        </p:spPr>
+        <p:style>
+          <a:lnRef idx="2">
+            <a:schemeClr val="accent1">
+              <a:shade val="50000"/>
+            </a:schemeClr>
+          </a:lnRef>
+          <a:fillRef idx="1">
+            <a:schemeClr val="accent1"/>
+          </a:fillRef>
+          <a:effectRef idx="0">
+            <a:schemeClr val="accent1"/>
+          </a:effectRef>
+          <a:fontRef idx="minor">
+            <a:schemeClr val="lt1"/>
+          </a:fontRef>
+        </p:style>
+        <p:txBody>
+          <a:bodyPr rot="0" spcFirstLastPara="0" vertOverflow="overflow" horzOverflow="overflow" vert="horz" wrap="square" lIns="91440" tIns="45720" rIns="91440" bIns="45720" numCol="1" spcCol="0" rtlCol="0" fromWordArt="0" anchor="ctr" anchorCtr="0" forceAA="0" compatLnSpc="1">
+            <a:prstTxWarp prst="textNoShape">
+              <a:avLst/>
+            </a:prstTxWarp>
+            <a:noAutofit/>
+          </a:bodyPr>
+          <a:lstStyle>
+            <a:lvl1pPr algn="ctr" defTabSz="914400" rtl="0" eaLnBrk="1" latinLnBrk="0" hangingPunct="1">
+              <a:lnSpc>
+                <a:spcPct val="90000"/>
+              </a:lnSpc>
+              <a:spcBef>
+                <a:spcPct val="0"/>
+              </a:spcBef>
+              <a:buNone/>
+              <a:defRPr sz="6000" kern="1200">
+                <a:solidFill>
+                  <a:schemeClr val="lt1"/>
+                </a:solidFill>
+                <a:latin typeface="+mn-lt"/>
+                <a:ea typeface="+mn-ea"/>
+                <a:cs typeface="+mn-cs"/>
+              </a:defRPr>
+            </a:lvl1pPr>
+            <a:lvl2pPr>
+              <a:defRPr>
+                <a:solidFill>
+                  <a:schemeClr val="lt1"/>
+                </a:solidFill>
+                <a:latin typeface="+mn-lt"/>
+                <a:ea typeface="+mn-ea"/>
+                <a:cs typeface="+mn-cs"/>
+              </a:defRPr>
+            </a:lvl2pPr>
+            <a:lvl3pPr>
+              <a:defRPr>
+                <a:solidFill>
+                  <a:schemeClr val="lt1"/>
+                </a:solidFill>
+                <a:latin typeface="+mn-lt"/>
+                <a:ea typeface="+mn-ea"/>
+                <a:cs typeface="+mn-cs"/>
+              </a:defRPr>
+            </a:lvl3pPr>
+            <a:lvl4pPr>
+              <a:defRPr>
+                <a:solidFill>
+                  <a:schemeClr val="lt1"/>
+                </a:solidFill>
+                <a:latin typeface="+mn-lt"/>
+                <a:ea typeface="+mn-ea"/>
+                <a:cs typeface="+mn-cs"/>
+              </a:defRPr>
+            </a:lvl4pPr>
+            <a:lvl5pPr>
+              <a:defRPr>
+                <a:solidFill>
+                  <a:schemeClr val="lt1"/>
+                </a:solidFill>
+                <a:latin typeface="+mn-lt"/>
+                <a:ea typeface="+mn-ea"/>
+                <a:cs typeface="+mn-cs"/>
+              </a:defRPr>
+            </a:lvl5pPr>
+            <a:lvl6pPr>
+              <a:defRPr>
+                <a:solidFill>
+                  <a:schemeClr val="lt1"/>
+                </a:solidFill>
+                <a:latin typeface="+mn-lt"/>
+                <a:ea typeface="+mn-ea"/>
+                <a:cs typeface="+mn-cs"/>
+              </a:defRPr>
+            </a:lvl6pPr>
+            <a:lvl7pPr>
+              <a:defRPr>
+                <a:solidFill>
+                  <a:schemeClr val="lt1"/>
+                </a:solidFill>
+                <a:latin typeface="+mn-lt"/>
+                <a:ea typeface="+mn-ea"/>
+                <a:cs typeface="+mn-cs"/>
+              </a:defRPr>
+            </a:lvl7pPr>
+            <a:lvl8pPr>
+              <a:defRPr>
+                <a:solidFill>
+                  <a:schemeClr val="lt1"/>
+                </a:solidFill>
+                <a:latin typeface="+mn-lt"/>
+                <a:ea typeface="+mn-ea"/>
+                <a:cs typeface="+mn-cs"/>
+              </a:defRPr>
+            </a:lvl8pPr>
+            <a:lvl9pPr>
+              <a:defRPr>
+                <a:solidFill>
+                  <a:schemeClr val="lt1"/>
+                </a:solidFill>
+                <a:latin typeface="+mn-lt"/>
+                <a:ea typeface="+mn-ea"/>
+                <a:cs typeface="+mn-cs"/>
+              </a:defRPr>
+            </a:lvl9pPr>
+          </a:lstStyle>
+          <a:p>
+            <a:r>
+              <a:rPr lang="en-US" sz="3200" dirty="0"/>
+              <a:t>Scaling the system</a:t>
+            </a:r>
+          </a:p>
+        </p:txBody>
+      </p:sp>
+      <p:sp>
+        <p:nvSpPr>
+          <p:cNvPr id="45" name="Rectangle: Rounded Corners 44">
+            <a:extLst>
+              <a:ext uri="{FF2B5EF4-FFF2-40B4-BE49-F238E27FC236}">
+                <a16:creationId xmlns:a16="http://schemas.microsoft.com/office/drawing/2014/main" id="{021CF28E-819E-428A-B3F8-DC215D068D19}"/>
+              </a:ext>
+            </a:extLst>
+          </p:cNvPr>
+          <p:cNvSpPr/>
+          <p:nvPr/>
+        </p:nvSpPr>
+        <p:spPr>
+          <a:xfrm>
+            <a:off x="2708378" y="3189351"/>
+            <a:ext cx="1441343" cy="2628800"/>
+          </a:xfrm>
+          <a:prstGeom prst="roundRect">
+            <a:avLst>
+              <a:gd name="adj" fmla="val 2720"/>
+            </a:avLst>
+          </a:prstGeom>
+          <a:solidFill>
+            <a:srgbClr val="1DC4FF"/>
+          </a:solidFill>
+          <a:ln w="3175">
+            <a:noFill/>
+          </a:ln>
+        </p:spPr>
+        <p:style>
+          <a:lnRef idx="2">
+            <a:schemeClr val="accent1">
+              <a:shade val="50000"/>
+            </a:schemeClr>
+          </a:lnRef>
+          <a:fillRef idx="1">
+            <a:schemeClr val="accent1"/>
+          </a:fillRef>
+          <a:effectRef idx="0">
+            <a:schemeClr val="accent1"/>
+          </a:effectRef>
+          <a:fontRef idx="minor">
+            <a:schemeClr val="lt1"/>
+          </a:fontRef>
+        </p:style>
+        <p:txBody>
+          <a:bodyPr rot="0" spcFirstLastPara="0" vertOverflow="overflow" horzOverflow="overflow" vert="horz" wrap="square" lIns="91440" tIns="45720" rIns="91440" bIns="45720" numCol="1" spcCol="0" rtlCol="0" fromWordArt="0" anchor="ctr" anchorCtr="0" forceAA="0" compatLnSpc="1">
+            <a:prstTxWarp prst="textNoShape">
+              <a:avLst/>
+            </a:prstTxWarp>
+            <a:noAutofit/>
+          </a:bodyPr>
+          <a:lstStyle/>
+          <a:p>
+            <a:pPr algn="ctr"/>
+            <a:r>
+              <a:rPr lang="en-US" sz="1600" dirty="0"/>
+              <a:t>IOT Hub - 2</a:t>
+            </a:r>
+          </a:p>
+        </p:txBody>
+      </p:sp>
+      <p:pic>
+        <p:nvPicPr>
+          <p:cNvPr id="47" name="Picture 46">
+            <a:extLst>
+              <a:ext uri="{FF2B5EF4-FFF2-40B4-BE49-F238E27FC236}">
+                <a16:creationId xmlns:a16="http://schemas.microsoft.com/office/drawing/2014/main" id="{331FDBEE-BFF9-4583-84DC-B5C2BB731CF0}"/>
+              </a:ext>
+            </a:extLst>
+          </p:cNvPr>
+          <p:cNvPicPr>
+            <a:picLocks noChangeAspect="1"/>
+          </p:cNvPicPr>
+          <p:nvPr/>
+        </p:nvPicPr>
+        <p:blipFill>
+          <a:blip r:embed="rId2"/>
+          <a:stretch>
+            <a:fillRect/>
+          </a:stretch>
+        </p:blipFill>
+        <p:spPr>
+          <a:xfrm>
+            <a:off x="3185018" y="4683927"/>
+            <a:ext cx="488061" cy="504330"/>
+          </a:xfrm>
+          <a:prstGeom prst="rect">
+            <a:avLst/>
+          </a:prstGeom>
+          <a:ln w="12700">
+            <a:solidFill>
+              <a:schemeClr val="tx1"/>
+            </a:solidFill>
+          </a:ln>
+        </p:spPr>
+      </p:pic>
+      <p:cxnSp>
+        <p:nvCxnSpPr>
+          <p:cNvPr id="50" name="Connector: Elbow 49">
+            <a:extLst>
+              <a:ext uri="{FF2B5EF4-FFF2-40B4-BE49-F238E27FC236}">
+                <a16:creationId xmlns:a16="http://schemas.microsoft.com/office/drawing/2014/main" id="{6796B0BA-8571-4FE8-9D18-236E5E88296F}"/>
+              </a:ext>
+            </a:extLst>
+          </p:cNvPr>
+          <p:cNvCxnSpPr>
+            <a:cxnSpLocks/>
+          </p:cNvCxnSpPr>
+          <p:nvPr/>
+        </p:nvCxnSpPr>
+        <p:spPr>
+          <a:xfrm flipV="1">
+            <a:off x="4134291" y="1955282"/>
+            <a:ext cx="1246308" cy="2800244"/>
+          </a:xfrm>
+          <a:prstGeom prst="bentConnector3">
+            <a:avLst>
+              <a:gd name="adj1" fmla="val 50000"/>
+            </a:avLst>
+          </a:prstGeom>
+          <a:ln w="28575">
+            <a:tailEnd type="triangle"/>
+          </a:ln>
+        </p:spPr>
+        <p:style>
+          <a:lnRef idx="1">
+            <a:schemeClr val="accent1"/>
+          </a:lnRef>
+          <a:fillRef idx="0">
+            <a:schemeClr val="accent1"/>
+          </a:fillRef>
+          <a:effectRef idx="0">
+            <a:schemeClr val="accent1"/>
+          </a:effectRef>
+          <a:fontRef idx="minor">
+            <a:schemeClr val="tx1"/>
+          </a:fontRef>
+        </p:style>
+      </p:cxnSp>
+    </p:spTree>
+    <p:extLst>
+      <p:ext uri="{BB962C8B-B14F-4D97-AF65-F5344CB8AC3E}">
+        <p14:creationId xmlns:p14="http://schemas.microsoft.com/office/powerpoint/2010/main" val="3382304005"/>
+      </p:ext>
+    </p:extLst>
+  </p:cSld>
+  <p:clrMapOvr>
+    <a:masterClrMapping/>
+  </p:clrMapOvr>
+</p:sld>
+</file>
+
+<file path=ppt/slides/slide5.xml><?xml version="1.0" encoding="utf-8"?>
 <p:sld xmlns:a="http://schemas.openxmlformats.org/drawingml/2006/main" xmlns:r="http://schemas.openxmlformats.org/officeDocument/2006/relationships" xmlns:p="http://schemas.openxmlformats.org/presentationml/2006/main">
   <p:cSld>
     <p:bg>

</xml_diff>